<commit_message>
tensorboard integration with fastai train and validate processes
</commit_message>
<xml_diff>
--- a/presentation/DLStagePredictPresentation.pptx
+++ b/presentation/DLStagePredictPresentation.pptx
@@ -1706,7 +1706,7 @@
           </a:r>
           <a:r>
             <a:rPr lang="en-US" dirty="0"/>
-            <a:t>/</a:t>
+            <a:t> / </a:t>
           </a:r>
           <a:r>
             <a:rPr lang="en-US" dirty="0" err="1"/>
@@ -1750,7 +1750,7 @@
         <a:p>
           <a:r>
             <a:rPr lang="en-US" dirty="0"/>
-            <a:t>Kaggle datasets</a:t>
+            <a:t>Datasets: Kaggle</a:t>
           </a:r>
         </a:p>
       </dgm:t>
@@ -1849,6 +1849,47 @@
         </a:p>
       </dgm:t>
     </dgm:pt>
+    <dgm:pt modelId="{5C61F185-E843-4F72-B915-45FB1948E3CD}">
+      <dgm:prSet/>
+      <dgm:spPr/>
+      <dgm:t>
+        <a:bodyPr/>
+        <a:lstStyle/>
+        <a:p>
+          <a:r>
+            <a:rPr lang="en-US" dirty="0"/>
+            <a:t>Visualizations: </a:t>
+          </a:r>
+          <a:r>
+            <a:rPr lang="en-US" dirty="0" err="1"/>
+            <a:t>TensorBoard</a:t>
+          </a:r>
+          <a:endParaRPr lang="en-US" dirty="0"/>
+        </a:p>
+      </dgm:t>
+    </dgm:pt>
+    <dgm:pt modelId="{831476E1-8B60-4EA5-8801-B78BE8A7226D}" type="parTrans" cxnId="{D5AC13A2-6A13-48EF-857C-ADB5ED3AC592}">
+      <dgm:prSet/>
+      <dgm:spPr/>
+      <dgm:t>
+        <a:bodyPr/>
+        <a:lstStyle/>
+        <a:p>
+          <a:endParaRPr lang="en-US"/>
+        </a:p>
+      </dgm:t>
+    </dgm:pt>
+    <dgm:pt modelId="{06FFB60D-C7D2-4013-A5F3-ECF901325DB8}" type="sibTrans" cxnId="{D5AC13A2-6A13-48EF-857C-ADB5ED3AC592}">
+      <dgm:prSet/>
+      <dgm:spPr/>
+      <dgm:t>
+        <a:bodyPr/>
+        <a:lstStyle/>
+        <a:p>
+          <a:endParaRPr lang="en-US"/>
+        </a:p>
+      </dgm:t>
+    </dgm:pt>
     <dgm:pt modelId="{402D4A58-F177-47D5-8B0C-1E81185BD834}" type="pres">
       <dgm:prSet presAssocID="{1A619692-C072-4B7C-B2E7-6914F809AAE1}" presName="diagram" presStyleCnt="0">
         <dgm:presLayoutVars>
@@ -1859,7 +1900,7 @@
       <dgm:spPr/>
     </dgm:pt>
     <dgm:pt modelId="{01CAD946-1DD4-40A7-9DA6-52615E9ADED6}" type="pres">
-      <dgm:prSet presAssocID="{E8E56CA6-9F04-4E81-80D5-95619793531F}" presName="arrow" presStyleLbl="node1" presStyleIdx="0" presStyleCnt="5">
+      <dgm:prSet presAssocID="{E8E56CA6-9F04-4E81-80D5-95619793531F}" presName="arrow" presStyleLbl="node1" presStyleIdx="0" presStyleCnt="6">
         <dgm:presLayoutVars>
           <dgm:bulletEnabled val="1"/>
         </dgm:presLayoutVars>
@@ -1867,7 +1908,7 @@
       <dgm:spPr/>
     </dgm:pt>
     <dgm:pt modelId="{23F492CB-6F38-4D04-A621-3B58790D4B31}" type="pres">
-      <dgm:prSet presAssocID="{EEDB384F-584B-4300-AD05-FBD126D0D0F7}" presName="arrow" presStyleLbl="node1" presStyleIdx="1" presStyleCnt="5">
+      <dgm:prSet presAssocID="{EEDB384F-584B-4300-AD05-FBD126D0D0F7}" presName="arrow" presStyleLbl="node1" presStyleIdx="1" presStyleCnt="6">
         <dgm:presLayoutVars>
           <dgm:bulletEnabled val="1"/>
         </dgm:presLayoutVars>
@@ -1875,7 +1916,7 @@
       <dgm:spPr/>
     </dgm:pt>
     <dgm:pt modelId="{3FF1F6B0-65F5-4E3E-B641-EAE8677313E0}" type="pres">
-      <dgm:prSet presAssocID="{3609D10D-2860-4DF2-90A4-2DFCFDDB9720}" presName="arrow" presStyleLbl="node1" presStyleIdx="2" presStyleCnt="5">
+      <dgm:prSet presAssocID="{3609D10D-2860-4DF2-90A4-2DFCFDDB9720}" presName="arrow" presStyleLbl="node1" presStyleIdx="2" presStyleCnt="6">
         <dgm:presLayoutVars>
           <dgm:bulletEnabled val="1"/>
         </dgm:presLayoutVars>
@@ -1883,7 +1924,15 @@
       <dgm:spPr/>
     </dgm:pt>
     <dgm:pt modelId="{82C97E14-8FDC-4710-9E3A-51494F65106F}" type="pres">
-      <dgm:prSet presAssocID="{FB1A8450-311E-4E54-98B4-05323A0F3583}" presName="arrow" presStyleLbl="node1" presStyleIdx="3" presStyleCnt="5">
+      <dgm:prSet presAssocID="{FB1A8450-311E-4E54-98B4-05323A0F3583}" presName="arrow" presStyleLbl="node1" presStyleIdx="3" presStyleCnt="6">
+        <dgm:presLayoutVars>
+          <dgm:bulletEnabled val="1"/>
+        </dgm:presLayoutVars>
+      </dgm:prSet>
+      <dgm:spPr/>
+    </dgm:pt>
+    <dgm:pt modelId="{02E1A47C-B2AD-43D5-8E67-0BE89A019E2D}" type="pres">
+      <dgm:prSet presAssocID="{5C61F185-E843-4F72-B915-45FB1948E3CD}" presName="arrow" presStyleLbl="node1" presStyleIdx="4" presStyleCnt="6">
         <dgm:presLayoutVars>
           <dgm:bulletEnabled val="1"/>
         </dgm:presLayoutVars>
@@ -1891,7 +1940,7 @@
       <dgm:spPr/>
     </dgm:pt>
     <dgm:pt modelId="{B4B1D385-6942-48DF-97F3-65E4D9DA464B}" type="pres">
-      <dgm:prSet presAssocID="{1C8F8774-1F99-4A05-8D0C-96457514C564}" presName="arrow" presStyleLbl="node1" presStyleIdx="4" presStyleCnt="5">
+      <dgm:prSet presAssocID="{1C8F8774-1F99-4A05-8D0C-96457514C564}" presName="arrow" presStyleLbl="node1" presStyleIdx="5" presStyleCnt="6">
         <dgm:presLayoutVars>
           <dgm:bulletEnabled val="1"/>
         </dgm:presLayoutVars>
@@ -1904,18 +1953,21 @@
     <dgm:cxn modelId="{81564C36-910B-43E6-9CFD-D70EE62E565C}" type="presOf" srcId="{FB1A8450-311E-4E54-98B4-05323A0F3583}" destId="{82C97E14-8FDC-4710-9E3A-51494F65106F}" srcOrd="0" destOrd="0" presId="urn:microsoft.com/office/officeart/2005/8/layout/arrow5"/>
     <dgm:cxn modelId="{EC402639-DD57-4012-AC3E-A47F349F84F9}" type="presOf" srcId="{EEDB384F-584B-4300-AD05-FBD126D0D0F7}" destId="{23F492CB-6F38-4D04-A621-3B58790D4B31}" srcOrd="0" destOrd="0" presId="urn:microsoft.com/office/officeart/2005/8/layout/arrow5"/>
     <dgm:cxn modelId="{4EF97061-0759-4957-B861-A6905AC4A4CF}" srcId="{1A619692-C072-4B7C-B2E7-6914F809AAE1}" destId="{E8E56CA6-9F04-4E81-80D5-95619793531F}" srcOrd="0" destOrd="0" parTransId="{E21385E2-1D4D-49DE-ADB2-4B25B05B2E71}" sibTransId="{1D44072D-7BA8-4259-BF30-DA4528D49774}"/>
-    <dgm:cxn modelId="{ADEFCF4B-C6B2-406E-9582-7E9E303C17AE}" srcId="{1A619692-C072-4B7C-B2E7-6914F809AAE1}" destId="{1C8F8774-1F99-4A05-8D0C-96457514C564}" srcOrd="4" destOrd="0" parTransId="{41A39545-E255-4C17-981E-EA53A5A6D070}" sibTransId="{DFF80CA4-BC9C-488E-9373-93BAA7542F11}"/>
+    <dgm:cxn modelId="{ADEFCF4B-C6B2-406E-9582-7E9E303C17AE}" srcId="{1A619692-C072-4B7C-B2E7-6914F809AAE1}" destId="{1C8F8774-1F99-4A05-8D0C-96457514C564}" srcOrd="5" destOrd="0" parTransId="{41A39545-E255-4C17-981E-EA53A5A6D070}" sibTransId="{DFF80CA4-BC9C-488E-9373-93BAA7542F11}"/>
     <dgm:cxn modelId="{DD3FB753-5626-4FC4-AA7A-E942188C1475}" srcId="{1A619692-C072-4B7C-B2E7-6914F809AAE1}" destId="{EEDB384F-584B-4300-AD05-FBD126D0D0F7}" srcOrd="1" destOrd="0" parTransId="{02065BBA-36CF-48B2-9935-FA91F3F3D2D1}" sibTransId="{493D87E8-92E6-4513-A4B5-498538C0E4AA}"/>
+    <dgm:cxn modelId="{D5AC13A2-6A13-48EF-857C-ADB5ED3AC592}" srcId="{1A619692-C072-4B7C-B2E7-6914F809AAE1}" destId="{5C61F185-E843-4F72-B915-45FB1948E3CD}" srcOrd="4" destOrd="0" parTransId="{831476E1-8B60-4EA5-8801-B78BE8A7226D}" sibTransId="{06FFB60D-C7D2-4013-A5F3-ECF901325DB8}"/>
     <dgm:cxn modelId="{90DA0CAB-143E-4F88-A14B-A4975EDC44EB}" type="presOf" srcId="{1C8F8774-1F99-4A05-8D0C-96457514C564}" destId="{B4B1D385-6942-48DF-97F3-65E4D9DA464B}" srcOrd="0" destOrd="0" presId="urn:microsoft.com/office/officeart/2005/8/layout/arrow5"/>
     <dgm:cxn modelId="{F4EF70B0-88BF-4FFF-AB21-6B4908A5B159}" type="presOf" srcId="{3609D10D-2860-4DF2-90A4-2DFCFDDB9720}" destId="{3FF1F6B0-65F5-4E3E-B641-EAE8677313E0}" srcOrd="0" destOrd="0" presId="urn:microsoft.com/office/officeart/2005/8/layout/arrow5"/>
     <dgm:cxn modelId="{B0BB7DBA-0C8A-4BD1-8F41-155D2C060096}" srcId="{1A619692-C072-4B7C-B2E7-6914F809AAE1}" destId="{FB1A8450-311E-4E54-98B4-05323A0F3583}" srcOrd="3" destOrd="0" parTransId="{C379BF5A-280D-4CBB-B3A1-D7A7CF63DFEA}" sibTransId="{E2B48603-4B4A-4E1A-B852-3BC35EDA9DD4}"/>
     <dgm:cxn modelId="{398789DB-A891-42CE-AA83-53C063345FF9}" srcId="{1A619692-C072-4B7C-B2E7-6914F809AAE1}" destId="{3609D10D-2860-4DF2-90A4-2DFCFDDB9720}" srcOrd="2" destOrd="0" parTransId="{DE798B44-BDBE-40E2-924A-C8B4B8AD5643}" sibTransId="{16088EC7-A389-435F-B58A-68EC5196D72D}"/>
     <dgm:cxn modelId="{2A63ADDF-3CE8-4574-AF8D-AC7A9B4DC0DF}" type="presOf" srcId="{E8E56CA6-9F04-4E81-80D5-95619793531F}" destId="{01CAD946-1DD4-40A7-9DA6-52615E9ADED6}" srcOrd="0" destOrd="0" presId="urn:microsoft.com/office/officeart/2005/8/layout/arrow5"/>
+    <dgm:cxn modelId="{B3A871F3-CC7A-4622-856A-BBA2B5C2610D}" type="presOf" srcId="{5C61F185-E843-4F72-B915-45FB1948E3CD}" destId="{02E1A47C-B2AD-43D5-8E67-0BE89A019E2D}" srcOrd="0" destOrd="0" presId="urn:microsoft.com/office/officeart/2005/8/layout/arrow5"/>
     <dgm:cxn modelId="{5E5B46A6-A0A6-48F9-9FFD-8693AC7720EA}" type="presParOf" srcId="{402D4A58-F177-47D5-8B0C-1E81185BD834}" destId="{01CAD946-1DD4-40A7-9DA6-52615E9ADED6}" srcOrd="0" destOrd="0" presId="urn:microsoft.com/office/officeart/2005/8/layout/arrow5"/>
     <dgm:cxn modelId="{693EAAD9-4542-4362-8CE4-0652BDE0D134}" type="presParOf" srcId="{402D4A58-F177-47D5-8B0C-1E81185BD834}" destId="{23F492CB-6F38-4D04-A621-3B58790D4B31}" srcOrd="1" destOrd="0" presId="urn:microsoft.com/office/officeart/2005/8/layout/arrow5"/>
     <dgm:cxn modelId="{50910B30-AEE0-498F-9CD9-E89E4D7FFE9C}" type="presParOf" srcId="{402D4A58-F177-47D5-8B0C-1E81185BD834}" destId="{3FF1F6B0-65F5-4E3E-B641-EAE8677313E0}" srcOrd="2" destOrd="0" presId="urn:microsoft.com/office/officeart/2005/8/layout/arrow5"/>
     <dgm:cxn modelId="{34C7D159-064F-4623-9806-79AF78CA3EEC}" type="presParOf" srcId="{402D4A58-F177-47D5-8B0C-1E81185BD834}" destId="{82C97E14-8FDC-4710-9E3A-51494F65106F}" srcOrd="3" destOrd="0" presId="urn:microsoft.com/office/officeart/2005/8/layout/arrow5"/>
-    <dgm:cxn modelId="{2117E009-8663-46F3-81F2-57FA9CEB7863}" type="presParOf" srcId="{402D4A58-F177-47D5-8B0C-1E81185BD834}" destId="{B4B1D385-6942-48DF-97F3-65E4D9DA464B}" srcOrd="4" destOrd="0" presId="urn:microsoft.com/office/officeart/2005/8/layout/arrow5"/>
+    <dgm:cxn modelId="{22F137D5-995F-4A34-8DFF-F70EDA864F66}" type="presParOf" srcId="{402D4A58-F177-47D5-8B0C-1E81185BD834}" destId="{02E1A47C-B2AD-43D5-8E67-0BE89A019E2D}" srcOrd="4" destOrd="0" presId="urn:microsoft.com/office/officeart/2005/8/layout/arrow5"/>
+    <dgm:cxn modelId="{2117E009-8663-46F3-81F2-57FA9CEB7863}" type="presParOf" srcId="{402D4A58-F177-47D5-8B0C-1E81185BD834}" destId="{B4B1D385-6942-48DF-97F3-65E4D9DA464B}" srcOrd="5" destOrd="0" presId="urn:microsoft.com/office/officeart/2005/8/layout/arrow5"/>
   </dgm:cxnLst>
   <dgm:bg/>
   <dgm:whole/>
@@ -2275,8 +2327,8 @@
       </dsp:nvSpPr>
       <dsp:spPr>
         <a:xfrm>
-          <a:off x="3044158" y="136"/>
-          <a:ext cx="1798383" cy="1798383"/>
+          <a:off x="3133692" y="1197"/>
+          <a:ext cx="1619315" cy="1619315"/>
         </a:xfrm>
         <a:prstGeom prst="downArrow">
           <a:avLst>
@@ -2321,12 +2373,12 @@
         </a:fontRef>
       </dsp:style>
       <dsp:txBody>
-        <a:bodyPr spcFirstLastPara="0" vert="horz" wrap="square" lIns="71120" tIns="71120" rIns="71120" bIns="71120" numCol="1" spcCol="1270" anchor="ctr" anchorCtr="0">
+        <a:bodyPr spcFirstLastPara="0" vert="horz" wrap="square" lIns="64008" tIns="64008" rIns="64008" bIns="64008" numCol="1" spcCol="1270" anchor="ctr" anchorCtr="0">
           <a:noAutofit/>
         </a:bodyPr>
         <a:lstStyle/>
         <a:p>
-          <a:pPr marL="0" lvl="0" indent="0" algn="ctr" defTabSz="444500">
+          <a:pPr marL="0" lvl="0" indent="0" algn="ctr" defTabSz="400050">
             <a:lnSpc>
               <a:spcPct val="90000"/>
             </a:lnSpc>
@@ -2339,14 +2391,14 @@
             <a:buNone/>
           </a:pPr>
           <a:r>
-            <a:rPr lang="en-US" sz="1000" kern="1200" dirty="0"/>
+            <a:rPr lang="en-US" sz="900" kern="1200" dirty="0"/>
             <a:t>Python</a:t>
           </a:r>
         </a:p>
       </dsp:txBody>
       <dsp:txXfrm>
-        <a:off x="3493754" y="136"/>
-        <a:ext cx="899191" cy="1483666"/>
+        <a:off x="3538521" y="1197"/>
+        <a:ext cx="809657" cy="1335935"/>
       </dsp:txXfrm>
     </dsp:sp>
     <dsp:sp modelId="{23F492CB-6F38-4D04-A621-3B58790D4B31}">
@@ -2355,9 +2407,9 @@
         <dsp:cNvSpPr/>
       </dsp:nvSpPr>
       <dsp:spPr>
-        <a:xfrm rot="4320000">
-          <a:off x="4551614" y="1095366"/>
-          <a:ext cx="1798383" cy="1798383"/>
+        <a:xfrm rot="3600000">
+          <a:off x="4613823" y="855751"/>
+          <a:ext cx="1619315" cy="1619315"/>
         </a:xfrm>
         <a:prstGeom prst="downArrow">
           <a:avLst>
@@ -2402,12 +2454,12 @@
         </a:fontRef>
       </dsp:style>
       <dsp:txBody>
-        <a:bodyPr spcFirstLastPara="0" vert="horz" wrap="square" lIns="71120" tIns="71120" rIns="71120" bIns="71120" numCol="1" spcCol="1270" anchor="ctr" anchorCtr="0">
+        <a:bodyPr spcFirstLastPara="0" vert="horz" wrap="square" lIns="64008" tIns="64008" rIns="64008" bIns="64008" numCol="1" spcCol="1270" anchor="ctr" anchorCtr="0">
           <a:noAutofit/>
         </a:bodyPr>
         <a:lstStyle/>
         <a:p>
-          <a:pPr marL="0" lvl="0" indent="0" algn="ctr" defTabSz="444500">
+          <a:pPr marL="0" lvl="0" indent="0" algn="ctr" defTabSz="400050">
             <a:lnSpc>
               <a:spcPct val="90000"/>
             </a:lnSpc>
@@ -2420,26 +2472,26 @@
             <a:buNone/>
           </a:pPr>
           <a:r>
-            <a:rPr lang="en-US" sz="1000" kern="1200" dirty="0" err="1"/>
+            <a:rPr lang="en-US" sz="900" kern="1200" dirty="0" err="1"/>
             <a:t>FastAI</a:t>
           </a:r>
           <a:r>
-            <a:rPr lang="en-US" sz="1000" kern="1200" dirty="0"/>
-            <a:t>/</a:t>
+            <a:rPr lang="en-US" sz="900" kern="1200" dirty="0"/>
+            <a:t> / </a:t>
           </a:r>
           <a:r>
-            <a:rPr lang="en-US" sz="1000" kern="1200" dirty="0" err="1"/>
+            <a:rPr lang="en-US" sz="900" kern="1200" dirty="0" err="1"/>
             <a:t>PyTorch</a:t>
           </a:r>
           <a:r>
-            <a:rPr lang="en-US" sz="1000" kern="1200" dirty="0"/>
+            <a:rPr lang="en-US" sz="900" kern="1200" dirty="0"/>
             <a:t> ecosystem</a:t>
           </a:r>
         </a:p>
       </dsp:txBody>
       <dsp:txXfrm rot="-5400000">
-        <a:off x="4858630" y="1496335"/>
-        <a:ext cx="1483666" cy="899191"/>
+        <a:off x="4878220" y="1189735"/>
+        <a:ext cx="1335935" cy="809657"/>
       </dsp:txXfrm>
     </dsp:sp>
     <dsp:sp modelId="{3FF1F6B0-65F5-4E3E-B641-EAE8677313E0}">
@@ -2448,9 +2500,9 @@
         <dsp:cNvSpPr/>
       </dsp:nvSpPr>
       <dsp:spPr>
-        <a:xfrm rot="8640000">
-          <a:off x="3975817" y="2867487"/>
-          <a:ext cx="1798383" cy="1798383"/>
+        <a:xfrm rot="7200000">
+          <a:off x="4613823" y="2564859"/>
+          <a:ext cx="1619315" cy="1619315"/>
         </a:xfrm>
         <a:prstGeom prst="downArrow">
           <a:avLst>
@@ -2495,12 +2547,12 @@
         </a:fontRef>
       </dsp:style>
       <dsp:txBody>
-        <a:bodyPr spcFirstLastPara="0" vert="horz" wrap="square" lIns="71120" tIns="71120" rIns="71120" bIns="71120" numCol="1" spcCol="1270" anchor="ctr" anchorCtr="0">
+        <a:bodyPr spcFirstLastPara="0" vert="horz" wrap="square" lIns="64008" tIns="64008" rIns="64008" bIns="64008" numCol="1" spcCol="1270" anchor="ctr" anchorCtr="0">
           <a:noAutofit/>
         </a:bodyPr>
         <a:lstStyle/>
         <a:p>
-          <a:pPr marL="0" lvl="0" indent="0" algn="ctr" defTabSz="444500">
+          <a:pPr marL="0" lvl="0" indent="0" algn="ctr" defTabSz="400050">
             <a:lnSpc>
               <a:spcPct val="90000"/>
             </a:lnSpc>
@@ -2513,14 +2565,14 @@
             <a:buNone/>
           </a:pPr>
           <a:r>
-            <a:rPr lang="en-US" sz="1000" kern="1200" dirty="0"/>
-            <a:t>Kaggle datasets</a:t>
+            <a:rPr lang="en-US" sz="900" kern="1200" dirty="0"/>
+            <a:t>Datasets: Kaggle</a:t>
           </a:r>
         </a:p>
       </dsp:txBody>
-      <dsp:txXfrm rot="10800000">
-        <a:off x="4517906" y="3152151"/>
-        <a:ext cx="899191" cy="1483666"/>
+      <dsp:txXfrm rot="-5400000">
+        <a:off x="4878220" y="3040533"/>
+        <a:ext cx="1335935" cy="809657"/>
       </dsp:txXfrm>
     </dsp:sp>
     <dsp:sp modelId="{82C97E14-8FDC-4710-9E3A-51494F65106F}">
@@ -2529,9 +2581,9 @@
         <dsp:cNvSpPr/>
       </dsp:nvSpPr>
       <dsp:spPr>
-        <a:xfrm rot="12960000">
-          <a:off x="2112499" y="2867487"/>
-          <a:ext cx="1798383" cy="1798383"/>
+        <a:xfrm rot="10800000">
+          <a:off x="3133692" y="3419413"/>
+          <a:ext cx="1619315" cy="1619315"/>
         </a:xfrm>
         <a:prstGeom prst="downArrow">
           <a:avLst>
@@ -2576,12 +2628,12 @@
         </a:fontRef>
       </dsp:style>
       <dsp:txBody>
-        <a:bodyPr spcFirstLastPara="0" vert="horz" wrap="square" lIns="71120" tIns="71120" rIns="71120" bIns="71120" numCol="1" spcCol="1270" anchor="ctr" anchorCtr="0">
+        <a:bodyPr spcFirstLastPara="0" vert="horz" wrap="square" lIns="64008" tIns="64008" rIns="64008" bIns="64008" numCol="1" spcCol="1270" anchor="ctr" anchorCtr="0">
           <a:noAutofit/>
         </a:bodyPr>
         <a:lstStyle/>
         <a:p>
-          <a:pPr marL="0" lvl="0" indent="0" algn="ctr" defTabSz="444500">
+          <a:pPr marL="0" lvl="0" indent="0" algn="ctr" defTabSz="400050">
             <a:lnSpc>
               <a:spcPct val="90000"/>
             </a:lnSpc>
@@ -2594,25 +2646,25 @@
             <a:buNone/>
           </a:pPr>
           <a:r>
-            <a:rPr lang="en-US" sz="1000" kern="1200" dirty="0"/>
+            <a:rPr lang="en-US" sz="900" kern="1200" dirty="0"/>
             <a:t>Deployment: Hugging Face Spaces</a:t>
           </a:r>
         </a:p>
       </dsp:txBody>
       <dsp:txXfrm rot="10800000">
-        <a:off x="2469602" y="3152151"/>
-        <a:ext cx="899191" cy="1483666"/>
+        <a:off x="3538521" y="3702793"/>
+        <a:ext cx="809657" cy="1335935"/>
       </dsp:txXfrm>
     </dsp:sp>
-    <dsp:sp modelId="{B4B1D385-6942-48DF-97F3-65E4D9DA464B}">
+    <dsp:sp modelId="{02E1A47C-B2AD-43D5-8E67-0BE89A019E2D}">
       <dsp:nvSpPr>
         <dsp:cNvPr id="0" name=""/>
         <dsp:cNvSpPr/>
       </dsp:nvSpPr>
       <dsp:spPr>
-        <a:xfrm rot="17280000">
-          <a:off x="1536702" y="1095366"/>
-          <a:ext cx="1798383" cy="1798383"/>
+        <a:xfrm rot="14400000">
+          <a:off x="1653561" y="2564859"/>
+          <a:ext cx="1619315" cy="1619315"/>
         </a:xfrm>
         <a:prstGeom prst="downArrow">
           <a:avLst>
@@ -2657,12 +2709,12 @@
         </a:fontRef>
       </dsp:style>
       <dsp:txBody>
-        <a:bodyPr spcFirstLastPara="0" vert="horz" wrap="square" lIns="71120" tIns="71120" rIns="71120" bIns="71120" numCol="1" spcCol="1270" anchor="ctr" anchorCtr="0">
+        <a:bodyPr spcFirstLastPara="0" vert="horz" wrap="square" lIns="64008" tIns="64008" rIns="64008" bIns="64008" numCol="1" spcCol="1270" anchor="ctr" anchorCtr="0">
           <a:noAutofit/>
         </a:bodyPr>
         <a:lstStyle/>
         <a:p>
-          <a:pPr marL="0" lvl="0" indent="0" algn="ctr" defTabSz="444500">
+          <a:pPr marL="0" lvl="0" indent="0" algn="ctr" defTabSz="400050">
             <a:lnSpc>
               <a:spcPct val="90000"/>
             </a:lnSpc>
@@ -2675,14 +2727,100 @@
             <a:buNone/>
           </a:pPr>
           <a:r>
-            <a:rPr lang="en-US" sz="1000" kern="1200"/>
+            <a:rPr lang="en-US" sz="900" kern="1200" dirty="0"/>
+            <a:t>Visualizations: </a:t>
+          </a:r>
+          <a:r>
+            <a:rPr lang="en-US" sz="900" kern="1200" dirty="0" err="1"/>
+            <a:t>TensorBoard</a:t>
+          </a:r>
+          <a:endParaRPr lang="en-US" sz="900" kern="1200" dirty="0"/>
+        </a:p>
+      </dsp:txBody>
+      <dsp:txXfrm rot="5400000">
+        <a:off x="1672544" y="3040533"/>
+        <a:ext cx="1335935" cy="809657"/>
+      </dsp:txXfrm>
+    </dsp:sp>
+    <dsp:sp modelId="{B4B1D385-6942-48DF-97F3-65E4D9DA464B}">
+      <dsp:nvSpPr>
+        <dsp:cNvPr id="0" name=""/>
+        <dsp:cNvSpPr/>
+      </dsp:nvSpPr>
+      <dsp:spPr>
+        <a:xfrm rot="18000000">
+          <a:off x="1653561" y="855751"/>
+          <a:ext cx="1619315" cy="1619315"/>
+        </a:xfrm>
+        <a:prstGeom prst="downArrow">
+          <a:avLst>
+            <a:gd name="adj1" fmla="val 50000"/>
+            <a:gd name="adj2" fmla="val 35000"/>
+          </a:avLst>
+        </a:prstGeom>
+        <a:solidFill>
+          <a:schemeClr val="accent1">
+            <a:hueOff val="0"/>
+            <a:satOff val="0"/>
+            <a:lumOff val="0"/>
+            <a:alphaOff val="0"/>
+          </a:schemeClr>
+        </a:solidFill>
+        <a:ln w="19050" cap="flat" cmpd="sng" algn="ctr">
+          <a:solidFill>
+            <a:schemeClr val="lt1">
+              <a:hueOff val="0"/>
+              <a:satOff val="0"/>
+              <a:lumOff val="0"/>
+              <a:alphaOff val="0"/>
+            </a:schemeClr>
+          </a:solidFill>
+          <a:prstDash val="solid"/>
+          <a:miter lim="800000"/>
+        </a:ln>
+        <a:effectLst/>
+      </dsp:spPr>
+      <dsp:style>
+        <a:lnRef idx="2">
+          <a:scrgbClr r="0" g="0" b="0"/>
+        </a:lnRef>
+        <a:fillRef idx="1">
+          <a:scrgbClr r="0" g="0" b="0"/>
+        </a:fillRef>
+        <a:effectRef idx="0">
+          <a:scrgbClr r="0" g="0" b="0"/>
+        </a:effectRef>
+        <a:fontRef idx="minor">
+          <a:schemeClr val="lt1"/>
+        </a:fontRef>
+      </dsp:style>
+      <dsp:txBody>
+        <a:bodyPr spcFirstLastPara="0" vert="horz" wrap="square" lIns="64008" tIns="64008" rIns="64008" bIns="64008" numCol="1" spcCol="1270" anchor="ctr" anchorCtr="0">
+          <a:noAutofit/>
+        </a:bodyPr>
+        <a:lstStyle/>
+        <a:p>
+          <a:pPr marL="0" lvl="0" indent="0" algn="ctr" defTabSz="400050">
+            <a:lnSpc>
+              <a:spcPct val="90000"/>
+            </a:lnSpc>
+            <a:spcBef>
+              <a:spcPct val="0"/>
+            </a:spcBef>
+            <a:spcAft>
+              <a:spcPct val="35000"/>
+            </a:spcAft>
+            <a:buNone/>
+          </a:pPr>
+          <a:r>
+            <a:rPr lang="en-US" sz="900" kern="1200"/>
             <a:t>Poetry for dependency management</a:t>
           </a:r>
         </a:p>
       </dsp:txBody>
       <dsp:txXfrm rot="5400000">
-        <a:off x="1544404" y="1496335"/>
-        <a:ext cx="1483666" cy="899191"/>
+        <a:off x="1672544" y="1189735"/>
+        <a:ext cx="1335935" cy="809657"/>
       </dsp:txXfrm>
     </dsp:sp>
   </dsp:spTree>
@@ -5917,7 +6055,7 @@
           <a:p>
             <a:fld id="{241EB5C9-1307-BA42-ABA2-0BC069CD8E7F}" type="datetimeFigureOut">
               <a:rPr lang="en-US" smtClean="0"/>
-              <a:t>11/3/2024</a:t>
+              <a:t>11/9/2024</a:t>
             </a:fld>
             <a:endParaRPr lang="en-US"/>
           </a:p>
@@ -6115,7 +6253,7 @@
           <a:p>
             <a:fld id="{241EB5C9-1307-BA42-ABA2-0BC069CD8E7F}" type="datetimeFigureOut">
               <a:rPr lang="en-US" smtClean="0"/>
-              <a:t>11/3/2024</a:t>
+              <a:t>11/9/2024</a:t>
             </a:fld>
             <a:endParaRPr lang="en-US"/>
           </a:p>
@@ -6323,7 +6461,7 @@
           <a:p>
             <a:fld id="{241EB5C9-1307-BA42-ABA2-0BC069CD8E7F}" type="datetimeFigureOut">
               <a:rPr lang="en-US" smtClean="0"/>
-              <a:t>11/3/2024</a:t>
+              <a:t>11/9/2024</a:t>
             </a:fld>
             <a:endParaRPr lang="en-US"/>
           </a:p>
@@ -6521,7 +6659,7 @@
           <a:p>
             <a:fld id="{241EB5C9-1307-BA42-ABA2-0BC069CD8E7F}" type="datetimeFigureOut">
               <a:rPr lang="en-US" smtClean="0"/>
-              <a:t>11/3/2024</a:t>
+              <a:t>11/9/2024</a:t>
             </a:fld>
             <a:endParaRPr lang="en-US"/>
           </a:p>
@@ -6796,7 +6934,7 @@
           <a:p>
             <a:fld id="{241EB5C9-1307-BA42-ABA2-0BC069CD8E7F}" type="datetimeFigureOut">
               <a:rPr lang="en-US" smtClean="0"/>
-              <a:t>11/3/2024</a:t>
+              <a:t>11/9/2024</a:t>
             </a:fld>
             <a:endParaRPr lang="en-US"/>
           </a:p>
@@ -7061,7 +7199,7 @@
           <a:p>
             <a:fld id="{241EB5C9-1307-BA42-ABA2-0BC069CD8E7F}" type="datetimeFigureOut">
               <a:rPr lang="en-US" smtClean="0"/>
-              <a:t>11/3/2024</a:t>
+              <a:t>11/9/2024</a:t>
             </a:fld>
             <a:endParaRPr lang="en-US"/>
           </a:p>
@@ -7473,7 +7611,7 @@
           <a:p>
             <a:fld id="{241EB5C9-1307-BA42-ABA2-0BC069CD8E7F}" type="datetimeFigureOut">
               <a:rPr lang="en-US" smtClean="0"/>
-              <a:t>11/3/2024</a:t>
+              <a:t>11/9/2024</a:t>
             </a:fld>
             <a:endParaRPr lang="en-US"/>
           </a:p>
@@ -7614,7 +7752,7 @@
           <a:p>
             <a:fld id="{241EB5C9-1307-BA42-ABA2-0BC069CD8E7F}" type="datetimeFigureOut">
               <a:rPr lang="en-US" smtClean="0"/>
-              <a:t>11/3/2024</a:t>
+              <a:t>11/9/2024</a:t>
             </a:fld>
             <a:endParaRPr lang="en-US"/>
           </a:p>
@@ -7727,7 +7865,7 @@
           <a:p>
             <a:fld id="{241EB5C9-1307-BA42-ABA2-0BC069CD8E7F}" type="datetimeFigureOut">
               <a:rPr lang="en-US" smtClean="0"/>
-              <a:t>11/3/2024</a:t>
+              <a:t>11/9/2024</a:t>
             </a:fld>
             <a:endParaRPr lang="en-US"/>
           </a:p>
@@ -8038,7 +8176,7 @@
           <a:p>
             <a:fld id="{241EB5C9-1307-BA42-ABA2-0BC069CD8E7F}" type="datetimeFigureOut">
               <a:rPr lang="en-US" smtClean="0"/>
-              <a:t>11/3/2024</a:t>
+              <a:t>11/9/2024</a:t>
             </a:fld>
             <a:endParaRPr lang="en-US"/>
           </a:p>
@@ -8326,7 +8464,7 @@
           <a:p>
             <a:fld id="{241EB5C9-1307-BA42-ABA2-0BC069CD8E7F}" type="datetimeFigureOut">
               <a:rPr lang="en-US" smtClean="0"/>
-              <a:t>11/3/2024</a:t>
+              <a:t>11/9/2024</a:t>
             </a:fld>
             <a:endParaRPr lang="en-US"/>
           </a:p>
@@ -8567,7 +8705,7 @@
           <a:p>
             <a:fld id="{241EB5C9-1307-BA42-ABA2-0BC069CD8E7F}" type="datetimeFigureOut">
               <a:rPr lang="en-US" smtClean="0"/>
-              <a:t>11/3/2024</a:t>
+              <a:t>11/9/2024</a:t>
             </a:fld>
             <a:endParaRPr lang="en-US"/>
           </a:p>
@@ -10112,15 +10250,6 @@
           </a:p>
           <a:p>
             <a:pPr marL="0" lvl="0" indent="0">
-              <a:buNone/>
-            </a:pPr>
-            <a:r>
-              <a:rPr lang="en-US" sz="1700" dirty="0"/>
-              <a:t>[Include architecture comparison visualization]</a:t>
-            </a:r>
-          </a:p>
-          <a:p>
-            <a:pPr marL="0" lvl="0" indent="0">
               <a:spcBef>
                 <a:spcPts val="3000"/>
               </a:spcBef>
@@ -19526,14 +19655,14 @@
             <p:ph idx="1"/>
             <p:extLst>
               <p:ext uri="{D42A27DB-BD31-4B8C-83A1-F6EECF244321}">
-                <p14:modId xmlns:p14="http://schemas.microsoft.com/office/powerpoint/2010/main" val="2473427724"/>
+                <p14:modId xmlns:p14="http://schemas.microsoft.com/office/powerpoint/2010/main" val="785736043"/>
               </p:ext>
             </p:extLst>
           </p:nvPr>
         </p:nvGraphicFramePr>
         <p:xfrm>
-          <a:off x="628650" y="1510956"/>
-          <a:ext cx="7886700" cy="4666007"/>
+          <a:off x="628650" y="1137038"/>
+          <a:ext cx="7886700" cy="5039926"/>
         </p:xfrm>
         <a:graphic>
           <a:graphicData uri="http://schemas.openxmlformats.org/drawingml/2006/diagram">
@@ -19623,8 +19752,8 @@
         </p:blipFill>
         <p:spPr>
           <a:xfrm>
-            <a:off x="919530" y="5413785"/>
-            <a:ext cx="2295845" cy="600159"/>
+            <a:off x="3424078" y="5720962"/>
+            <a:ext cx="1855588" cy="485071"/>
           </a:xfrm>
           <a:prstGeom prst="rect">
             <a:avLst/>
@@ -19653,7 +19782,7 @@
         </p:blipFill>
         <p:spPr>
           <a:xfrm>
-            <a:off x="5883038" y="5466138"/>
+            <a:off x="6055250" y="4940609"/>
             <a:ext cx="1238423" cy="600159"/>
           </a:xfrm>
           <a:prstGeom prst="rect">
@@ -19713,7 +19842,7 @@
         </p:blipFill>
         <p:spPr>
           <a:xfrm>
-            <a:off x="7432490" y="3227951"/>
+            <a:off x="1867401" y="5002215"/>
             <a:ext cx="975331" cy="1077105"/>
           </a:xfrm>
           <a:prstGeom prst="rect">
@@ -19743,7 +19872,7 @@
         </p:blipFill>
         <p:spPr>
           <a:xfrm>
-            <a:off x="1573430" y="2937713"/>
+            <a:off x="1867401" y="2530773"/>
             <a:ext cx="685896" cy="619211"/>
           </a:xfrm>
           <a:prstGeom prst="rect">
@@ -19773,8 +19902,38 @@
         </p:blipFill>
         <p:spPr>
           <a:xfrm>
-            <a:off x="4866264" y="1617311"/>
+            <a:off x="2786994" y="1231676"/>
             <a:ext cx="1490743" cy="571580"/>
+          </a:xfrm>
+          <a:prstGeom prst="rect">
+            <a:avLst/>
+          </a:prstGeom>
+        </p:spPr>
+      </p:pic>
+      <p:pic>
+        <p:nvPicPr>
+          <p:cNvPr id="4" name="Picture 3" descr="A close up of a logo&#10;&#10;Description automatically generated">
+            <a:extLst>
+              <a:ext uri="{FF2B5EF4-FFF2-40B4-BE49-F238E27FC236}">
+                <a16:creationId xmlns:a16="http://schemas.microsoft.com/office/drawing/2014/main" id="{0CE6E76B-6C22-F1F9-607A-361FE7B0D800}"/>
+              </a:ext>
+            </a:extLst>
+          </p:cNvPr>
+          <p:cNvPicPr>
+            <a:picLocks noChangeAspect="1"/>
+          </p:cNvPicPr>
+          <p:nvPr/>
+        </p:nvPicPr>
+        <p:blipFill>
+          <a:blip r:embed="rId16"/>
+          <a:stretch>
+            <a:fillRect/>
+          </a:stretch>
+        </p:blipFill>
+        <p:spPr>
+          <a:xfrm>
+            <a:off x="919530" y="4157165"/>
+            <a:ext cx="1674561" cy="478446"/>
           </a:xfrm>
           <a:prstGeom prst="rect">
             <a:avLst/>

</xml_diff>

<commit_message>
work on READMEs and presentation
</commit_message>
<xml_diff>
--- a/presentation/DLStagePredictPresentation.pptx
+++ b/presentation/DLStagePredictPresentation.pptx
@@ -5,7 +5,7 @@
     <p:sldMasterId id="2147483660" r:id="rId1"/>
   </p:sldMasterIdLst>
   <p:notesMasterIdLst>
-    <p:notesMasterId r:id="rId23"/>
+    <p:notesMasterId r:id="rId26"/>
   </p:notesMasterIdLst>
   <p:sldIdLst>
     <p:sldId id="256" r:id="rId2"/>
@@ -29,6 +29,9 @@
     <p:sldId id="277" r:id="rId20"/>
     <p:sldId id="279" r:id="rId21"/>
     <p:sldId id="265" r:id="rId22"/>
+    <p:sldId id="295" r:id="rId23"/>
+    <p:sldId id="294" r:id="rId24"/>
+    <p:sldId id="293" r:id="rId25"/>
   </p:sldIdLst>
   <p:sldSz cx="9144000" cy="6858000" type="screen4x3"/>
   <p:notesSz cx="6858000" cy="9144000"/>
@@ -9883,7 +9886,7 @@
         </p:spPr>
         <p:txBody>
           <a:bodyPr>
-            <a:normAutofit fontScale="90000"/>
+            <a:normAutofit/>
           </a:bodyPr>
           <a:lstStyle/>
           <a:p>
@@ -15124,7 +15127,7 @@
         </p:spPr>
         <p:txBody>
           <a:bodyPr anchor="b">
-            <a:normAutofit fontScale="90000"/>
+            <a:normAutofit/>
           </a:bodyPr>
           <a:lstStyle/>
           <a:p>
@@ -19214,7 +19217,7 @@
         </p:spPr>
         <p:txBody>
           <a:bodyPr anchor="b">
-            <a:normAutofit fontScale="90000"/>
+            <a:normAutofit/>
           </a:bodyPr>
           <a:lstStyle/>
           <a:p>
@@ -20611,7 +20614,7 @@
         </p:spPr>
         <p:txBody>
           <a:bodyPr vert="horz" lIns="91440" tIns="45720" rIns="91440" bIns="45720" rtlCol="0" anchor="ctr">
-            <a:normAutofit fontScale="62500" lnSpcReduction="20000"/>
+            <a:normAutofit fontScale="77500" lnSpcReduction="20000"/>
           </a:bodyPr>
           <a:lstStyle/>
           <a:p>
@@ -22539,7 +22542,7 @@
         </p:spPr>
         <p:txBody>
           <a:bodyPr anchor="ctr">
-            <a:normAutofit fontScale="70000" lnSpcReduction="20000"/>
+            <a:normAutofit fontScale="77500" lnSpcReduction="20000"/>
           </a:bodyPr>
           <a:lstStyle/>
           <a:p>
@@ -23560,6 +23563,790 @@
 </p:sld>
 </file>
 
+<file path=ppt/slides/slide22.xml><?xml version="1.0" encoding="utf-8"?>
+<p:sld xmlns:a="http://schemas.openxmlformats.org/drawingml/2006/main" xmlns:r="http://schemas.openxmlformats.org/officeDocument/2006/relationships" xmlns:p="http://schemas.openxmlformats.org/presentationml/2006/main">
+  <p:cSld>
+    <p:bg>
+      <p:bgRef idx="1003">
+        <a:schemeClr val="bg2"/>
+      </p:bgRef>
+    </p:bg>
+    <p:spTree>
+      <p:nvGrpSpPr>
+        <p:cNvPr id="1" name="">
+          <a:extLst>
+            <a:ext uri="{FF2B5EF4-FFF2-40B4-BE49-F238E27FC236}">
+              <a16:creationId xmlns:a16="http://schemas.microsoft.com/office/drawing/2014/main" id="{6A8D98C6-2E6A-A3BC-9EAD-306A3795FFE8}"/>
+            </a:ext>
+          </a:extLst>
+        </p:cNvPr>
+        <p:cNvGrpSpPr/>
+        <p:nvPr/>
+      </p:nvGrpSpPr>
+      <p:grpSpPr>
+        <a:xfrm>
+          <a:off x="0" y="0"/>
+          <a:ext cx="0" cy="0"/>
+          <a:chOff x="0" y="0"/>
+          <a:chExt cx="0" cy="0"/>
+        </a:xfrm>
+      </p:grpSpPr>
+      <p:sp>
+        <p:nvSpPr>
+          <p:cNvPr id="2" name="Title 1">
+            <a:extLst>
+              <a:ext uri="{FF2B5EF4-FFF2-40B4-BE49-F238E27FC236}">
+                <a16:creationId xmlns:a16="http://schemas.microsoft.com/office/drawing/2014/main" id="{4CD0DBC2-2468-1D46-8CCC-A425993151CC}"/>
+              </a:ext>
+            </a:extLst>
+          </p:cNvPr>
+          <p:cNvSpPr>
+            <a:spLocks noGrp="1"/>
+          </p:cNvSpPr>
+          <p:nvPr>
+            <p:ph type="title"/>
+          </p:nvPr>
+        </p:nvSpPr>
+        <p:spPr>
+          <a:xfrm>
+            <a:off x="460237" y="229444"/>
+            <a:ext cx="8223525" cy="413809"/>
+          </a:xfrm>
+        </p:spPr>
+        <p:txBody>
+          <a:bodyPr anchor="b">
+            <a:normAutofit fontScale="90000"/>
+          </a:bodyPr>
+          <a:lstStyle/>
+          <a:p>
+            <a:pPr marL="0" lvl="0" indent="0">
+              <a:buNone/>
+            </a:pPr>
+            <a:r>
+              <a:rPr lang="en-US" sz="3500" dirty="0">
+                <a:solidFill>
+                  <a:srgbClr val="FFFFFF"/>
+                </a:solidFill>
+              </a:rPr>
+              <a:t>Challenges we faced and how we managed</a:t>
+            </a:r>
+          </a:p>
+        </p:txBody>
+      </p:sp>
+      <p:sp>
+        <p:nvSpPr>
+          <p:cNvPr id="3" name="Content Placeholder 2">
+            <a:extLst>
+              <a:ext uri="{FF2B5EF4-FFF2-40B4-BE49-F238E27FC236}">
+                <a16:creationId xmlns:a16="http://schemas.microsoft.com/office/drawing/2014/main" id="{C8071A2F-80C2-00F9-7C7D-A84E5CAE2B72}"/>
+              </a:ext>
+            </a:extLst>
+          </p:cNvPr>
+          <p:cNvSpPr>
+            <a:spLocks noGrp="1"/>
+          </p:cNvSpPr>
+          <p:nvPr>
+            <p:ph idx="1"/>
+          </p:nvPr>
+        </p:nvSpPr>
+        <p:spPr>
+          <a:xfrm>
+            <a:off x="2164005" y="820288"/>
+            <a:ext cx="6023993" cy="1185389"/>
+          </a:xfrm>
+          <a:noFill/>
+        </p:spPr>
+        <p:txBody>
+          <a:bodyPr wrap="square" rtlCol="1">
+            <a:spAutoFit/>
+          </a:bodyPr>
+          <a:lstStyle/>
+          <a:p>
+            <a:pPr marL="0" indent="0" defTabSz="914400">
+              <a:buNone/>
+            </a:pPr>
+            <a:endParaRPr lang="en-US" sz="1600" dirty="0"/>
+          </a:p>
+          <a:p>
+            <a:pPr marL="0" indent="0" defTabSz="914400">
+              <a:buNone/>
+            </a:pPr>
+            <a:endParaRPr lang="en-US" sz="1600" dirty="0"/>
+          </a:p>
+          <a:p>
+            <a:pPr marL="0" indent="0" defTabSz="914400">
+              <a:buNone/>
+            </a:pPr>
+            <a:br>
+              <a:rPr lang="en-US" sz="1600" dirty="0"/>
+            </a:br>
+            <a:endParaRPr lang="en-US" sz="1600" dirty="0"/>
+          </a:p>
+        </p:txBody>
+      </p:sp>
+      <p:sp>
+        <p:nvSpPr>
+          <p:cNvPr id="5" name="TextBox 4">
+            <a:extLst>
+              <a:ext uri="{FF2B5EF4-FFF2-40B4-BE49-F238E27FC236}">
+                <a16:creationId xmlns:a16="http://schemas.microsoft.com/office/drawing/2014/main" id="{955AE793-2FF2-C686-5D53-22C9BD22FBB3}"/>
+              </a:ext>
+            </a:extLst>
+          </p:cNvPr>
+          <p:cNvSpPr txBox="1"/>
+          <p:nvPr/>
+        </p:nvSpPr>
+        <p:spPr>
+          <a:xfrm>
+            <a:off x="385011" y="747526"/>
+            <a:ext cx="8005010" cy="5709255"/>
+          </a:xfrm>
+          <a:prstGeom prst="rect">
+            <a:avLst/>
+          </a:prstGeom>
+          <a:noFill/>
+        </p:spPr>
+        <p:txBody>
+          <a:bodyPr wrap="square" rtlCol="0">
+            <a:spAutoFit/>
+          </a:bodyPr>
+          <a:lstStyle/>
+          <a:p>
+            <a:pPr marL="285750" indent="-285750">
+              <a:spcBef>
+                <a:spcPts val="1800"/>
+              </a:spcBef>
+              <a:spcAft>
+                <a:spcPts val="1200"/>
+              </a:spcAft>
+              <a:buFont typeface="Wingdings" panose="05000000000000000000" pitchFamily="2" charset="2"/>
+              <a:buChar char="q"/>
+            </a:pPr>
+            <a:r>
+              <a:rPr lang="en-US" sz="1600" dirty="0"/>
+              <a:t>Three different platforms – Windows , Linux and Mac to support</a:t>
+            </a:r>
+            <a:br>
+              <a:rPr lang="en-US" sz="1600" dirty="0"/>
+            </a:br>
+            <a:r>
+              <a:rPr lang="en-US" sz="1600" dirty="0"/>
+              <a:t>Different python versions , different development environments.</a:t>
+            </a:r>
+          </a:p>
+          <a:p>
+            <a:pPr marL="285750" indent="-285750">
+              <a:spcBef>
+                <a:spcPts val="1800"/>
+              </a:spcBef>
+              <a:spcAft>
+                <a:spcPts val="1200"/>
+              </a:spcAft>
+              <a:buFont typeface="Wingdings" panose="05000000000000000000" pitchFamily="2" charset="2"/>
+              <a:buChar char="q"/>
+            </a:pPr>
+            <a:r>
+              <a:rPr lang="en-US" sz="1600" dirty="0"/>
+              <a:t>First we kept a free-style phase – for everybody to learn and research and provide useful ideas. Requirement documents were created. Readme files in GitHub describing code structure , features and how to run</a:t>
+            </a:r>
+            <a:br>
+              <a:rPr lang="en-US" sz="1600" dirty="0"/>
+            </a:br>
+            <a:r>
+              <a:rPr lang="en-US" sz="1600" dirty="0"/>
+              <a:t>https://github.com/lmanov1/DL_DiabeticRetinopathyStagePrediction/tree/main</a:t>
+            </a:r>
+          </a:p>
+          <a:p>
+            <a:pPr marL="285750" indent="-285750">
+              <a:spcBef>
+                <a:spcPts val="1800"/>
+              </a:spcBef>
+              <a:spcAft>
+                <a:spcPts val="1200"/>
+              </a:spcAft>
+              <a:buFont typeface="Wingdings" panose="05000000000000000000" pitchFamily="2" charset="2"/>
+              <a:buChar char="q"/>
+            </a:pPr>
+            <a:r>
+              <a:rPr lang="en-US" sz="1600" dirty="0"/>
+              <a:t>Starting from this point and on – subsequent results synchronization was done via shared drive location:  in shared document , including pre-agreed set of metrics for unified comparison criteria and notebooks</a:t>
+            </a:r>
+          </a:p>
+          <a:p>
+            <a:pPr marL="285750" indent="-285750">
+              <a:spcBef>
+                <a:spcPts val="1800"/>
+              </a:spcBef>
+              <a:spcAft>
+                <a:spcPts val="1200"/>
+              </a:spcAft>
+              <a:buFont typeface="Wingdings" panose="05000000000000000000" pitchFamily="2" charset="2"/>
+              <a:buChar char="q"/>
+            </a:pPr>
+            <a:r>
+              <a:rPr lang="en-US" sz="1600" dirty="0"/>
+              <a:t>Widely agreed code kept in GitHub, features development managed in branches and with follow up using GitHub issues and conversations.</a:t>
+            </a:r>
+          </a:p>
+          <a:p>
+            <a:pPr marL="285750" indent="-285750">
+              <a:spcBef>
+                <a:spcPts val="1800"/>
+              </a:spcBef>
+              <a:spcAft>
+                <a:spcPts val="1200"/>
+              </a:spcAft>
+              <a:buFont typeface="Wingdings" panose="05000000000000000000" pitchFamily="2" charset="2"/>
+              <a:buChar char="q"/>
+            </a:pPr>
+            <a:r>
+              <a:rPr lang="en-US" sz="1600" dirty="0"/>
+              <a:t>As training is very heavy  – subsequent models were run on AWS Jupiter machine as most of us have no GPU or not enough memory resources @ dev environment. </a:t>
+            </a:r>
+          </a:p>
+          <a:p>
+            <a:pPr marL="285750" indent="-285750">
+              <a:spcBef>
+                <a:spcPts val="1800"/>
+              </a:spcBef>
+              <a:spcAft>
+                <a:spcPts val="1200"/>
+              </a:spcAft>
+              <a:buFont typeface="Wingdings" panose="05000000000000000000" pitchFamily="2" charset="2"/>
+              <a:buChar char="q"/>
+            </a:pPr>
+            <a:r>
+              <a:rPr lang="en-US" sz="1600" dirty="0"/>
+              <a:t>The results and performance evaluation are kept in shared document in drive. Multiple meetings kept , multiple hands-on sessions to solve problems</a:t>
+            </a:r>
+          </a:p>
+        </p:txBody>
+      </p:sp>
+    </p:spTree>
+    <p:extLst>
+      <p:ext uri="{BB962C8B-B14F-4D97-AF65-F5344CB8AC3E}">
+        <p14:creationId xmlns:p14="http://schemas.microsoft.com/office/powerpoint/2010/main" val="4267012293"/>
+      </p:ext>
+    </p:extLst>
+  </p:cSld>
+  <p:clrMapOvr>
+    <a:overrideClrMapping bg1="dk1" tx1="lt1" bg2="dk2" tx2="lt2" accent1="accent1" accent2="accent2" accent3="accent3" accent4="accent4" accent5="accent5" accent6="accent6" hlink="hlink" folHlink="folHlink"/>
+  </p:clrMapOvr>
+</p:sld>
+</file>
+
+<file path=ppt/slides/slide23.xml><?xml version="1.0" encoding="utf-8"?>
+<p:sld xmlns:a="http://schemas.openxmlformats.org/drawingml/2006/main" xmlns:r="http://schemas.openxmlformats.org/officeDocument/2006/relationships" xmlns:p="http://schemas.openxmlformats.org/presentationml/2006/main">
+  <p:cSld>
+    <p:spTree>
+      <p:nvGrpSpPr>
+        <p:cNvPr id="1" name="">
+          <a:extLst>
+            <a:ext uri="{FF2B5EF4-FFF2-40B4-BE49-F238E27FC236}">
+              <a16:creationId xmlns:a16="http://schemas.microsoft.com/office/drawing/2014/main" id="{FD2A5F1C-55C6-EEE6-65BF-8074D2AAD726}"/>
+            </a:ext>
+          </a:extLst>
+        </p:cNvPr>
+        <p:cNvGrpSpPr/>
+        <p:nvPr/>
+      </p:nvGrpSpPr>
+      <p:grpSpPr>
+        <a:xfrm>
+          <a:off x="0" y="0"/>
+          <a:ext cx="0" cy="0"/>
+          <a:chOff x="0" y="0"/>
+          <a:chExt cx="0" cy="0"/>
+        </a:xfrm>
+      </p:grpSpPr>
+      <p:sp>
+        <p:nvSpPr>
+          <p:cNvPr id="2" name="Title 1">
+            <a:extLst>
+              <a:ext uri="{FF2B5EF4-FFF2-40B4-BE49-F238E27FC236}">
+                <a16:creationId xmlns:a16="http://schemas.microsoft.com/office/drawing/2014/main" id="{DC690A85-4F49-AB95-9824-E1E9A0A0DAC1}"/>
+              </a:ext>
+            </a:extLst>
+          </p:cNvPr>
+          <p:cNvSpPr>
+            <a:spLocks noGrp="1"/>
+          </p:cNvSpPr>
+          <p:nvPr>
+            <p:ph type="title"/>
+          </p:nvPr>
+        </p:nvSpPr>
+        <p:spPr>
+          <a:xfrm>
+            <a:off x="350979" y="355458"/>
+            <a:ext cx="8223525" cy="413809"/>
+          </a:xfrm>
+        </p:spPr>
+        <p:txBody>
+          <a:bodyPr anchor="b">
+            <a:normAutofit fontScale="90000"/>
+          </a:bodyPr>
+          <a:lstStyle/>
+          <a:p>
+            <a:pPr marL="0" lvl="0" indent="0">
+              <a:buNone/>
+            </a:pPr>
+            <a:r>
+              <a:rPr lang="en-US" sz="3500" dirty="0">
+                <a:solidFill>
+                  <a:srgbClr val="FFFFFF"/>
+                </a:solidFill>
+              </a:rPr>
+              <a:t>Stretch features </a:t>
+            </a:r>
+          </a:p>
+        </p:txBody>
+      </p:sp>
+      <p:sp>
+        <p:nvSpPr>
+          <p:cNvPr id="5" name="TextBox 4">
+            <a:extLst>
+              <a:ext uri="{FF2B5EF4-FFF2-40B4-BE49-F238E27FC236}">
+                <a16:creationId xmlns:a16="http://schemas.microsoft.com/office/drawing/2014/main" id="{29DF15F7-711F-D84A-EA60-9BC6BD3EB7A0}"/>
+              </a:ext>
+            </a:extLst>
+          </p:cNvPr>
+          <p:cNvSpPr txBox="1"/>
+          <p:nvPr/>
+        </p:nvSpPr>
+        <p:spPr>
+          <a:xfrm>
+            <a:off x="625641" y="1379621"/>
+            <a:ext cx="7948863" cy="2569934"/>
+          </a:xfrm>
+          <a:prstGeom prst="rect">
+            <a:avLst/>
+          </a:prstGeom>
+          <a:noFill/>
+        </p:spPr>
+        <p:txBody>
+          <a:bodyPr wrap="square" rtlCol="0">
+            <a:spAutoFit/>
+          </a:bodyPr>
+          <a:lstStyle/>
+          <a:p>
+            <a:pPr algn="l">
+              <a:spcBef>
+                <a:spcPts val="1800"/>
+              </a:spcBef>
+              <a:spcAft>
+                <a:spcPts val="1200"/>
+              </a:spcAft>
+            </a:pPr>
+            <a:r>
+              <a:rPr lang="en-US" b="1" i="0" dirty="0">
+                <a:solidFill>
+                  <a:srgbClr val="DADADA"/>
+                </a:solidFill>
+                <a:effectLst/>
+                <a:latin typeface="-apple-system"/>
+              </a:rPr>
+              <a:t>LLM Assistant Integration</a:t>
+            </a:r>
+          </a:p>
+          <a:p>
+            <a:pPr algn="l">
+              <a:buFont typeface="Arial" panose="020B0604020202020204" pitchFamily="34" charset="0"/>
+              <a:buChar char="•"/>
+            </a:pPr>
+            <a:r>
+              <a:rPr lang="en-US" b="0" i="0" dirty="0">
+                <a:solidFill>
+                  <a:srgbClr val="DADADA"/>
+                </a:solidFill>
+                <a:effectLst/>
+                <a:latin typeface="-apple-system"/>
+              </a:rPr>
+              <a:t>Integrate an LLM assistant to act as a virtual doctor.</a:t>
+            </a:r>
+          </a:p>
+          <a:p>
+            <a:pPr algn="l">
+              <a:buFont typeface="Arial" panose="020B0604020202020204" pitchFamily="34" charset="0"/>
+              <a:buChar char="•"/>
+            </a:pPr>
+            <a:r>
+              <a:rPr lang="en-US" b="0" i="0" dirty="0">
+                <a:solidFill>
+                  <a:srgbClr val="DADADA"/>
+                </a:solidFill>
+                <a:effectLst/>
+                <a:latin typeface="-apple-system"/>
+              </a:rPr>
+              <a:t>Implement functionalities for anamnesis, analysis, and providing recommendations.</a:t>
+            </a:r>
+          </a:p>
+          <a:p>
+            <a:pPr algn="l">
+              <a:spcBef>
+                <a:spcPts val="1800"/>
+              </a:spcBef>
+              <a:spcAft>
+                <a:spcPts val="1200"/>
+              </a:spcAft>
+            </a:pPr>
+            <a:r>
+              <a:rPr lang="en-US" b="1" i="0" dirty="0">
+                <a:solidFill>
+                  <a:srgbClr val="DADADA"/>
+                </a:solidFill>
+                <a:effectLst/>
+                <a:latin typeface="-apple-system"/>
+              </a:rPr>
+              <a:t>Additional Disease Classification</a:t>
+            </a:r>
+          </a:p>
+          <a:p>
+            <a:pPr algn="l">
+              <a:buFont typeface="Arial" panose="020B0604020202020204" pitchFamily="34" charset="0"/>
+              <a:buChar char="•"/>
+            </a:pPr>
+            <a:r>
+              <a:rPr lang="en-US" b="0" i="0" dirty="0">
+                <a:solidFill>
+                  <a:srgbClr val="DADADA"/>
+                </a:solidFill>
+                <a:effectLst/>
+                <a:latin typeface="-apple-system"/>
+              </a:rPr>
+              <a:t>Extend the model to classify other eye diseases like cataracts and glaucoma.</a:t>
+            </a:r>
+          </a:p>
+          <a:p>
+            <a:pPr algn="l">
+              <a:buFont typeface="Arial" panose="020B0604020202020204" pitchFamily="34" charset="0"/>
+              <a:buChar char="•"/>
+            </a:pPr>
+            <a:r>
+              <a:rPr lang="en-US" b="0" i="0" dirty="0">
+                <a:solidFill>
+                  <a:srgbClr val="DADADA"/>
+                </a:solidFill>
+                <a:effectLst/>
+                <a:latin typeface="-apple-system"/>
+              </a:rPr>
+              <a:t>Adjust the label set and retrain the model accordingly.</a:t>
+            </a:r>
+          </a:p>
+        </p:txBody>
+      </p:sp>
+    </p:spTree>
+    <p:extLst>
+      <p:ext uri="{BB962C8B-B14F-4D97-AF65-F5344CB8AC3E}">
+        <p14:creationId xmlns:p14="http://schemas.microsoft.com/office/powerpoint/2010/main" val="3512940346"/>
+      </p:ext>
+    </p:extLst>
+  </p:cSld>
+  <p:clrMapOvr>
+    <a:masterClrMapping/>
+  </p:clrMapOvr>
+</p:sld>
+</file>
+
+<file path=ppt/slides/slide24.xml><?xml version="1.0" encoding="utf-8"?>
+<p:sld xmlns:a="http://schemas.openxmlformats.org/drawingml/2006/main" xmlns:r="http://schemas.openxmlformats.org/officeDocument/2006/relationships" xmlns:p="http://schemas.openxmlformats.org/presentationml/2006/main">
+  <p:cSld>
+    <p:spTree>
+      <p:nvGrpSpPr>
+        <p:cNvPr id="1" name="">
+          <a:extLst>
+            <a:ext uri="{FF2B5EF4-FFF2-40B4-BE49-F238E27FC236}">
+              <a16:creationId xmlns:a16="http://schemas.microsoft.com/office/drawing/2014/main" id="{3368C60D-F6EE-7DCA-7FEB-865F0DEFE550}"/>
+            </a:ext>
+          </a:extLst>
+        </p:cNvPr>
+        <p:cNvGrpSpPr/>
+        <p:nvPr/>
+      </p:nvGrpSpPr>
+      <p:grpSpPr>
+        <a:xfrm>
+          <a:off x="0" y="0"/>
+          <a:ext cx="0" cy="0"/>
+          <a:chOff x="0" y="0"/>
+          <a:chExt cx="0" cy="0"/>
+        </a:xfrm>
+      </p:grpSpPr>
+      <p:sp>
+        <p:nvSpPr>
+          <p:cNvPr id="2" name="Title 1">
+            <a:extLst>
+              <a:ext uri="{FF2B5EF4-FFF2-40B4-BE49-F238E27FC236}">
+                <a16:creationId xmlns:a16="http://schemas.microsoft.com/office/drawing/2014/main" id="{B900C467-F670-2A0E-C92C-116EE0338703}"/>
+              </a:ext>
+            </a:extLst>
+          </p:cNvPr>
+          <p:cNvSpPr>
+            <a:spLocks noGrp="1"/>
+          </p:cNvSpPr>
+          <p:nvPr>
+            <p:ph type="title"/>
+          </p:nvPr>
+        </p:nvSpPr>
+        <p:spPr>
+          <a:xfrm>
+            <a:off x="110349" y="85909"/>
+            <a:ext cx="8223525" cy="413809"/>
+          </a:xfrm>
+        </p:spPr>
+        <p:txBody>
+          <a:bodyPr anchor="b">
+            <a:normAutofit fontScale="90000"/>
+          </a:bodyPr>
+          <a:lstStyle/>
+          <a:p>
+            <a:pPr marL="0" lvl="0" indent="0">
+              <a:buNone/>
+            </a:pPr>
+            <a:r>
+              <a:rPr lang="en-US" sz="3500" dirty="0">
+                <a:solidFill>
+                  <a:srgbClr val="FFFFFF"/>
+                </a:solidFill>
+              </a:rPr>
+              <a:t>Side research done by team members </a:t>
+            </a:r>
+          </a:p>
+        </p:txBody>
+      </p:sp>
+      <p:sp>
+        <p:nvSpPr>
+          <p:cNvPr id="3" name="Content Placeholder 2">
+            <a:extLst>
+              <a:ext uri="{FF2B5EF4-FFF2-40B4-BE49-F238E27FC236}">
+                <a16:creationId xmlns:a16="http://schemas.microsoft.com/office/drawing/2014/main" id="{58410436-23D1-6555-A52D-1879FB31C3D5}"/>
+              </a:ext>
+            </a:extLst>
+          </p:cNvPr>
+          <p:cNvSpPr>
+            <a:spLocks noGrp="1"/>
+          </p:cNvSpPr>
+          <p:nvPr>
+            <p:ph idx="1"/>
+          </p:nvPr>
+        </p:nvSpPr>
+        <p:spPr>
+          <a:xfrm>
+            <a:off x="2164005" y="820288"/>
+            <a:ext cx="6023993" cy="1185389"/>
+          </a:xfrm>
+          <a:noFill/>
+        </p:spPr>
+        <p:txBody>
+          <a:bodyPr wrap="square" rtlCol="1">
+            <a:spAutoFit/>
+          </a:bodyPr>
+          <a:lstStyle/>
+          <a:p>
+            <a:pPr marL="0" indent="0" defTabSz="914400">
+              <a:buNone/>
+            </a:pPr>
+            <a:endParaRPr lang="en-US" sz="1600" dirty="0"/>
+          </a:p>
+          <a:p>
+            <a:pPr marL="0" indent="0" defTabSz="914400">
+              <a:buNone/>
+            </a:pPr>
+            <a:endParaRPr lang="en-US" sz="1600" dirty="0"/>
+          </a:p>
+          <a:p>
+            <a:pPr marL="0" indent="0" defTabSz="914400">
+              <a:buNone/>
+            </a:pPr>
+            <a:br>
+              <a:rPr lang="en-US" sz="1600" dirty="0"/>
+            </a:br>
+            <a:endParaRPr lang="en-US" sz="1600" dirty="0"/>
+          </a:p>
+        </p:txBody>
+      </p:sp>
+      <p:sp>
+        <p:nvSpPr>
+          <p:cNvPr id="4" name="TextBox 3">
+            <a:extLst>
+              <a:ext uri="{FF2B5EF4-FFF2-40B4-BE49-F238E27FC236}">
+                <a16:creationId xmlns:a16="http://schemas.microsoft.com/office/drawing/2014/main" id="{7EE7AC66-20DA-6F80-5996-200520C1E745}"/>
+              </a:ext>
+            </a:extLst>
+          </p:cNvPr>
+          <p:cNvSpPr txBox="1"/>
+          <p:nvPr/>
+        </p:nvSpPr>
+        <p:spPr>
+          <a:xfrm>
+            <a:off x="268706" y="762001"/>
+            <a:ext cx="8606588" cy="3970318"/>
+          </a:xfrm>
+          <a:prstGeom prst="rect">
+            <a:avLst/>
+          </a:prstGeom>
+          <a:noFill/>
+        </p:spPr>
+        <p:txBody>
+          <a:bodyPr wrap="square" rtlCol="0">
+            <a:spAutoFit/>
+          </a:bodyPr>
+          <a:lstStyle/>
+          <a:p>
+            <a:r>
+              <a:rPr lang="en-US" dirty="0"/>
+              <a:t>Features that team implemented but was not merged into main branch</a:t>
+            </a:r>
+          </a:p>
+          <a:p>
+            <a:pPr marL="285750" indent="-285750">
+              <a:buFont typeface="Arial" panose="020B0604020202020204" pitchFamily="34" charset="0"/>
+              <a:buChar char="•"/>
+            </a:pPr>
+            <a:endParaRPr lang="en-US" dirty="0"/>
+          </a:p>
+          <a:p>
+            <a:pPr marL="285750" indent="-285750">
+              <a:buFont typeface="Wingdings" panose="05000000000000000000" pitchFamily="2" charset="2"/>
+              <a:buChar char="q"/>
+            </a:pPr>
+            <a:r>
+              <a:rPr lang="en-US" dirty="0"/>
+              <a:t>Fine tuning with Lr find </a:t>
+            </a:r>
+          </a:p>
+          <a:p>
+            <a:pPr marL="285750" indent="-285750">
+              <a:buFont typeface="Wingdings" panose="05000000000000000000" pitchFamily="2" charset="2"/>
+              <a:buChar char="q"/>
+            </a:pPr>
+            <a:r>
+              <a:rPr lang="en-US" dirty="0"/>
+              <a:t>Custom (accumulating) recall  and f1 as fast ai’s learner metrics for loss function</a:t>
+            </a:r>
+          </a:p>
+          <a:p>
+            <a:pPr marL="285750" indent="-285750">
+              <a:buFont typeface="Wingdings" panose="05000000000000000000" pitchFamily="2" charset="2"/>
+              <a:buChar char="q"/>
+            </a:pPr>
+            <a:r>
+              <a:rPr lang="en-US" dirty="0" err="1"/>
+              <a:t>Keras</a:t>
+            </a:r>
+            <a:r>
+              <a:rPr lang="en-US" dirty="0"/>
+              <a:t> models , mapping </a:t>
+            </a:r>
+            <a:r>
+              <a:rPr lang="en-US" dirty="0" err="1"/>
+              <a:t>keras</a:t>
+            </a:r>
+            <a:r>
+              <a:rPr lang="en-US" dirty="0"/>
+              <a:t> models to torch format with ONNX</a:t>
+            </a:r>
+          </a:p>
+          <a:p>
+            <a:pPr marL="285750" indent="-285750">
+              <a:buFont typeface="Wingdings" panose="05000000000000000000" pitchFamily="2" charset="2"/>
+              <a:buChar char="q"/>
+            </a:pPr>
+            <a:r>
+              <a:rPr lang="en-US" dirty="0"/>
+              <a:t>Upscaling images with </a:t>
+            </a:r>
+            <a:r>
+              <a:rPr lang="en-US" dirty="0" err="1"/>
+              <a:t>Optuna</a:t>
+            </a:r>
+            <a:endParaRPr lang="en-US" dirty="0"/>
+          </a:p>
+          <a:p>
+            <a:pPr marL="285750" indent="-285750">
+              <a:buFont typeface="Wingdings" panose="05000000000000000000" pitchFamily="2" charset="2"/>
+              <a:buChar char="q"/>
+            </a:pPr>
+            <a:r>
+              <a:rPr lang="en-US" dirty="0"/>
+              <a:t>Web application (EU uploading images for inference remotely), as an addition to a Hagging Face space for inference and evaluation</a:t>
+            </a:r>
+          </a:p>
+          <a:p>
+            <a:pPr marL="285750" indent="-285750">
+              <a:buFont typeface="Wingdings" panose="05000000000000000000" pitchFamily="2" charset="2"/>
+              <a:buChar char="q"/>
+            </a:pPr>
+            <a:r>
+              <a:rPr lang="en-US" dirty="0"/>
+              <a:t>Class weighs also for learner’s loss function </a:t>
+            </a:r>
+          </a:p>
+          <a:p>
+            <a:pPr marL="285750" indent="-285750">
+              <a:buFont typeface="Wingdings" panose="05000000000000000000" pitchFamily="2" charset="2"/>
+              <a:buChar char="q"/>
+            </a:pPr>
+            <a:r>
+              <a:rPr lang="en-US" dirty="0"/>
+              <a:t>Configuration and argparser for different options like class </a:t>
+            </a:r>
+            <a:r>
+              <a:rPr lang="en-US" dirty="0" err="1"/>
+              <a:t>weigths</a:t>
+            </a:r>
+            <a:r>
+              <a:rPr lang="en-US" dirty="0"/>
+              <a:t> handling (yes/no) , used  dataset , explicit model to load, evaluation or training modes , model format to use , so on</a:t>
+            </a:r>
+          </a:p>
+          <a:p>
+            <a:pPr marL="285750" indent="-285750">
+              <a:buFont typeface="Wingdings" panose="05000000000000000000" pitchFamily="2" charset="2"/>
+              <a:buChar char="q"/>
+            </a:pPr>
+            <a:r>
+              <a:rPr lang="en-US" dirty="0"/>
+              <a:t>Custom data preprocessing pipeline with sharpen/denoise/Laplacian sharpen/</a:t>
+            </a:r>
+            <a:r>
+              <a:rPr lang="en-US" dirty="0" err="1"/>
+              <a:t>high_pass_filter</a:t>
+            </a:r>
+            <a:r>
+              <a:rPr lang="en-US" dirty="0"/>
+              <a:t>/</a:t>
+            </a:r>
+            <a:r>
+              <a:rPr lang="en-US" dirty="0" err="1"/>
+              <a:t>enhance_contrast</a:t>
+            </a:r>
+            <a:r>
+              <a:rPr lang="en-US" dirty="0"/>
+              <a:t>/</a:t>
+            </a:r>
+            <a:r>
+              <a:rPr lang="en-US" dirty="0" err="1"/>
+              <a:t>adjust_gamma</a:t>
+            </a:r>
+            <a:r>
+              <a:rPr lang="en-US" dirty="0"/>
+              <a:t>/clamp</a:t>
+            </a:r>
+          </a:p>
+        </p:txBody>
+      </p:sp>
+    </p:spTree>
+    <p:extLst>
+      <p:ext uri="{BB962C8B-B14F-4D97-AF65-F5344CB8AC3E}">
+        <p14:creationId xmlns:p14="http://schemas.microsoft.com/office/powerpoint/2010/main" val="1062940968"/>
+      </p:ext>
+    </p:extLst>
+  </p:cSld>
+  <p:clrMapOvr>
+    <a:masterClrMapping/>
+  </p:clrMapOvr>
+</p:sld>
+</file>
+
 <file path=ppt/slides/slide3.xml><?xml version="1.0" encoding="utf-8"?>
 <p:sld xmlns:a="http://schemas.openxmlformats.org/drawingml/2006/main" xmlns:r="http://schemas.openxmlformats.org/officeDocument/2006/relationships" xmlns:p="http://schemas.openxmlformats.org/presentationml/2006/main">
   <p:cSld>
@@ -24330,37 +25117,21 @@
             </a:pPr>
             <a:r>
               <a:rPr lang="en-US" dirty="0"/>
-              <a:t>       </a:t>
-            </a:r>
-            <a:r>
-              <a:rPr lang="en-US"/>
-              <a:t>2 - Moderate </a:t>
+              <a:t>       2 - Moderate </a:t>
             </a:r>
             <a:br>
               <a:rPr lang="en-US" dirty="0"/>
             </a:br>
             <a:r>
               <a:rPr lang="en-US" dirty="0"/>
-              <a:t>       </a:t>
-            </a:r>
-            <a:r>
-              <a:rPr lang="en-US"/>
-              <a:t>3 - Severe</a:t>
+              <a:t>       3 - Severe</a:t>
             </a:r>
             <a:br>
               <a:rPr lang="en-US" dirty="0"/>
             </a:br>
             <a:r>
               <a:rPr lang="en-US" dirty="0"/>
-              <a:t>       </a:t>
-            </a:r>
-            <a:r>
-              <a:rPr lang="en-US"/>
-              <a:t>4  - Proliferative </a:t>
-            </a:r>
-            <a:r>
-              <a:rPr lang="en-US" dirty="0"/>
-              <a:t>DR</a:t>
+              <a:t>       4  - Proliferative DR</a:t>
             </a:r>
           </a:p>
           <a:p>
@@ -30042,4 +30813,47 @@
     </a:folHlink>
   </a:clrScheme>
 </a:themeOverride>
+</file>
+
+<file path=ppt/theme/themeOverride4.xml><?xml version="1.0" encoding="utf-8"?>
+<a:themeOverride xmlns:a="http://schemas.openxmlformats.org/drawingml/2006/main">
+  <a:clrScheme name="Office">
+    <a:dk1>
+      <a:sysClr val="windowText" lastClr="000000"/>
+    </a:dk1>
+    <a:lt1>
+      <a:sysClr val="window" lastClr="FFFFFF"/>
+    </a:lt1>
+    <a:dk2>
+      <a:srgbClr val="0E2841"/>
+    </a:dk2>
+    <a:lt2>
+      <a:srgbClr val="E8E8E8"/>
+    </a:lt2>
+    <a:accent1>
+      <a:srgbClr val="156082"/>
+    </a:accent1>
+    <a:accent2>
+      <a:srgbClr val="E97132"/>
+    </a:accent2>
+    <a:accent3>
+      <a:srgbClr val="196B24"/>
+    </a:accent3>
+    <a:accent4>
+      <a:srgbClr val="0F9ED5"/>
+    </a:accent4>
+    <a:accent5>
+      <a:srgbClr val="A02B93"/>
+    </a:accent5>
+    <a:accent6>
+      <a:srgbClr val="4EA72E"/>
+    </a:accent6>
+    <a:hlink>
+      <a:srgbClr val="467886"/>
+    </a:hlink>
+    <a:folHlink>
+      <a:srgbClr val="96607D"/>
+    </a:folHlink>
+  </a:clrScheme>
+</a:themeOverride>
 </file>
</xml_diff>

<commit_message>
added slides about team work and some code snippets
</commit_message>
<xml_diff>
--- a/presentation/DLStagePredictPresentation.pptx
+++ b/presentation/DLStagePredictPresentation.pptx
@@ -5,7 +5,7 @@
     <p:sldMasterId id="2147483660" r:id="rId1"/>
   </p:sldMasterIdLst>
   <p:notesMasterIdLst>
-    <p:notesMasterId r:id="rId26"/>
+    <p:notesMasterId r:id="rId31"/>
   </p:notesMasterIdLst>
   <p:sldIdLst>
     <p:sldId id="256" r:id="rId2"/>
@@ -32,6 +32,11 @@
     <p:sldId id="295" r:id="rId23"/>
     <p:sldId id="294" r:id="rId24"/>
     <p:sldId id="293" r:id="rId25"/>
+    <p:sldId id="296" r:id="rId26"/>
+    <p:sldId id="298" r:id="rId27"/>
+    <p:sldId id="297" r:id="rId28"/>
+    <p:sldId id="299" r:id="rId29"/>
+    <p:sldId id="300" r:id="rId30"/>
   </p:sldIdLst>
   <p:sldSz cx="9144000" cy="6858000" type="screen4x3"/>
   <p:notesSz cx="6858000" cy="9144000"/>
@@ -152,7 +157,7 @@
 <file path=ppt/charts/chart1.xml><?xml version="1.0" encoding="utf-8"?>
 <c:chartSpace xmlns:c="http://schemas.openxmlformats.org/drawingml/2006/chart" xmlns:a="http://schemas.openxmlformats.org/drawingml/2006/main" xmlns:r="http://schemas.openxmlformats.org/officeDocument/2006/relationships" xmlns:c16r2="http://schemas.microsoft.com/office/drawing/2015/06/chart">
   <c:date1904 val="0"/>
-  <c:lang val="en-US"/>
+  <c:lang val="he-IL"/>
   <c:roundedCorners val="0"/>
   <mc:AlternateContent xmlns:mc="http://schemas.openxmlformats.org/markup-compatibility/2006">
     <mc:Choice xmlns:c14="http://schemas.microsoft.com/office/drawing/2007/8/2/chart" Requires="c14">
@@ -189,6 +194,7 @@
           </a:p>
         </c:rich>
       </c:tx>
+      <c:layout/>
       <c:overlay val="0"/>
       <c:spPr>
         <a:noFill/>
@@ -214,7 +220,7 @@
               <a:cs typeface="+mn-cs"/>
             </a:defRPr>
           </a:pPr>
-          <a:endParaRPr lang="en-US"/>
+          <a:endParaRPr lang="he-IL"/>
         </a:p>
       </c:txPr>
     </c:title>
@@ -370,6 +376,7 @@
           <c:dLbls>
             <c:dLbl>
               <c:idx val="0"/>
+              <c:layout/>
               <c:dLblPos val="ctr"/>
               <c:showLegendKey val="0"/>
               <c:showVal val="0"/>
@@ -378,7 +385,9 @@
               <c:showPercent val="1"/>
               <c:showBubbleSize val="0"/>
               <c:extLst>
-                <c:ext xmlns:c15="http://schemas.microsoft.com/office/drawing/2012/chart" uri="{CE6537A1-D6FC-4f65-9D91-7224C49458BB}"/>
+                <c:ext xmlns:c15="http://schemas.microsoft.com/office/drawing/2012/chart" uri="{CE6537A1-D6FC-4f65-9D91-7224C49458BB}">
+                  <c15:layout/>
+                </c:ext>
                 <c:ext xmlns:c16="http://schemas.microsoft.com/office/drawing/2014/chart" uri="{C3380CC4-5D6E-409C-BE32-E72D297353CC}">
                   <c16:uniqueId val="{00000001-A0BE-4BCA-8E06-77C2644BE0B2}"/>
                 </c:ext>
@@ -386,6 +395,7 @@
             </c:dLbl>
             <c:dLbl>
               <c:idx val="1"/>
+              <c:layout/>
               <c:dLblPos val="ctr"/>
               <c:showLegendKey val="0"/>
               <c:showVal val="0"/>
@@ -394,7 +404,9 @@
               <c:showPercent val="1"/>
               <c:showBubbleSize val="0"/>
               <c:extLst>
-                <c:ext xmlns:c15="http://schemas.microsoft.com/office/drawing/2012/chart" uri="{CE6537A1-D6FC-4f65-9D91-7224C49458BB}"/>
+                <c:ext xmlns:c15="http://schemas.microsoft.com/office/drawing/2012/chart" uri="{CE6537A1-D6FC-4f65-9D91-7224C49458BB}">
+                  <c15:layout/>
+                </c:ext>
                 <c:ext xmlns:c16="http://schemas.microsoft.com/office/drawing/2014/chart" uri="{C3380CC4-5D6E-409C-BE32-E72D297353CC}">
                   <c16:uniqueId val="{00000003-A0BE-4BCA-8E06-77C2644BE0B2}"/>
                 </c:ext>
@@ -402,6 +414,7 @@
             </c:dLbl>
             <c:dLbl>
               <c:idx val="2"/>
+              <c:layout/>
               <c:dLblPos val="ctr"/>
               <c:showLegendKey val="0"/>
               <c:showVal val="0"/>
@@ -410,7 +423,9 @@
               <c:showPercent val="1"/>
               <c:showBubbleSize val="0"/>
               <c:extLst>
-                <c:ext xmlns:c15="http://schemas.microsoft.com/office/drawing/2012/chart" uri="{CE6537A1-D6FC-4f65-9D91-7224C49458BB}"/>
+                <c:ext xmlns:c15="http://schemas.microsoft.com/office/drawing/2012/chart" uri="{CE6537A1-D6FC-4f65-9D91-7224C49458BB}">
+                  <c15:layout/>
+                </c:ext>
                 <c:ext xmlns:c16="http://schemas.microsoft.com/office/drawing/2014/chart" uri="{C3380CC4-5D6E-409C-BE32-E72D297353CC}">
                   <c16:uniqueId val="{00000005-A0BE-4BCA-8E06-77C2644BE0B2}"/>
                 </c:ext>
@@ -418,6 +433,7 @@
             </c:dLbl>
             <c:dLbl>
               <c:idx val="3"/>
+              <c:layout/>
               <c:dLblPos val="ctr"/>
               <c:showLegendKey val="0"/>
               <c:showVal val="0"/>
@@ -426,7 +442,9 @@
               <c:showPercent val="1"/>
               <c:showBubbleSize val="0"/>
               <c:extLst>
-                <c:ext xmlns:c15="http://schemas.microsoft.com/office/drawing/2012/chart" uri="{CE6537A1-D6FC-4f65-9D91-7224C49458BB}"/>
+                <c:ext xmlns:c15="http://schemas.microsoft.com/office/drawing/2012/chart" uri="{CE6537A1-D6FC-4f65-9D91-7224C49458BB}">
+                  <c15:layout/>
+                </c:ext>
                 <c:ext xmlns:c16="http://schemas.microsoft.com/office/drawing/2014/chart" uri="{C3380CC4-5D6E-409C-BE32-E72D297353CC}">
                   <c16:uniqueId val="{00000007-A0BE-4BCA-8E06-77C2644BE0B2}"/>
                 </c:ext>
@@ -434,6 +452,7 @@
             </c:dLbl>
             <c:dLbl>
               <c:idx val="4"/>
+              <c:layout/>
               <c:dLblPos val="ctr"/>
               <c:showLegendKey val="0"/>
               <c:showVal val="0"/>
@@ -442,7 +461,9 @@
               <c:showPercent val="1"/>
               <c:showBubbleSize val="0"/>
               <c:extLst>
-                <c:ext xmlns:c15="http://schemas.microsoft.com/office/drawing/2012/chart" uri="{CE6537A1-D6FC-4f65-9D91-7224C49458BB}"/>
+                <c:ext xmlns:c15="http://schemas.microsoft.com/office/drawing/2012/chart" uri="{CE6537A1-D6FC-4f65-9D91-7224C49458BB}">
+                  <c15:layout/>
+                </c:ext>
                 <c:ext xmlns:c16="http://schemas.microsoft.com/office/drawing/2014/chart" uri="{C3380CC4-5D6E-409C-BE32-E72D297353CC}">
                   <c16:uniqueId val="{00000009-A0BE-4BCA-8E06-77C2644BE0B2}"/>
                 </c:ext>
@@ -490,7 +511,7 @@
                     <a:cs typeface="+mn-cs"/>
                   </a:defRPr>
                 </a:pPr>
-                <a:endParaRPr lang="en-US"/>
+                <a:endParaRPr lang="he-IL"/>
               </a:p>
             </c:txPr>
             <c:dLblPos val="ctr"/>
@@ -617,6 +638,7 @@
     </c:plotArea>
     <c:legend>
       <c:legendPos val="r"/>
+      <c:layout/>
       <c:overlay val="0"/>
       <c:spPr>
         <a:solidFill>
@@ -647,7 +669,7 @@
               <a:cs typeface="+mn-cs"/>
             </a:defRPr>
           </a:pPr>
-          <a:endParaRPr lang="en-US"/>
+          <a:endParaRPr lang="he-IL"/>
         </a:p>
       </c:txPr>
     </c:legend>
@@ -693,7 +715,7 @@
       <a:pPr>
         <a:defRPr/>
       </a:pPr>
-      <a:endParaRPr lang="en-US"/>
+      <a:endParaRPr lang="he-IL"/>
     </a:p>
   </c:txPr>
   <c:externalData r:id="rId3">
@@ -705,7 +727,7 @@
 <file path=ppt/charts/chart2.xml><?xml version="1.0" encoding="utf-8"?>
 <c:chartSpace xmlns:c="http://schemas.openxmlformats.org/drawingml/2006/chart" xmlns:a="http://schemas.openxmlformats.org/drawingml/2006/main" xmlns:r="http://schemas.openxmlformats.org/officeDocument/2006/relationships" xmlns:c16r2="http://schemas.microsoft.com/office/drawing/2015/06/chart">
   <c:date1904 val="0"/>
-  <c:lang val="en-US"/>
+  <c:lang val="he-IL"/>
   <c:roundedCorners val="0"/>
   <mc:AlternateContent xmlns:mc="http://schemas.openxmlformats.org/markup-compatibility/2006">
     <mc:Choice xmlns:c14="http://schemas.microsoft.com/office/drawing/2007/8/2/chart" Requires="c14">
@@ -757,6 +779,7 @@
           </a:p>
         </c:rich>
       </c:tx>
+      <c:layout/>
       <c:overlay val="0"/>
       <c:spPr>
         <a:noFill/>
@@ -782,7 +805,7 @@
               <a:cs typeface="+mn-cs"/>
             </a:defRPr>
           </a:pPr>
-          <a:endParaRPr lang="en-US"/>
+          <a:endParaRPr lang="he-IL"/>
         </a:p>
       </c:txPr>
     </c:title>
@@ -1178,7 +1201,7 @@
                 <a:cs typeface="+mn-cs"/>
               </a:defRPr>
             </a:pPr>
-            <a:endParaRPr lang="en-US"/>
+            <a:endParaRPr lang="he-IL"/>
           </a:p>
         </c:txPr>
         <c:crossAx val="405927432"/>
@@ -1237,7 +1260,7 @@
                 <a:cs typeface="+mn-cs"/>
               </a:defRPr>
             </a:pPr>
-            <a:endParaRPr lang="en-US"/>
+            <a:endParaRPr lang="he-IL"/>
           </a:p>
         </c:txPr>
         <c:crossAx val="405925464"/>
@@ -1254,6 +1277,7 @@
     </c:plotArea>
     <c:legend>
       <c:legendPos val="b"/>
+      <c:layout/>
       <c:overlay val="0"/>
       <c:spPr>
         <a:noFill/>
@@ -1279,7 +1303,7 @@
               <a:cs typeface="+mn-cs"/>
             </a:defRPr>
           </a:pPr>
-          <a:endParaRPr lang="en-US"/>
+          <a:endParaRPr lang="he-IL"/>
         </a:p>
       </c:txPr>
     </c:legend>
@@ -1301,7 +1325,7 @@
       <a:pPr>
         <a:defRPr/>
       </a:pPr>
-      <a:endParaRPr lang="en-US"/>
+      <a:endParaRPr lang="he-IL"/>
     </a:p>
   </c:txPr>
   <c:externalData r:id="rId3">
@@ -1313,7 +1337,7 @@
 <file path=ppt/charts/chart3.xml><?xml version="1.0" encoding="utf-8"?>
 <c:chartSpace xmlns:c="http://schemas.openxmlformats.org/drawingml/2006/chart" xmlns:a="http://schemas.openxmlformats.org/drawingml/2006/main" xmlns:r="http://schemas.openxmlformats.org/officeDocument/2006/relationships" xmlns:c16r2="http://schemas.microsoft.com/office/drawing/2015/06/chart">
   <c:date1904 val="0"/>
-  <c:lang val="en-US"/>
+  <c:lang val="he-IL"/>
   <c:roundedCorners val="0"/>
   <mc:AlternateContent xmlns:mc="http://schemas.openxmlformats.org/markup-compatibility/2006">
     <mc:Choice xmlns:c14="http://schemas.microsoft.com/office/drawing/2007/8/2/chart" Requires="c14">
@@ -1357,6 +1381,7 @@
           </a:p>
         </c:rich>
       </c:tx>
+      <c:layout/>
       <c:overlay val="0"/>
       <c:spPr>
         <a:noFill/>
@@ -1382,7 +1407,7 @@
               <a:cs typeface="+mn-cs"/>
             </a:defRPr>
           </a:pPr>
-          <a:endParaRPr lang="en-US"/>
+          <a:endParaRPr lang="he-IL"/>
         </a:p>
       </c:txPr>
     </c:title>
@@ -1663,7 +1688,7 @@
                 <a:cs typeface="+mn-cs"/>
               </a:defRPr>
             </a:pPr>
-            <a:endParaRPr lang="en-US"/>
+            <a:endParaRPr lang="he-IL"/>
           </a:p>
         </c:txPr>
         <c:crossAx val="398011416"/>
@@ -1722,7 +1747,7 @@
                 <a:cs typeface="+mn-cs"/>
               </a:defRPr>
             </a:pPr>
-            <a:endParaRPr lang="en-US"/>
+            <a:endParaRPr lang="he-IL"/>
           </a:p>
         </c:txPr>
         <c:crossAx val="398007152"/>
@@ -1739,6 +1764,7 @@
     </c:plotArea>
     <c:legend>
       <c:legendPos val="b"/>
+      <c:layout/>
       <c:overlay val="0"/>
       <c:spPr>
         <a:noFill/>
@@ -1764,7 +1790,7 @@
               <a:cs typeface="+mn-cs"/>
             </a:defRPr>
           </a:pPr>
-          <a:endParaRPr lang="en-US"/>
+          <a:endParaRPr lang="he-IL"/>
         </a:p>
       </c:txPr>
     </c:legend>
@@ -1786,7 +1812,7 @@
       <a:pPr>
         <a:defRPr/>
       </a:pPr>
-      <a:endParaRPr lang="en-US"/>
+      <a:endParaRPr lang="he-IL"/>
     </a:p>
   </c:txPr>
   <c:externalData r:id="rId3">
@@ -4496,6 +4522,14 @@
         </dgm:presLayoutVars>
       </dgm:prSet>
       <dgm:spPr/>
+      <dgm:t>
+        <a:bodyPr/>
+        <a:lstStyle/>
+        <a:p>
+          <a:pPr rtl="1"/>
+          <a:endParaRPr lang="he-IL"/>
+        </a:p>
+      </dgm:t>
     </dgm:pt>
     <dgm:pt modelId="{01CAD946-1DD4-40A7-9DA6-52615E9ADED6}" type="pres">
       <dgm:prSet presAssocID="{E8E56CA6-9F04-4E81-80D5-95619793531F}" presName="arrow" presStyleLbl="node1" presStyleIdx="0" presStyleCnt="5">
@@ -4504,6 +4538,14 @@
         </dgm:presLayoutVars>
       </dgm:prSet>
       <dgm:spPr/>
+      <dgm:t>
+        <a:bodyPr/>
+        <a:lstStyle/>
+        <a:p>
+          <a:pPr rtl="1"/>
+          <a:endParaRPr lang="he-IL"/>
+        </a:p>
+      </dgm:t>
     </dgm:pt>
     <dgm:pt modelId="{23F492CB-6F38-4D04-A621-3B58790D4B31}" type="pres">
       <dgm:prSet presAssocID="{EEDB384F-584B-4300-AD05-FBD126D0D0F7}" presName="arrow" presStyleLbl="node1" presStyleIdx="1" presStyleCnt="5">
@@ -4512,6 +4554,14 @@
         </dgm:presLayoutVars>
       </dgm:prSet>
       <dgm:spPr/>
+      <dgm:t>
+        <a:bodyPr/>
+        <a:lstStyle/>
+        <a:p>
+          <a:pPr rtl="1"/>
+          <a:endParaRPr lang="he-IL"/>
+        </a:p>
+      </dgm:t>
     </dgm:pt>
     <dgm:pt modelId="{3FF1F6B0-65F5-4E3E-B641-EAE8677313E0}" type="pres">
       <dgm:prSet presAssocID="{3609D10D-2860-4DF2-90A4-2DFCFDDB9720}" presName="arrow" presStyleLbl="node1" presStyleIdx="2" presStyleCnt="5">
@@ -4520,6 +4570,14 @@
         </dgm:presLayoutVars>
       </dgm:prSet>
       <dgm:spPr/>
+      <dgm:t>
+        <a:bodyPr/>
+        <a:lstStyle/>
+        <a:p>
+          <a:pPr rtl="1"/>
+          <a:endParaRPr lang="he-IL"/>
+        </a:p>
+      </dgm:t>
     </dgm:pt>
     <dgm:pt modelId="{82C97E14-8FDC-4710-9E3A-51494F65106F}" type="pres">
       <dgm:prSet presAssocID="{FB1A8450-311E-4E54-98B4-05323A0F3583}" presName="arrow" presStyleLbl="node1" presStyleIdx="3" presStyleCnt="5">
@@ -4528,6 +4586,14 @@
         </dgm:presLayoutVars>
       </dgm:prSet>
       <dgm:spPr/>
+      <dgm:t>
+        <a:bodyPr/>
+        <a:lstStyle/>
+        <a:p>
+          <a:pPr rtl="1"/>
+          <a:endParaRPr lang="he-IL"/>
+        </a:p>
+      </dgm:t>
     </dgm:pt>
     <dgm:pt modelId="{B4B1D385-6942-48DF-97F3-65E4D9DA464B}" type="pres">
       <dgm:prSet presAssocID="{1C8F8774-1F99-4A05-8D0C-96457514C564}" presName="arrow" presStyleLbl="node1" presStyleIdx="4" presStyleCnt="5">
@@ -4536,20 +4602,28 @@
         </dgm:presLayoutVars>
       </dgm:prSet>
       <dgm:spPr/>
+      <dgm:t>
+        <a:bodyPr/>
+        <a:lstStyle/>
+        <a:p>
+          <a:pPr rtl="1"/>
+          <a:endParaRPr lang="he-IL"/>
+        </a:p>
+      </dgm:t>
     </dgm:pt>
   </dgm:ptLst>
   <dgm:cxnLst>
+    <dgm:cxn modelId="{DD3FB753-5626-4FC4-AA7A-E942188C1475}" srcId="{1A619692-C072-4B7C-B2E7-6914F809AAE1}" destId="{EEDB384F-584B-4300-AD05-FBD126D0D0F7}" srcOrd="1" destOrd="0" parTransId="{02065BBA-36CF-48B2-9935-FA91F3F3D2D1}" sibTransId="{493D87E8-92E6-4513-A4B5-498538C0E4AA}"/>
+    <dgm:cxn modelId="{B0BB7DBA-0C8A-4BD1-8F41-155D2C060096}" srcId="{1A619692-C072-4B7C-B2E7-6914F809AAE1}" destId="{FB1A8450-311E-4E54-98B4-05323A0F3583}" srcOrd="3" destOrd="0" parTransId="{C379BF5A-280D-4CBB-B3A1-D7A7CF63DFEA}" sibTransId="{E2B48603-4B4A-4E1A-B852-3BC35EDA9DD4}"/>
+    <dgm:cxn modelId="{ADEFCF4B-C6B2-406E-9582-7E9E303C17AE}" srcId="{1A619692-C072-4B7C-B2E7-6914F809AAE1}" destId="{1C8F8774-1F99-4A05-8D0C-96457514C564}" srcOrd="4" destOrd="0" parTransId="{41A39545-E255-4C17-981E-EA53A5A6D070}" sibTransId="{DFF80CA4-BC9C-488E-9373-93BAA7542F11}"/>
+    <dgm:cxn modelId="{2A63ADDF-3CE8-4574-AF8D-AC7A9B4DC0DF}" type="presOf" srcId="{E8E56CA6-9F04-4E81-80D5-95619793531F}" destId="{01CAD946-1DD4-40A7-9DA6-52615E9ADED6}" srcOrd="0" destOrd="0" presId="urn:microsoft.com/office/officeart/2005/8/layout/arrow5"/>
     <dgm:cxn modelId="{59B04020-2B56-4D5B-B820-82836049F1F0}" type="presOf" srcId="{1A619692-C072-4B7C-B2E7-6914F809AAE1}" destId="{402D4A58-F177-47D5-8B0C-1E81185BD834}" srcOrd="0" destOrd="0" presId="urn:microsoft.com/office/officeart/2005/8/layout/arrow5"/>
+    <dgm:cxn modelId="{EC402639-DD57-4012-AC3E-A47F349F84F9}" type="presOf" srcId="{EEDB384F-584B-4300-AD05-FBD126D0D0F7}" destId="{23F492CB-6F38-4D04-A621-3B58790D4B31}" srcOrd="0" destOrd="0" presId="urn:microsoft.com/office/officeart/2005/8/layout/arrow5"/>
+    <dgm:cxn modelId="{398789DB-A891-42CE-AA83-53C063345FF9}" srcId="{1A619692-C072-4B7C-B2E7-6914F809AAE1}" destId="{3609D10D-2860-4DF2-90A4-2DFCFDDB9720}" srcOrd="2" destOrd="0" parTransId="{DE798B44-BDBE-40E2-924A-C8B4B8AD5643}" sibTransId="{16088EC7-A389-435F-B58A-68EC5196D72D}"/>
+    <dgm:cxn modelId="{4EF97061-0759-4957-B861-A6905AC4A4CF}" srcId="{1A619692-C072-4B7C-B2E7-6914F809AAE1}" destId="{E8E56CA6-9F04-4E81-80D5-95619793531F}" srcOrd="0" destOrd="0" parTransId="{E21385E2-1D4D-49DE-ADB2-4B25B05B2E71}" sibTransId="{1D44072D-7BA8-4259-BF30-DA4528D49774}"/>
+    <dgm:cxn modelId="{F4EF70B0-88BF-4FFF-AB21-6B4908A5B159}" type="presOf" srcId="{3609D10D-2860-4DF2-90A4-2DFCFDDB9720}" destId="{3FF1F6B0-65F5-4E3E-B641-EAE8677313E0}" srcOrd="0" destOrd="0" presId="urn:microsoft.com/office/officeart/2005/8/layout/arrow5"/>
     <dgm:cxn modelId="{81564C36-910B-43E6-9CFD-D70EE62E565C}" type="presOf" srcId="{FB1A8450-311E-4E54-98B4-05323A0F3583}" destId="{82C97E14-8FDC-4710-9E3A-51494F65106F}" srcOrd="0" destOrd="0" presId="urn:microsoft.com/office/officeart/2005/8/layout/arrow5"/>
-    <dgm:cxn modelId="{EC402639-DD57-4012-AC3E-A47F349F84F9}" type="presOf" srcId="{EEDB384F-584B-4300-AD05-FBD126D0D0F7}" destId="{23F492CB-6F38-4D04-A621-3B58790D4B31}" srcOrd="0" destOrd="0" presId="urn:microsoft.com/office/officeart/2005/8/layout/arrow5"/>
-    <dgm:cxn modelId="{4EF97061-0759-4957-B861-A6905AC4A4CF}" srcId="{1A619692-C072-4B7C-B2E7-6914F809AAE1}" destId="{E8E56CA6-9F04-4E81-80D5-95619793531F}" srcOrd="0" destOrd="0" parTransId="{E21385E2-1D4D-49DE-ADB2-4B25B05B2E71}" sibTransId="{1D44072D-7BA8-4259-BF30-DA4528D49774}"/>
-    <dgm:cxn modelId="{ADEFCF4B-C6B2-406E-9582-7E9E303C17AE}" srcId="{1A619692-C072-4B7C-B2E7-6914F809AAE1}" destId="{1C8F8774-1F99-4A05-8D0C-96457514C564}" srcOrd="4" destOrd="0" parTransId="{41A39545-E255-4C17-981E-EA53A5A6D070}" sibTransId="{DFF80CA4-BC9C-488E-9373-93BAA7542F11}"/>
-    <dgm:cxn modelId="{DD3FB753-5626-4FC4-AA7A-E942188C1475}" srcId="{1A619692-C072-4B7C-B2E7-6914F809AAE1}" destId="{EEDB384F-584B-4300-AD05-FBD126D0D0F7}" srcOrd="1" destOrd="0" parTransId="{02065BBA-36CF-48B2-9935-FA91F3F3D2D1}" sibTransId="{493D87E8-92E6-4513-A4B5-498538C0E4AA}"/>
     <dgm:cxn modelId="{90DA0CAB-143E-4F88-A14B-A4975EDC44EB}" type="presOf" srcId="{1C8F8774-1F99-4A05-8D0C-96457514C564}" destId="{B4B1D385-6942-48DF-97F3-65E4D9DA464B}" srcOrd="0" destOrd="0" presId="urn:microsoft.com/office/officeart/2005/8/layout/arrow5"/>
-    <dgm:cxn modelId="{F4EF70B0-88BF-4FFF-AB21-6B4908A5B159}" type="presOf" srcId="{3609D10D-2860-4DF2-90A4-2DFCFDDB9720}" destId="{3FF1F6B0-65F5-4E3E-B641-EAE8677313E0}" srcOrd="0" destOrd="0" presId="urn:microsoft.com/office/officeart/2005/8/layout/arrow5"/>
-    <dgm:cxn modelId="{B0BB7DBA-0C8A-4BD1-8F41-155D2C060096}" srcId="{1A619692-C072-4B7C-B2E7-6914F809AAE1}" destId="{FB1A8450-311E-4E54-98B4-05323A0F3583}" srcOrd="3" destOrd="0" parTransId="{C379BF5A-280D-4CBB-B3A1-D7A7CF63DFEA}" sibTransId="{E2B48603-4B4A-4E1A-B852-3BC35EDA9DD4}"/>
-    <dgm:cxn modelId="{398789DB-A891-42CE-AA83-53C063345FF9}" srcId="{1A619692-C072-4B7C-B2E7-6914F809AAE1}" destId="{3609D10D-2860-4DF2-90A4-2DFCFDDB9720}" srcOrd="2" destOrd="0" parTransId="{DE798B44-BDBE-40E2-924A-C8B4B8AD5643}" sibTransId="{16088EC7-A389-435F-B58A-68EC5196D72D}"/>
-    <dgm:cxn modelId="{2A63ADDF-3CE8-4574-AF8D-AC7A9B4DC0DF}" type="presOf" srcId="{E8E56CA6-9F04-4E81-80D5-95619793531F}" destId="{01CAD946-1DD4-40A7-9DA6-52615E9ADED6}" srcOrd="0" destOrd="0" presId="urn:microsoft.com/office/officeart/2005/8/layout/arrow5"/>
     <dgm:cxn modelId="{5E5B46A6-A0A6-48F9-9FFD-8693AC7720EA}" type="presParOf" srcId="{402D4A58-F177-47D5-8B0C-1E81185BD834}" destId="{01CAD946-1DD4-40A7-9DA6-52615E9ADED6}" srcOrd="0" destOrd="0" presId="urn:microsoft.com/office/officeart/2005/8/layout/arrow5"/>
     <dgm:cxn modelId="{693EAAD9-4542-4362-8CE4-0652BDE0D134}" type="presParOf" srcId="{402D4A58-F177-47D5-8B0C-1E81185BD834}" destId="{23F492CB-6F38-4D04-A621-3B58790D4B31}" srcOrd="1" destOrd="0" presId="urn:microsoft.com/office/officeart/2005/8/layout/arrow5"/>
     <dgm:cxn modelId="{50910B30-AEE0-498F-9CD9-E89E4D7FFE9C}" type="presParOf" srcId="{402D4A58-F177-47D5-8B0C-1E81185BD834}" destId="{3FF1F6B0-65F5-4E3E-B641-EAE8677313E0}" srcOrd="2" destOrd="0" presId="urn:microsoft.com/office/officeart/2005/8/layout/arrow5"/>
@@ -4627,12 +4701,12 @@
         </a:fontRef>
       </dsp:style>
       <dsp:txBody>
-        <a:bodyPr spcFirstLastPara="0" vert="horz" wrap="square" lIns="71120" tIns="71120" rIns="71120" bIns="71120" numCol="1" spcCol="1270" anchor="ctr" anchorCtr="0">
+        <a:bodyPr spcFirstLastPara="0" vert="horz" wrap="square" lIns="64008" tIns="64008" rIns="64008" bIns="64008" numCol="1" spcCol="1270" anchor="ctr" anchorCtr="0">
           <a:noAutofit/>
         </a:bodyPr>
         <a:lstStyle/>
         <a:p>
-          <a:pPr marL="0" lvl="0" indent="0" algn="ctr" defTabSz="444500">
+          <a:pPr lvl="0" algn="ctr" defTabSz="400050">
             <a:lnSpc>
               <a:spcPct val="90000"/>
             </a:lnSpc>
@@ -4642,10 +4716,9 @@
             <a:spcAft>
               <a:spcPct val="35000"/>
             </a:spcAft>
-            <a:buNone/>
           </a:pPr>
           <a:r>
-            <a:rPr lang="en-US" sz="1000" kern="1200" dirty="0"/>
+            <a:rPr lang="en-US" sz="900" kern="1200" dirty="0"/>
             <a:t>Python</a:t>
           </a:r>
         </a:p>
@@ -4708,12 +4781,12 @@
         </a:fontRef>
       </dsp:style>
       <dsp:txBody>
-        <a:bodyPr spcFirstLastPara="0" vert="horz" wrap="square" lIns="71120" tIns="71120" rIns="71120" bIns="71120" numCol="1" spcCol="1270" anchor="ctr" anchorCtr="0">
+        <a:bodyPr spcFirstLastPara="0" vert="horz" wrap="square" lIns="64008" tIns="64008" rIns="64008" bIns="64008" numCol="1" spcCol="1270" anchor="ctr" anchorCtr="0">
           <a:noAutofit/>
         </a:bodyPr>
         <a:lstStyle/>
         <a:p>
-          <a:pPr marL="0" lvl="0" indent="0" algn="ctr" defTabSz="444500">
+          <a:pPr lvl="0" algn="ctr" defTabSz="400050">
             <a:lnSpc>
               <a:spcPct val="90000"/>
             </a:lnSpc>
@@ -4723,22 +4796,21 @@
             <a:spcAft>
               <a:spcPct val="35000"/>
             </a:spcAft>
-            <a:buNone/>
           </a:pPr>
           <a:r>
-            <a:rPr lang="en-US" sz="1000" kern="1200" dirty="0" err="1"/>
+            <a:rPr lang="en-US" sz="900" kern="1200" dirty="0" err="1"/>
             <a:t>FastAI</a:t>
           </a:r>
           <a:r>
-            <a:rPr lang="en-US" sz="1000" kern="1200" dirty="0"/>
+            <a:rPr lang="en-US" sz="900" kern="1200" dirty="0"/>
             <a:t>/</a:t>
           </a:r>
           <a:r>
-            <a:rPr lang="en-US" sz="1000" kern="1200" dirty="0" err="1"/>
+            <a:rPr lang="en-US" sz="900" kern="1200" dirty="0" err="1"/>
             <a:t>PyTorch</a:t>
           </a:r>
           <a:r>
-            <a:rPr lang="en-US" sz="1000" kern="1200" dirty="0"/>
+            <a:rPr lang="en-US" sz="900" kern="1200" dirty="0"/>
             <a:t> ecosystem</a:t>
           </a:r>
         </a:p>
@@ -4801,12 +4873,12 @@
         </a:fontRef>
       </dsp:style>
       <dsp:txBody>
-        <a:bodyPr spcFirstLastPara="0" vert="horz" wrap="square" lIns="71120" tIns="71120" rIns="71120" bIns="71120" numCol="1" spcCol="1270" anchor="ctr" anchorCtr="0">
+        <a:bodyPr spcFirstLastPara="0" vert="horz" wrap="square" lIns="64008" tIns="64008" rIns="64008" bIns="64008" numCol="1" spcCol="1270" anchor="ctr" anchorCtr="0">
           <a:noAutofit/>
         </a:bodyPr>
         <a:lstStyle/>
         <a:p>
-          <a:pPr marL="0" lvl="0" indent="0" algn="ctr" defTabSz="444500">
+          <a:pPr lvl="0" algn="ctr" defTabSz="400050">
             <a:lnSpc>
               <a:spcPct val="90000"/>
             </a:lnSpc>
@@ -4816,10 +4888,9 @@
             <a:spcAft>
               <a:spcPct val="35000"/>
             </a:spcAft>
-            <a:buNone/>
           </a:pPr>
           <a:r>
-            <a:rPr lang="en-US" sz="1000" kern="1200" dirty="0"/>
+            <a:rPr lang="en-US" sz="900" kern="1200" dirty="0"/>
             <a:t>Kaggle datasets</a:t>
           </a:r>
         </a:p>
@@ -4882,12 +4953,12 @@
         </a:fontRef>
       </dsp:style>
       <dsp:txBody>
-        <a:bodyPr spcFirstLastPara="0" vert="horz" wrap="square" lIns="71120" tIns="71120" rIns="71120" bIns="71120" numCol="1" spcCol="1270" anchor="ctr" anchorCtr="0">
+        <a:bodyPr spcFirstLastPara="0" vert="horz" wrap="square" lIns="64008" tIns="64008" rIns="64008" bIns="64008" numCol="1" spcCol="1270" anchor="ctr" anchorCtr="0">
           <a:noAutofit/>
         </a:bodyPr>
         <a:lstStyle/>
         <a:p>
-          <a:pPr marL="0" lvl="0" indent="0" algn="ctr" defTabSz="444500">
+          <a:pPr lvl="0" algn="ctr" defTabSz="400050">
             <a:lnSpc>
               <a:spcPct val="90000"/>
             </a:lnSpc>
@@ -4897,10 +4968,9 @@
             <a:spcAft>
               <a:spcPct val="35000"/>
             </a:spcAft>
-            <a:buNone/>
           </a:pPr>
           <a:r>
-            <a:rPr lang="en-US" sz="1000" kern="1200" dirty="0"/>
+            <a:rPr lang="en-US" sz="900" kern="1200" dirty="0"/>
             <a:t>Deployment: Hugging Face Spaces</a:t>
           </a:r>
         </a:p>
@@ -4963,12 +5033,12 @@
         </a:fontRef>
       </dsp:style>
       <dsp:txBody>
-        <a:bodyPr spcFirstLastPara="0" vert="horz" wrap="square" lIns="71120" tIns="71120" rIns="71120" bIns="71120" numCol="1" spcCol="1270" anchor="ctr" anchorCtr="0">
+        <a:bodyPr spcFirstLastPara="0" vert="horz" wrap="square" lIns="64008" tIns="64008" rIns="64008" bIns="64008" numCol="1" spcCol="1270" anchor="ctr" anchorCtr="0">
           <a:noAutofit/>
         </a:bodyPr>
         <a:lstStyle/>
         <a:p>
-          <a:pPr marL="0" lvl="0" indent="0" algn="ctr" defTabSz="444500">
+          <a:pPr lvl="0" algn="ctr" defTabSz="400050">
             <a:lnSpc>
               <a:spcPct val="90000"/>
             </a:lnSpc>
@@ -4978,10 +5048,9 @@
             <a:spcAft>
               <a:spcPct val="35000"/>
             </a:spcAft>
-            <a:buNone/>
           </a:pPr>
           <a:r>
-            <a:rPr lang="en-US" sz="1000" kern="1200"/>
+            <a:rPr lang="en-US" sz="900" kern="1200"/>
             <a:t>Poetry for dependency management</a:t>
           </a:r>
         </a:p>
@@ -9886,7 +9955,7 @@
         </p:spPr>
         <p:txBody>
           <a:bodyPr>
-            <a:normAutofit/>
+            <a:normAutofit fontScale="90000"/>
           </a:bodyPr>
           <a:lstStyle/>
           <a:p>
@@ -10108,6 +10177,13 @@
   <p:clrMapOvr>
     <a:masterClrMapping/>
   </p:clrMapOvr>
+  <p:timing>
+    <p:tnLst>
+      <p:par>
+        <p:cTn id="1" dur="indefinite" restart="never" nodeType="tmRoot"/>
+      </p:par>
+    </p:tnLst>
+  </p:timing>
 </p:sld>
 </file>
 
@@ -10142,7 +10218,7 @@
                 <a16:creationId xmlns:a16="http://schemas.microsoft.com/office/drawing/2014/main" id="{3B2A0780-B208-8BDA-83A5-F522D1771FAE}"/>
               </a:ext>
               <a:ext uri="{C183D7F6-B498-43B3-948B-1728B52AA6E4}">
-                <adec:decorative xmlns:adec="http://schemas.microsoft.com/office/drawing/2017/decorative" val="1"/>
+                <adec:decorative xmlns:adec="http://schemas.microsoft.com/office/drawing/2017/decorative" xmlns="" val="1"/>
               </a:ext>
             </a:extLst>
           </p:cNvPr>
@@ -10218,7 +10294,7 @@
                 <a16:creationId xmlns:a16="http://schemas.microsoft.com/office/drawing/2014/main" id="{4E841BB7-A923-BA47-FA4B-4FB67B6035A4}"/>
               </a:ext>
               <a:ext uri="{C183D7F6-B498-43B3-948B-1728B52AA6E4}">
-                <adec:decorative xmlns:adec="http://schemas.microsoft.com/office/drawing/2017/decorative" val="1"/>
+                <adec:decorative xmlns:adec="http://schemas.microsoft.com/office/drawing/2017/decorative" xmlns="" val="1"/>
               </a:ext>
             </a:extLst>
           </p:cNvPr>
@@ -10294,7 +10370,7 @@
                 <a16:creationId xmlns:a16="http://schemas.microsoft.com/office/drawing/2014/main" id="{87E31BF2-918D-624F-918C-95E24C3A781E}"/>
               </a:ext>
               <a:ext uri="{C183D7F6-B498-43B3-948B-1728B52AA6E4}">
-                <adec:decorative xmlns:adec="http://schemas.microsoft.com/office/drawing/2017/decorative" val="1"/>
+                <adec:decorative xmlns:adec="http://schemas.microsoft.com/office/drawing/2017/decorative" xmlns="" val="1"/>
               </a:ext>
             </a:extLst>
           </p:cNvPr>
@@ -10367,7 +10443,7 @@
                 <a16:creationId xmlns:a16="http://schemas.microsoft.com/office/drawing/2014/main" id="{DCAAAE7E-BE6A-22DB-FB19-2A458058E3A1}"/>
               </a:ext>
               <a:ext uri="{C183D7F6-B498-43B3-948B-1728B52AA6E4}">
-                <adec:decorative xmlns:adec="http://schemas.microsoft.com/office/drawing/2017/decorative" val="1"/>
+                <adec:decorative xmlns:adec="http://schemas.microsoft.com/office/drawing/2017/decorative" xmlns="" val="1"/>
               </a:ext>
             </a:extLst>
           </p:cNvPr>
@@ -10442,7 +10518,7 @@
                 <a16:creationId xmlns:a16="http://schemas.microsoft.com/office/drawing/2014/main" id="{F0561059-AFB8-7C8F-5F9D-FD8DDAE38FBB}"/>
               </a:ext>
               <a:ext uri="{C183D7F6-B498-43B3-948B-1728B52AA6E4}">
-                <adec:decorative xmlns:adec="http://schemas.microsoft.com/office/drawing/2017/decorative" val="1"/>
+                <adec:decorative xmlns:adec="http://schemas.microsoft.com/office/drawing/2017/decorative" xmlns="" val="1"/>
               </a:ext>
             </a:extLst>
           </p:cNvPr>
@@ -10517,7 +10593,7 @@
                 <a16:creationId xmlns:a16="http://schemas.microsoft.com/office/drawing/2014/main" id="{923937D4-DAC6-D3E9-D5D4-D3A5EFBB8EA1}"/>
               </a:ext>
               <a:ext uri="{C183D7F6-B498-43B3-948B-1728B52AA6E4}">
-                <adec:decorative xmlns:adec="http://schemas.microsoft.com/office/drawing/2017/decorative" val="1"/>
+                <adec:decorative xmlns:adec="http://schemas.microsoft.com/office/drawing/2017/decorative" xmlns="" val="1"/>
               </a:ext>
             </a:extLst>
           </p:cNvPr>
@@ -10687,7 +10763,7 @@
                 <a16:creationId xmlns:a16="http://schemas.microsoft.com/office/drawing/2014/main" id="{C49A537B-00F1-6744-C092-56E78BFF5121}"/>
               </a:ext>
               <a:ext uri="{C183D7F6-B498-43B3-948B-1728B52AA6E4}">
-                <adec:decorative xmlns:adec="http://schemas.microsoft.com/office/drawing/2017/decorative" val="1"/>
+                <adec:decorative xmlns:adec="http://schemas.microsoft.com/office/drawing/2017/decorative" xmlns="" val="1"/>
               </a:ext>
             </a:extLst>
           </p:cNvPr>
@@ -10836,8 +10912,13 @@
             </a:r>
             <a:r>
               <a:rPr lang="en-US" dirty="0"/>
-              <a:t>: 600*600</a:t>
-            </a:r>
+              <a:t>: </a:t>
+            </a:r>
+            <a:r>
+              <a:rPr lang="en-US" dirty="0" smtClean="0"/>
+              <a:t>224*224</a:t>
+            </a:r>
+            <a:endParaRPr lang="en-US" dirty="0"/>
           </a:p>
           <a:p>
             <a:pPr lvl="0" indent="0">
@@ -11036,6 +11117,48 @@
           </a:p>
         </p:txBody>
       </p:sp>
+      <p:sp>
+        <p:nvSpPr>
+          <p:cNvPr id="6" name="לחצן פעולה: מידע 5">
+            <a:hlinkClick r:id="rId2" action="ppaction://hlinksldjump" highlightClick="1"/>
+          </p:cNvPr>
+          <p:cNvSpPr/>
+          <p:nvPr/>
+        </p:nvSpPr>
+        <p:spPr>
+          <a:xfrm>
+            <a:off x="8600537" y="90099"/>
+            <a:ext cx="457200" cy="556299"/>
+          </a:xfrm>
+          <a:prstGeom prst="actionButtonInformation">
+            <a:avLst/>
+          </a:prstGeom>
+        </p:spPr>
+        <p:style>
+          <a:lnRef idx="2">
+            <a:schemeClr val="accent1">
+              <a:shade val="50000"/>
+            </a:schemeClr>
+          </a:lnRef>
+          <a:fillRef idx="1">
+            <a:schemeClr val="accent1"/>
+          </a:fillRef>
+          <a:effectRef idx="0">
+            <a:schemeClr val="accent1"/>
+          </a:effectRef>
+          <a:fontRef idx="minor">
+            <a:schemeClr val="lt1"/>
+          </a:fontRef>
+        </p:style>
+        <p:txBody>
+          <a:bodyPr rtlCol="1" anchor="ctr"/>
+          <a:lstStyle/>
+          <a:p>
+            <a:pPr algn="ctr"/>
+            <a:endParaRPr lang="he-IL"/>
+          </a:p>
+        </p:txBody>
+      </p:sp>
     </p:spTree>
     <p:extLst>
       <p:ext uri="{BB962C8B-B14F-4D97-AF65-F5344CB8AC3E}">
@@ -11046,6 +11169,13 @@
   <p:clrMapOvr>
     <a:masterClrMapping/>
   </p:clrMapOvr>
+  <p:timing>
+    <p:tnLst>
+      <p:par>
+        <p:cTn id="1" dur="indefinite" restart="never" nodeType="tmRoot"/>
+      </p:par>
+    </p:tnLst>
+  </p:timing>
 </p:sld>
 </file>
 
@@ -11080,7 +11210,7 @@
                 <a16:creationId xmlns:a16="http://schemas.microsoft.com/office/drawing/2014/main" id="{3B2A0780-B208-8BDA-83A5-F522D1771FAE}"/>
               </a:ext>
               <a:ext uri="{C183D7F6-B498-43B3-948B-1728B52AA6E4}">
-                <adec:decorative xmlns:adec="http://schemas.microsoft.com/office/drawing/2017/decorative" val="1"/>
+                <adec:decorative xmlns:adec="http://schemas.microsoft.com/office/drawing/2017/decorative" xmlns="" val="1"/>
               </a:ext>
             </a:extLst>
           </p:cNvPr>
@@ -11156,7 +11286,7 @@
                 <a16:creationId xmlns:a16="http://schemas.microsoft.com/office/drawing/2014/main" id="{4E841BB7-A923-BA47-FA4B-4FB67B6035A4}"/>
               </a:ext>
               <a:ext uri="{C183D7F6-B498-43B3-948B-1728B52AA6E4}">
-                <adec:decorative xmlns:adec="http://schemas.microsoft.com/office/drawing/2017/decorative" val="1"/>
+                <adec:decorative xmlns:adec="http://schemas.microsoft.com/office/drawing/2017/decorative" xmlns="" val="1"/>
               </a:ext>
             </a:extLst>
           </p:cNvPr>
@@ -11232,7 +11362,7 @@
                 <a16:creationId xmlns:a16="http://schemas.microsoft.com/office/drawing/2014/main" id="{87E31BF2-918D-624F-918C-95E24C3A781E}"/>
               </a:ext>
               <a:ext uri="{C183D7F6-B498-43B3-948B-1728B52AA6E4}">
-                <adec:decorative xmlns:adec="http://schemas.microsoft.com/office/drawing/2017/decorative" val="1"/>
+                <adec:decorative xmlns:adec="http://schemas.microsoft.com/office/drawing/2017/decorative" xmlns="" val="1"/>
               </a:ext>
             </a:extLst>
           </p:cNvPr>
@@ -11305,7 +11435,7 @@
                 <a16:creationId xmlns:a16="http://schemas.microsoft.com/office/drawing/2014/main" id="{DCAAAE7E-BE6A-22DB-FB19-2A458058E3A1}"/>
               </a:ext>
               <a:ext uri="{C183D7F6-B498-43B3-948B-1728B52AA6E4}">
-                <adec:decorative xmlns:adec="http://schemas.microsoft.com/office/drawing/2017/decorative" val="1"/>
+                <adec:decorative xmlns:adec="http://schemas.microsoft.com/office/drawing/2017/decorative" xmlns="" val="1"/>
               </a:ext>
             </a:extLst>
           </p:cNvPr>
@@ -11380,7 +11510,7 @@
                 <a16:creationId xmlns:a16="http://schemas.microsoft.com/office/drawing/2014/main" id="{F0561059-AFB8-7C8F-5F9D-FD8DDAE38FBB}"/>
               </a:ext>
               <a:ext uri="{C183D7F6-B498-43B3-948B-1728B52AA6E4}">
-                <adec:decorative xmlns:adec="http://schemas.microsoft.com/office/drawing/2017/decorative" val="1"/>
+                <adec:decorative xmlns:adec="http://schemas.microsoft.com/office/drawing/2017/decorative" xmlns="" val="1"/>
               </a:ext>
             </a:extLst>
           </p:cNvPr>
@@ -11455,7 +11585,7 @@
                 <a16:creationId xmlns:a16="http://schemas.microsoft.com/office/drawing/2014/main" id="{923937D4-DAC6-D3E9-D5D4-D3A5EFBB8EA1}"/>
               </a:ext>
               <a:ext uri="{C183D7F6-B498-43B3-948B-1728B52AA6E4}">
-                <adec:decorative xmlns:adec="http://schemas.microsoft.com/office/drawing/2017/decorative" val="1"/>
+                <adec:decorative xmlns:adec="http://schemas.microsoft.com/office/drawing/2017/decorative" xmlns="" val="1"/>
               </a:ext>
             </a:extLst>
           </p:cNvPr>
@@ -11625,7 +11755,7 @@
                 <a16:creationId xmlns:a16="http://schemas.microsoft.com/office/drawing/2014/main" id="{C49A537B-00F1-6744-C092-56E78BFF5121}"/>
               </a:ext>
               <a:ext uri="{C183D7F6-B498-43B3-948B-1728B52AA6E4}">
-                <adec:decorative xmlns:adec="http://schemas.microsoft.com/office/drawing/2017/decorative" val="1"/>
+                <adec:decorative xmlns:adec="http://schemas.microsoft.com/office/drawing/2017/decorative" xmlns="" val="1"/>
               </a:ext>
             </a:extLst>
           </p:cNvPr>
@@ -11968,6 +12098,13 @@
   <p:clrMapOvr>
     <a:masterClrMapping/>
   </p:clrMapOvr>
+  <p:timing>
+    <p:tnLst>
+      <p:par>
+        <p:cTn id="1" dur="indefinite" restart="never" nodeType="tmRoot"/>
+      </p:par>
+    </p:tnLst>
+  </p:timing>
 </p:sld>
 </file>
 
@@ -12010,7 +12147,7 @@
                 <a16:creationId xmlns:a16="http://schemas.microsoft.com/office/drawing/2014/main" id="{E885FA39-1492-8827-407F-9D11DFAB77E8}"/>
               </a:ext>
               <a:ext uri="{C183D7F6-B498-43B3-948B-1728B52AA6E4}">
-                <adec:decorative xmlns:adec="http://schemas.microsoft.com/office/drawing/2017/decorative" val="1"/>
+                <adec:decorative xmlns:adec="http://schemas.microsoft.com/office/drawing/2017/decorative" xmlns="" val="1"/>
               </a:ext>
             </a:extLst>
           </p:cNvPr>
@@ -12086,7 +12223,7 @@
                 <a16:creationId xmlns:a16="http://schemas.microsoft.com/office/drawing/2014/main" id="{3797EB26-1E89-1D60-3E45-27494EB33628}"/>
               </a:ext>
               <a:ext uri="{C183D7F6-B498-43B3-948B-1728B52AA6E4}">
-                <adec:decorative xmlns:adec="http://schemas.microsoft.com/office/drawing/2017/decorative" val="1"/>
+                <adec:decorative xmlns:adec="http://schemas.microsoft.com/office/drawing/2017/decorative" xmlns="" val="1"/>
               </a:ext>
             </a:extLst>
           </p:cNvPr>
@@ -12162,7 +12299,7 @@
                 <a16:creationId xmlns:a16="http://schemas.microsoft.com/office/drawing/2014/main" id="{6D0E025D-C30F-EE2C-2799-BF4B4600E650}"/>
               </a:ext>
               <a:ext uri="{C183D7F6-B498-43B3-948B-1728B52AA6E4}">
-                <adec:decorative xmlns:adec="http://schemas.microsoft.com/office/drawing/2017/decorative" val="1"/>
+                <adec:decorative xmlns:adec="http://schemas.microsoft.com/office/drawing/2017/decorative" xmlns="" val="1"/>
               </a:ext>
             </a:extLst>
           </p:cNvPr>
@@ -12235,7 +12372,7 @@
                 <a16:creationId xmlns:a16="http://schemas.microsoft.com/office/drawing/2014/main" id="{7A01F886-CF4D-0F08-DB68-2AB3C8A125B9}"/>
               </a:ext>
               <a:ext uri="{C183D7F6-B498-43B3-948B-1728B52AA6E4}">
-                <adec:decorative xmlns:adec="http://schemas.microsoft.com/office/drawing/2017/decorative" val="1"/>
+                <adec:decorative xmlns:adec="http://schemas.microsoft.com/office/drawing/2017/decorative" xmlns="" val="1"/>
               </a:ext>
             </a:extLst>
           </p:cNvPr>
@@ -12310,7 +12447,7 @@
                 <a16:creationId xmlns:a16="http://schemas.microsoft.com/office/drawing/2014/main" id="{76A97DF4-0A78-1DC5-27E3-C537F6A259EA}"/>
               </a:ext>
               <a:ext uri="{C183D7F6-B498-43B3-948B-1728B52AA6E4}">
-                <adec:decorative xmlns:adec="http://schemas.microsoft.com/office/drawing/2017/decorative" val="1"/>
+                <adec:decorative xmlns:adec="http://schemas.microsoft.com/office/drawing/2017/decorative" xmlns="" val="1"/>
               </a:ext>
             </a:extLst>
           </p:cNvPr>
@@ -12385,7 +12522,7 @@
                 <a16:creationId xmlns:a16="http://schemas.microsoft.com/office/drawing/2014/main" id="{0E46E396-1AB4-3E1F-C1C6-247DD43666A1}"/>
               </a:ext>
               <a:ext uri="{C183D7F6-B498-43B3-948B-1728B52AA6E4}">
-                <adec:decorative xmlns:adec="http://schemas.microsoft.com/office/drawing/2017/decorative" val="1"/>
+                <adec:decorative xmlns:adec="http://schemas.microsoft.com/office/drawing/2017/decorative" xmlns="" val="1"/>
               </a:ext>
             </a:extLst>
           </p:cNvPr>
@@ -12555,7 +12692,7 @@
                 <a16:creationId xmlns:a16="http://schemas.microsoft.com/office/drawing/2014/main" id="{6E0B5C02-5EAC-7934-9D3D-EBFF98CF9062}"/>
               </a:ext>
               <a:ext uri="{C183D7F6-B498-43B3-948B-1728B52AA6E4}">
-                <adec:decorative xmlns:adec="http://schemas.microsoft.com/office/drawing/2017/decorative" val="1"/>
+                <adec:decorative xmlns:adec="http://schemas.microsoft.com/office/drawing/2017/decorative" xmlns="" val="1"/>
               </a:ext>
             </a:extLst>
           </p:cNvPr>
@@ -14447,6 +14584,13 @@
   <p:clrMapOvr>
     <a:masterClrMapping/>
   </p:clrMapOvr>
+  <p:timing>
+    <p:tnLst>
+      <p:par>
+        <p:cTn id="1" dur="indefinite" restart="never" nodeType="tmRoot"/>
+      </p:par>
+    </p:tnLst>
+  </p:timing>
 </p:sld>
 </file>
 
@@ -14489,7 +14633,7 @@
                 <a16:creationId xmlns:a16="http://schemas.microsoft.com/office/drawing/2014/main" id="{09588DA8-065E-4F6F-8EFD-43104AB2E0CF}"/>
               </a:ext>
               <a:ext uri="{C183D7F6-B498-43B3-948B-1728B52AA6E4}">
-                <adec:decorative xmlns:adec="http://schemas.microsoft.com/office/drawing/2017/decorative" val="1"/>
+                <adec:decorative xmlns:adec="http://schemas.microsoft.com/office/drawing/2017/decorative" xmlns="" val="1"/>
               </a:ext>
             </a:extLst>
           </p:cNvPr>
@@ -14565,7 +14709,7 @@
                 <a16:creationId xmlns:a16="http://schemas.microsoft.com/office/drawing/2014/main" id="{C4285719-470E-454C-AF62-8323075F1F5B}"/>
               </a:ext>
               <a:ext uri="{C183D7F6-B498-43B3-948B-1728B52AA6E4}">
-                <adec:decorative xmlns:adec="http://schemas.microsoft.com/office/drawing/2017/decorative" val="1"/>
+                <adec:decorative xmlns:adec="http://schemas.microsoft.com/office/drawing/2017/decorative" xmlns="" val="1"/>
               </a:ext>
             </a:extLst>
           </p:cNvPr>
@@ -14641,7 +14785,7 @@
                 <a16:creationId xmlns:a16="http://schemas.microsoft.com/office/drawing/2014/main" id="{CD9FE4EF-C4D8-49A0-B2FF-81D8DB7D8A24}"/>
               </a:ext>
               <a:ext uri="{C183D7F6-B498-43B3-948B-1728B52AA6E4}">
-                <adec:decorative xmlns:adec="http://schemas.microsoft.com/office/drawing/2017/decorative" val="1"/>
+                <adec:decorative xmlns:adec="http://schemas.microsoft.com/office/drawing/2017/decorative" xmlns="" val="1"/>
               </a:ext>
             </a:extLst>
           </p:cNvPr>
@@ -14714,7 +14858,7 @@
                 <a16:creationId xmlns:a16="http://schemas.microsoft.com/office/drawing/2014/main" id="{4300840D-0A0B-4512-BACA-B439D5B9C57C}"/>
               </a:ext>
               <a:ext uri="{C183D7F6-B498-43B3-948B-1728B52AA6E4}">
-                <adec:decorative xmlns:adec="http://schemas.microsoft.com/office/drawing/2017/decorative" val="1"/>
+                <adec:decorative xmlns:adec="http://schemas.microsoft.com/office/drawing/2017/decorative" xmlns="" val="1"/>
               </a:ext>
             </a:extLst>
           </p:cNvPr>
@@ -14789,7 +14933,7 @@
                 <a16:creationId xmlns:a16="http://schemas.microsoft.com/office/drawing/2014/main" id="{D2B78728-A580-49A7-84F9-6EF6F583ADE0}"/>
               </a:ext>
               <a:ext uri="{C183D7F6-B498-43B3-948B-1728B52AA6E4}">
-                <adec:decorative xmlns:adec="http://schemas.microsoft.com/office/drawing/2017/decorative" val="1"/>
+                <adec:decorative xmlns:adec="http://schemas.microsoft.com/office/drawing/2017/decorative" xmlns="" val="1"/>
               </a:ext>
             </a:extLst>
           </p:cNvPr>
@@ -14864,7 +15008,7 @@
                 <a16:creationId xmlns:a16="http://schemas.microsoft.com/office/drawing/2014/main" id="{38FAA1A1-D861-433F-88FA-1E9D6FD31D11}"/>
               </a:ext>
               <a:ext uri="{C183D7F6-B498-43B3-948B-1728B52AA6E4}">
-                <adec:decorative xmlns:adec="http://schemas.microsoft.com/office/drawing/2017/decorative" val="1"/>
+                <adec:decorative xmlns:adec="http://schemas.microsoft.com/office/drawing/2017/decorative" xmlns="" val="1"/>
               </a:ext>
             </a:extLst>
           </p:cNvPr>
@@ -15034,7 +15178,7 @@
                 <a16:creationId xmlns:a16="http://schemas.microsoft.com/office/drawing/2014/main" id="{8D71EDA1-87BF-4D5D-AB79-F346FD19278A}"/>
               </a:ext>
               <a:ext uri="{C183D7F6-B498-43B3-948B-1728B52AA6E4}">
-                <adec:decorative xmlns:adec="http://schemas.microsoft.com/office/drawing/2017/decorative" val="1"/>
+                <adec:decorative xmlns:adec="http://schemas.microsoft.com/office/drawing/2017/decorative" xmlns="" val="1"/>
               </a:ext>
             </a:extLst>
           </p:cNvPr>
@@ -15127,7 +15271,7 @@
         </p:spPr>
         <p:txBody>
           <a:bodyPr anchor="b">
-            <a:normAutofit/>
+            <a:normAutofit fontScale="90000"/>
           </a:bodyPr>
           <a:lstStyle/>
           <a:p>
@@ -15148,6 +15292,14 @@
             <a:r>
               <a:rPr lang="en-US" sz="2800" b="1" dirty="0"/>
               <a:t>Pre-training</a:t>
+            </a:r>
+            <a:r>
+              <a:rPr lang="en-US" sz="2800" dirty="0">
+                <a:solidFill>
+                  <a:srgbClr val="FFFFFF"/>
+                </a:solidFill>
+              </a:rPr>
+              <a:t/>
             </a:r>
             <a:br>
               <a:rPr lang="en-US" sz="2800" dirty="0">
@@ -15439,6 +15591,48 @@
           </a:p>
         </p:txBody>
       </p:sp>
+      <p:sp>
+        <p:nvSpPr>
+          <p:cNvPr id="3" name="לחצן פעולה: מידע 2">
+            <a:hlinkClick r:id="rId2" action="ppaction://hlinksldjump" highlightClick="1"/>
+          </p:cNvPr>
+          <p:cNvSpPr/>
+          <p:nvPr/>
+        </p:nvSpPr>
+        <p:spPr>
+          <a:xfrm>
+            <a:off x="8384875" y="172528"/>
+            <a:ext cx="557983" cy="473871"/>
+          </a:xfrm>
+          <a:prstGeom prst="actionButtonInformation">
+            <a:avLst/>
+          </a:prstGeom>
+        </p:spPr>
+        <p:style>
+          <a:lnRef idx="2">
+            <a:schemeClr val="accent1">
+              <a:shade val="50000"/>
+            </a:schemeClr>
+          </a:lnRef>
+          <a:fillRef idx="1">
+            <a:schemeClr val="accent1"/>
+          </a:fillRef>
+          <a:effectRef idx="0">
+            <a:schemeClr val="accent1"/>
+          </a:effectRef>
+          <a:fontRef idx="minor">
+            <a:schemeClr val="lt1"/>
+          </a:fontRef>
+        </p:style>
+        <p:txBody>
+          <a:bodyPr rtlCol="1" anchor="ctr"/>
+          <a:lstStyle/>
+          <a:p>
+            <a:pPr algn="ctr"/>
+            <a:endParaRPr lang="he-IL"/>
+          </a:p>
+        </p:txBody>
+      </p:sp>
     </p:spTree>
     <p:extLst>
       <p:ext uri="{BB962C8B-B14F-4D97-AF65-F5344CB8AC3E}">
@@ -15449,6 +15643,13 @@
   <p:clrMapOvr>
     <a:masterClrMapping/>
   </p:clrMapOvr>
+  <p:timing>
+    <p:tnLst>
+      <p:par>
+        <p:cTn id="1" dur="indefinite" restart="never" nodeType="tmRoot"/>
+      </p:par>
+    </p:tnLst>
+  </p:timing>
 </p:sld>
 </file>
 
@@ -15491,7 +15692,7 @@
                 <a16:creationId xmlns:a16="http://schemas.microsoft.com/office/drawing/2014/main" id="{09588DA8-065E-4F6F-8EFD-43104AB2E0CF}"/>
               </a:ext>
               <a:ext uri="{C183D7F6-B498-43B3-948B-1728B52AA6E4}">
-                <adec:decorative xmlns:adec="http://schemas.microsoft.com/office/drawing/2017/decorative" val="1"/>
+                <adec:decorative xmlns:adec="http://schemas.microsoft.com/office/drawing/2017/decorative" xmlns="" val="1"/>
               </a:ext>
             </a:extLst>
           </p:cNvPr>
@@ -15567,7 +15768,7 @@
                 <a16:creationId xmlns:a16="http://schemas.microsoft.com/office/drawing/2014/main" id="{C4285719-470E-454C-AF62-8323075F1F5B}"/>
               </a:ext>
               <a:ext uri="{C183D7F6-B498-43B3-948B-1728B52AA6E4}">
-                <adec:decorative xmlns:adec="http://schemas.microsoft.com/office/drawing/2017/decorative" val="1"/>
+                <adec:decorative xmlns:adec="http://schemas.microsoft.com/office/drawing/2017/decorative" xmlns="" val="1"/>
               </a:ext>
             </a:extLst>
           </p:cNvPr>
@@ -15643,7 +15844,7 @@
                 <a16:creationId xmlns:a16="http://schemas.microsoft.com/office/drawing/2014/main" id="{CD9FE4EF-C4D8-49A0-B2FF-81D8DB7D8A24}"/>
               </a:ext>
               <a:ext uri="{C183D7F6-B498-43B3-948B-1728B52AA6E4}">
-                <adec:decorative xmlns:adec="http://schemas.microsoft.com/office/drawing/2017/decorative" val="1"/>
+                <adec:decorative xmlns:adec="http://schemas.microsoft.com/office/drawing/2017/decorative" xmlns="" val="1"/>
               </a:ext>
             </a:extLst>
           </p:cNvPr>
@@ -15716,7 +15917,7 @@
                 <a16:creationId xmlns:a16="http://schemas.microsoft.com/office/drawing/2014/main" id="{4300840D-0A0B-4512-BACA-B439D5B9C57C}"/>
               </a:ext>
               <a:ext uri="{C183D7F6-B498-43B3-948B-1728B52AA6E4}">
-                <adec:decorative xmlns:adec="http://schemas.microsoft.com/office/drawing/2017/decorative" val="1"/>
+                <adec:decorative xmlns:adec="http://schemas.microsoft.com/office/drawing/2017/decorative" xmlns="" val="1"/>
               </a:ext>
             </a:extLst>
           </p:cNvPr>
@@ -15791,7 +15992,7 @@
                 <a16:creationId xmlns:a16="http://schemas.microsoft.com/office/drawing/2014/main" id="{D2B78728-A580-49A7-84F9-6EF6F583ADE0}"/>
               </a:ext>
               <a:ext uri="{C183D7F6-B498-43B3-948B-1728B52AA6E4}">
-                <adec:decorative xmlns:adec="http://schemas.microsoft.com/office/drawing/2017/decorative" val="1"/>
+                <adec:decorative xmlns:adec="http://schemas.microsoft.com/office/drawing/2017/decorative" xmlns="" val="1"/>
               </a:ext>
             </a:extLst>
           </p:cNvPr>
@@ -15866,7 +16067,7 @@
                 <a16:creationId xmlns:a16="http://schemas.microsoft.com/office/drawing/2014/main" id="{38FAA1A1-D861-433F-88FA-1E9D6FD31D11}"/>
               </a:ext>
               <a:ext uri="{C183D7F6-B498-43B3-948B-1728B52AA6E4}">
-                <adec:decorative xmlns:adec="http://schemas.microsoft.com/office/drawing/2017/decorative" val="1"/>
+                <adec:decorative xmlns:adec="http://schemas.microsoft.com/office/drawing/2017/decorative" xmlns="" val="1"/>
               </a:ext>
             </a:extLst>
           </p:cNvPr>
@@ -16036,7 +16237,7 @@
                 <a16:creationId xmlns:a16="http://schemas.microsoft.com/office/drawing/2014/main" id="{8D71EDA1-87BF-4D5D-AB79-F346FD19278A}"/>
               </a:ext>
               <a:ext uri="{C183D7F6-B498-43B3-948B-1728B52AA6E4}">
-                <adec:decorative xmlns:adec="http://schemas.microsoft.com/office/drawing/2017/decorative" val="1"/>
+                <adec:decorative xmlns:adec="http://schemas.microsoft.com/office/drawing/2017/decorative" xmlns="" val="1"/>
               </a:ext>
             </a:extLst>
           </p:cNvPr>
@@ -16497,6 +16698,13 @@
   <p:clrMapOvr>
     <a:masterClrMapping/>
   </p:clrMapOvr>
+  <p:timing>
+    <p:tnLst>
+      <p:par>
+        <p:cTn id="1" dur="indefinite" restart="never" nodeType="tmRoot"/>
+      </p:par>
+    </p:tnLst>
+  </p:timing>
 </p:sld>
 </file>
 
@@ -16533,7 +16741,7 @@
                 <a16:creationId xmlns:a16="http://schemas.microsoft.com/office/drawing/2014/main" id="{8870DEF6-46A2-D4F8-8BE6-91165D93ECC4}"/>
               </a:ext>
               <a:ext uri="{C183D7F6-B498-43B3-948B-1728B52AA6E4}">
-                <adec:decorative xmlns:adec="http://schemas.microsoft.com/office/drawing/2017/decorative" val="1"/>
+                <adec:decorative xmlns:adec="http://schemas.microsoft.com/office/drawing/2017/decorative" xmlns="" val="1"/>
               </a:ext>
             </a:extLst>
           </p:cNvPr>
@@ -16609,7 +16817,7 @@
                 <a16:creationId xmlns:a16="http://schemas.microsoft.com/office/drawing/2014/main" id="{522632D6-DED9-FDEC-FD9F-09FF0A4544CC}"/>
               </a:ext>
               <a:ext uri="{C183D7F6-B498-43B3-948B-1728B52AA6E4}">
-                <adec:decorative xmlns:adec="http://schemas.microsoft.com/office/drawing/2017/decorative" val="1"/>
+                <adec:decorative xmlns:adec="http://schemas.microsoft.com/office/drawing/2017/decorative" xmlns="" val="1"/>
               </a:ext>
             </a:extLst>
           </p:cNvPr>
@@ -16772,7 +16980,7 @@
                     <a:lstStyle/>
                     <a:p>
                       <a:r>
-                        <a:rPr lang="en-US" sz="1000">
+                        <a:rPr lang="en-US" sz="1000" dirty="0">
                           <a:effectLst/>
                         </a:rPr>
                         <a:t>Train Loss</a:t>
@@ -18537,6 +18745,13 @@
   <p:clrMapOvr>
     <a:masterClrMapping/>
   </p:clrMapOvr>
+  <p:timing>
+    <p:tnLst>
+      <p:par>
+        <p:cTn id="1" dur="indefinite" restart="never" nodeType="tmRoot"/>
+      </p:par>
+    </p:tnLst>
+  </p:timing>
 </p:sld>
 </file>
 
@@ -18579,7 +18794,7 @@
                 <a16:creationId xmlns:a16="http://schemas.microsoft.com/office/drawing/2014/main" id="{10D63EB6-586C-320A-B838-333F5906A8D8}"/>
               </a:ext>
               <a:ext uri="{C183D7F6-B498-43B3-948B-1728B52AA6E4}">
-                <adec:decorative xmlns:adec="http://schemas.microsoft.com/office/drawing/2017/decorative" val="1"/>
+                <adec:decorative xmlns:adec="http://schemas.microsoft.com/office/drawing/2017/decorative" xmlns="" val="1"/>
               </a:ext>
             </a:extLst>
           </p:cNvPr>
@@ -18655,7 +18870,7 @@
                 <a16:creationId xmlns:a16="http://schemas.microsoft.com/office/drawing/2014/main" id="{373C3EB9-FB80-75C0-8437-3AAF24129AA4}"/>
               </a:ext>
               <a:ext uri="{C183D7F6-B498-43B3-948B-1728B52AA6E4}">
-                <adec:decorative xmlns:adec="http://schemas.microsoft.com/office/drawing/2017/decorative" val="1"/>
+                <adec:decorative xmlns:adec="http://schemas.microsoft.com/office/drawing/2017/decorative" xmlns="" val="1"/>
               </a:ext>
             </a:extLst>
           </p:cNvPr>
@@ -18731,7 +18946,7 @@
                 <a16:creationId xmlns:a16="http://schemas.microsoft.com/office/drawing/2014/main" id="{9649189D-F6A4-EDFD-8352-9DD62FA528CE}"/>
               </a:ext>
               <a:ext uri="{C183D7F6-B498-43B3-948B-1728B52AA6E4}">
-                <adec:decorative xmlns:adec="http://schemas.microsoft.com/office/drawing/2017/decorative" val="1"/>
+                <adec:decorative xmlns:adec="http://schemas.microsoft.com/office/drawing/2017/decorative" xmlns="" val="1"/>
               </a:ext>
             </a:extLst>
           </p:cNvPr>
@@ -18804,7 +19019,7 @@
                 <a16:creationId xmlns:a16="http://schemas.microsoft.com/office/drawing/2014/main" id="{84600213-E5A5-44BF-B6DB-74967B27E994}"/>
               </a:ext>
               <a:ext uri="{C183D7F6-B498-43B3-948B-1728B52AA6E4}">
-                <adec:decorative xmlns:adec="http://schemas.microsoft.com/office/drawing/2017/decorative" val="1"/>
+                <adec:decorative xmlns:adec="http://schemas.microsoft.com/office/drawing/2017/decorative" xmlns="" val="1"/>
               </a:ext>
             </a:extLst>
           </p:cNvPr>
@@ -18879,7 +19094,7 @@
                 <a16:creationId xmlns:a16="http://schemas.microsoft.com/office/drawing/2014/main" id="{88274975-4698-6D3B-CA8F-5916FF737BE4}"/>
               </a:ext>
               <a:ext uri="{C183D7F6-B498-43B3-948B-1728B52AA6E4}">
-                <adec:decorative xmlns:adec="http://schemas.microsoft.com/office/drawing/2017/decorative" val="1"/>
+                <adec:decorative xmlns:adec="http://schemas.microsoft.com/office/drawing/2017/decorative" xmlns="" val="1"/>
               </a:ext>
             </a:extLst>
           </p:cNvPr>
@@ -18954,7 +19169,7 @@
                 <a16:creationId xmlns:a16="http://schemas.microsoft.com/office/drawing/2014/main" id="{6E7467F3-DD0D-658A-3A63-70D9789F792B}"/>
               </a:ext>
               <a:ext uri="{C183D7F6-B498-43B3-948B-1728B52AA6E4}">
-                <adec:decorative xmlns:adec="http://schemas.microsoft.com/office/drawing/2017/decorative" val="1"/>
+                <adec:decorative xmlns:adec="http://schemas.microsoft.com/office/drawing/2017/decorative" xmlns="" val="1"/>
               </a:ext>
             </a:extLst>
           </p:cNvPr>
@@ -19124,7 +19339,7 @@
                 <a16:creationId xmlns:a16="http://schemas.microsoft.com/office/drawing/2014/main" id="{648ADC64-8DA2-FEB8-4FFE-B16AAC6479E8}"/>
               </a:ext>
               <a:ext uri="{C183D7F6-B498-43B3-948B-1728B52AA6E4}">
-                <adec:decorative xmlns:adec="http://schemas.microsoft.com/office/drawing/2017/decorative" val="1"/>
+                <adec:decorative xmlns:adec="http://schemas.microsoft.com/office/drawing/2017/decorative" xmlns="" val="1"/>
               </a:ext>
             </a:extLst>
           </p:cNvPr>
@@ -19217,7 +19432,7 @@
         </p:spPr>
         <p:txBody>
           <a:bodyPr anchor="b">
-            <a:normAutofit/>
+            <a:normAutofit fontScale="90000"/>
           </a:bodyPr>
           <a:lstStyle/>
           <a:p>
@@ -19363,6 +19578,13 @@
   <p:clrMapOvr>
     <a:masterClrMapping/>
   </p:clrMapOvr>
+  <p:timing>
+    <p:tnLst>
+      <p:par>
+        <p:cTn id="1" dur="indefinite" restart="never" nodeType="tmRoot"/>
+      </p:par>
+    </p:tnLst>
+  </p:timing>
 </p:sld>
 </file>
 
@@ -19405,7 +19627,7 @@
                 <a16:creationId xmlns:a16="http://schemas.microsoft.com/office/drawing/2014/main" id="{1A139C08-1734-F3E8-51EF-58F055F8B86F}"/>
               </a:ext>
               <a:ext uri="{C183D7F6-B498-43B3-948B-1728B52AA6E4}">
-                <adec:decorative xmlns:adec="http://schemas.microsoft.com/office/drawing/2017/decorative" val="1"/>
+                <adec:decorative xmlns:adec="http://schemas.microsoft.com/office/drawing/2017/decorative" xmlns="" val="1"/>
               </a:ext>
             </a:extLst>
           </p:cNvPr>
@@ -19481,7 +19703,7 @@
                 <a16:creationId xmlns:a16="http://schemas.microsoft.com/office/drawing/2014/main" id="{26CFB2FE-CF2F-FA51-A489-E77F35F64F66}"/>
               </a:ext>
               <a:ext uri="{C183D7F6-B498-43B3-948B-1728B52AA6E4}">
-                <adec:decorative xmlns:adec="http://schemas.microsoft.com/office/drawing/2017/decorative" val="1"/>
+                <adec:decorative xmlns:adec="http://schemas.microsoft.com/office/drawing/2017/decorative" xmlns="" val="1"/>
               </a:ext>
             </a:extLst>
           </p:cNvPr>
@@ -19557,7 +19779,7 @@
                 <a16:creationId xmlns:a16="http://schemas.microsoft.com/office/drawing/2014/main" id="{46F42801-36F5-79CB-2515-054D1C1DE0A9}"/>
               </a:ext>
               <a:ext uri="{C183D7F6-B498-43B3-948B-1728B52AA6E4}">
-                <adec:decorative xmlns:adec="http://schemas.microsoft.com/office/drawing/2017/decorative" val="1"/>
+                <adec:decorative xmlns:adec="http://schemas.microsoft.com/office/drawing/2017/decorative" xmlns="" val="1"/>
               </a:ext>
             </a:extLst>
           </p:cNvPr>
@@ -19630,7 +19852,7 @@
                 <a16:creationId xmlns:a16="http://schemas.microsoft.com/office/drawing/2014/main" id="{7588E14C-182B-D416-CF94-D2FFF093C7CC}"/>
               </a:ext>
               <a:ext uri="{C183D7F6-B498-43B3-948B-1728B52AA6E4}">
-                <adec:decorative xmlns:adec="http://schemas.microsoft.com/office/drawing/2017/decorative" val="1"/>
+                <adec:decorative xmlns:adec="http://schemas.microsoft.com/office/drawing/2017/decorative" xmlns="" val="1"/>
               </a:ext>
             </a:extLst>
           </p:cNvPr>
@@ -19705,7 +19927,7 @@
                 <a16:creationId xmlns:a16="http://schemas.microsoft.com/office/drawing/2014/main" id="{FE231331-9FF7-AC9F-C9EF-FC4DEA8E4A7B}"/>
               </a:ext>
               <a:ext uri="{C183D7F6-B498-43B3-948B-1728B52AA6E4}">
-                <adec:decorative xmlns:adec="http://schemas.microsoft.com/office/drawing/2017/decorative" val="1"/>
+                <adec:decorative xmlns:adec="http://schemas.microsoft.com/office/drawing/2017/decorative" xmlns="" val="1"/>
               </a:ext>
             </a:extLst>
           </p:cNvPr>
@@ -19780,7 +20002,7 @@
                 <a16:creationId xmlns:a16="http://schemas.microsoft.com/office/drawing/2014/main" id="{194196BB-5956-6D6B-7F7B-A0FBB8D33D6C}"/>
               </a:ext>
               <a:ext uri="{C183D7F6-B498-43B3-948B-1728B52AA6E4}">
-                <adec:decorative xmlns:adec="http://schemas.microsoft.com/office/drawing/2017/decorative" val="1"/>
+                <adec:decorative xmlns:adec="http://schemas.microsoft.com/office/drawing/2017/decorative" xmlns="" val="1"/>
               </a:ext>
             </a:extLst>
           </p:cNvPr>
@@ -19950,7 +20172,7 @@
                 <a16:creationId xmlns:a16="http://schemas.microsoft.com/office/drawing/2014/main" id="{160F11B3-D35A-1784-7443-6D89EB1F6AA2}"/>
               </a:ext>
               <a:ext uri="{C183D7F6-B498-43B3-948B-1728B52AA6E4}">
-                <adec:decorative xmlns:adec="http://schemas.microsoft.com/office/drawing/2017/decorative" val="1"/>
+                <adec:decorative xmlns:adec="http://schemas.microsoft.com/office/drawing/2017/decorative" xmlns="" val="1"/>
               </a:ext>
             </a:extLst>
           </p:cNvPr>
@@ -20158,6 +20380,13 @@
   <p:clrMapOvr>
     <a:masterClrMapping/>
   </p:clrMapOvr>
+  <p:timing>
+    <p:tnLst>
+      <p:par>
+        <p:cTn id="1" dur="indefinite" restart="never" nodeType="tmRoot"/>
+      </p:par>
+    </p:tnLst>
+  </p:timing>
 </p:sld>
 </file>
 
@@ -20194,7 +20423,7 @@
                 <a16:creationId xmlns:a16="http://schemas.microsoft.com/office/drawing/2014/main" id="{9203DE33-2CD4-4CA8-9AF3-37C3B65133B0}"/>
               </a:ext>
               <a:ext uri="{C183D7F6-B498-43B3-948B-1728B52AA6E4}">
-                <adec:decorative xmlns:adec="http://schemas.microsoft.com/office/drawing/2017/decorative" val="1"/>
+                <adec:decorative xmlns:adec="http://schemas.microsoft.com/office/drawing/2017/decorative" xmlns="" val="1"/>
               </a:ext>
             </a:extLst>
           </p:cNvPr>
@@ -20254,7 +20483,7 @@
                 <a16:creationId xmlns:a16="http://schemas.microsoft.com/office/drawing/2014/main" id="{0AF57B88-1D4C-41FA-A761-EC1DD10C35CB}"/>
               </a:ext>
               <a:ext uri="{C183D7F6-B498-43B3-948B-1728B52AA6E4}">
-                <adec:decorative xmlns:adec="http://schemas.microsoft.com/office/drawing/2017/decorative" val="1"/>
+                <adec:decorative xmlns:adec="http://schemas.microsoft.com/office/drawing/2017/decorative" xmlns="" val="1"/>
               </a:ext>
             </a:extLst>
           </p:cNvPr>
@@ -20327,7 +20556,7 @@
                 <a16:creationId xmlns:a16="http://schemas.microsoft.com/office/drawing/2014/main" id="{D2548F45-5164-4ABB-8212-7F293FDED8D4}"/>
               </a:ext>
               <a:ext uri="{C183D7F6-B498-43B3-948B-1728B52AA6E4}">
-                <adec:decorative xmlns:adec="http://schemas.microsoft.com/office/drawing/2017/decorative" val="1"/>
+                <adec:decorative xmlns:adec="http://schemas.microsoft.com/office/drawing/2017/decorative" xmlns="" val="1"/>
               </a:ext>
             </a:extLst>
           </p:cNvPr>
@@ -20403,7 +20632,7 @@
                 <a16:creationId xmlns:a16="http://schemas.microsoft.com/office/drawing/2014/main" id="{5E81CCFB-7BEF-4186-86FB-D09450B4D02D}"/>
               </a:ext>
               <a:ext uri="{C183D7F6-B498-43B3-948B-1728B52AA6E4}">
-                <adec:decorative xmlns:adec="http://schemas.microsoft.com/office/drawing/2017/decorative" val="1"/>
+                <adec:decorative xmlns:adec="http://schemas.microsoft.com/office/drawing/2017/decorative" xmlns="" val="1"/>
               </a:ext>
             </a:extLst>
           </p:cNvPr>
@@ -20614,7 +20843,7 @@
         </p:spPr>
         <p:txBody>
           <a:bodyPr vert="horz" lIns="91440" tIns="45720" rIns="91440" bIns="45720" rtlCol="0" anchor="ctr">
-            <a:normAutofit fontScale="77500" lnSpcReduction="20000"/>
+            <a:normAutofit fontScale="62500" lnSpcReduction="20000"/>
           </a:bodyPr>
           <a:lstStyle/>
           <a:p>
@@ -20774,6 +21003,10 @@
                 <a:spcPts val="750"/>
               </a:spcBef>
             </a:pPr>
+            <a:r>
+              <a:rPr lang="en-US" sz="2600" b="1" dirty="0"/>
+              <a:t/>
+            </a:r>
             <a:br>
               <a:rPr lang="en-US" sz="2600" b="1" dirty="0"/>
             </a:br>
@@ -20950,7 +21183,7 @@
                 <a16:creationId xmlns:a16="http://schemas.microsoft.com/office/drawing/2014/main" id="{09588DA8-065E-4F6F-8EFD-43104AB2E0CF}"/>
               </a:ext>
               <a:ext uri="{C183D7F6-B498-43B3-948B-1728B52AA6E4}">
-                <adec:decorative xmlns:adec="http://schemas.microsoft.com/office/drawing/2017/decorative" val="1"/>
+                <adec:decorative xmlns:adec="http://schemas.microsoft.com/office/drawing/2017/decorative" xmlns="" val="1"/>
               </a:ext>
             </a:extLst>
           </p:cNvPr>
@@ -21026,7 +21259,7 @@
                 <a16:creationId xmlns:a16="http://schemas.microsoft.com/office/drawing/2014/main" id="{C4285719-470E-454C-AF62-8323075F1F5B}"/>
               </a:ext>
               <a:ext uri="{C183D7F6-B498-43B3-948B-1728B52AA6E4}">
-                <adec:decorative xmlns:adec="http://schemas.microsoft.com/office/drawing/2017/decorative" val="1"/>
+                <adec:decorative xmlns:adec="http://schemas.microsoft.com/office/drawing/2017/decorative" xmlns="" val="1"/>
               </a:ext>
             </a:extLst>
           </p:cNvPr>
@@ -21102,7 +21335,7 @@
                 <a16:creationId xmlns:a16="http://schemas.microsoft.com/office/drawing/2014/main" id="{CD9FE4EF-C4D8-49A0-B2FF-81D8DB7D8A24}"/>
               </a:ext>
               <a:ext uri="{C183D7F6-B498-43B3-948B-1728B52AA6E4}">
-                <adec:decorative xmlns:adec="http://schemas.microsoft.com/office/drawing/2017/decorative" val="1"/>
+                <adec:decorative xmlns:adec="http://schemas.microsoft.com/office/drawing/2017/decorative" xmlns="" val="1"/>
               </a:ext>
             </a:extLst>
           </p:cNvPr>
@@ -21175,7 +21408,7 @@
                 <a16:creationId xmlns:a16="http://schemas.microsoft.com/office/drawing/2014/main" id="{4300840D-0A0B-4512-BACA-B439D5B9C57C}"/>
               </a:ext>
               <a:ext uri="{C183D7F6-B498-43B3-948B-1728B52AA6E4}">
-                <adec:decorative xmlns:adec="http://schemas.microsoft.com/office/drawing/2017/decorative" val="1"/>
+                <adec:decorative xmlns:adec="http://schemas.microsoft.com/office/drawing/2017/decorative" xmlns="" val="1"/>
               </a:ext>
             </a:extLst>
           </p:cNvPr>
@@ -21250,7 +21483,7 @@
                 <a16:creationId xmlns:a16="http://schemas.microsoft.com/office/drawing/2014/main" id="{D2B78728-A580-49A7-84F9-6EF6F583ADE0}"/>
               </a:ext>
               <a:ext uri="{C183D7F6-B498-43B3-948B-1728B52AA6E4}">
-                <adec:decorative xmlns:adec="http://schemas.microsoft.com/office/drawing/2017/decorative" val="1"/>
+                <adec:decorative xmlns:adec="http://schemas.microsoft.com/office/drawing/2017/decorative" xmlns="" val="1"/>
               </a:ext>
             </a:extLst>
           </p:cNvPr>
@@ -21325,7 +21558,7 @@
                 <a16:creationId xmlns:a16="http://schemas.microsoft.com/office/drawing/2014/main" id="{38FAA1A1-D861-433F-88FA-1E9D6FD31D11}"/>
               </a:ext>
               <a:ext uri="{C183D7F6-B498-43B3-948B-1728B52AA6E4}">
-                <adec:decorative xmlns:adec="http://schemas.microsoft.com/office/drawing/2017/decorative" val="1"/>
+                <adec:decorative xmlns:adec="http://schemas.microsoft.com/office/drawing/2017/decorative" xmlns="" val="1"/>
               </a:ext>
             </a:extLst>
           </p:cNvPr>
@@ -21495,7 +21728,7 @@
                 <a16:creationId xmlns:a16="http://schemas.microsoft.com/office/drawing/2014/main" id="{8D71EDA1-87BF-4D5D-AB79-F346FD19278A}"/>
               </a:ext>
               <a:ext uri="{C183D7F6-B498-43B3-948B-1728B52AA6E4}">
-                <adec:decorative xmlns:adec="http://schemas.microsoft.com/office/drawing/2017/decorative" val="1"/>
+                <adec:decorative xmlns:adec="http://schemas.microsoft.com/office/drawing/2017/decorative" xmlns="" val="1"/>
               </a:ext>
             </a:extLst>
           </p:cNvPr>
@@ -21702,6 +21935,13 @@
   <p:clrMapOvr>
     <a:masterClrMapping/>
   </p:clrMapOvr>
+  <p:timing>
+    <p:tnLst>
+      <p:par>
+        <p:cTn id="1" dur="indefinite" restart="never" nodeType="tmRoot"/>
+      </p:par>
+    </p:tnLst>
+  </p:timing>
 </p:sld>
 </file>
 
@@ -21751,6 +21991,10 @@
               </a:rPr>
               <a:t>A Single-Model Approach to Medical Image Classification</a:t>
             </a:r>
+            <a:r>
+              <a:rPr lang="en-US" b="1" dirty="0"/>
+              <a:t/>
+            </a:r>
             <a:br>
               <a:rPr lang="en-US" b="1" dirty="0"/>
             </a:br>
@@ -21827,6 +22071,13 @@
   <p:clrMapOvr>
     <a:masterClrMapping/>
   </p:clrMapOvr>
+  <p:timing>
+    <p:tnLst>
+      <p:par>
+        <p:cTn id="1" dur="indefinite" restart="never" nodeType="tmRoot"/>
+      </p:par>
+    </p:tnLst>
+  </p:timing>
 </p:sld>
 </file>
 
@@ -21869,7 +22120,7 @@
                 <a16:creationId xmlns:a16="http://schemas.microsoft.com/office/drawing/2014/main" id="{7E824B15-ABBC-1909-8CAA-3E66D0EAEC94}"/>
               </a:ext>
               <a:ext uri="{C183D7F6-B498-43B3-948B-1728B52AA6E4}">
-                <adec:decorative xmlns:adec="http://schemas.microsoft.com/office/drawing/2017/decorative" val="1"/>
+                <adec:decorative xmlns:adec="http://schemas.microsoft.com/office/drawing/2017/decorative" xmlns="" val="1"/>
               </a:ext>
             </a:extLst>
           </p:cNvPr>
@@ -21945,7 +22196,7 @@
                 <a16:creationId xmlns:a16="http://schemas.microsoft.com/office/drawing/2014/main" id="{1028D89E-19DE-ACE9-6001-B86F7FC91E52}"/>
               </a:ext>
               <a:ext uri="{C183D7F6-B498-43B3-948B-1728B52AA6E4}">
-                <adec:decorative xmlns:adec="http://schemas.microsoft.com/office/drawing/2017/decorative" val="1"/>
+                <adec:decorative xmlns:adec="http://schemas.microsoft.com/office/drawing/2017/decorative" xmlns="" val="1"/>
               </a:ext>
             </a:extLst>
           </p:cNvPr>
@@ -22021,7 +22272,7 @@
                 <a16:creationId xmlns:a16="http://schemas.microsoft.com/office/drawing/2014/main" id="{9B194A45-4386-3285-18CD-9BAB30C09833}"/>
               </a:ext>
               <a:ext uri="{C183D7F6-B498-43B3-948B-1728B52AA6E4}">
-                <adec:decorative xmlns:adec="http://schemas.microsoft.com/office/drawing/2017/decorative" val="1"/>
+                <adec:decorative xmlns:adec="http://schemas.microsoft.com/office/drawing/2017/decorative" xmlns="" val="1"/>
               </a:ext>
             </a:extLst>
           </p:cNvPr>
@@ -22094,7 +22345,7 @@
                 <a16:creationId xmlns:a16="http://schemas.microsoft.com/office/drawing/2014/main" id="{837F18F5-27AF-330B-3C50-A7321B9A6029}"/>
               </a:ext>
               <a:ext uri="{C183D7F6-B498-43B3-948B-1728B52AA6E4}">
-                <adec:decorative xmlns:adec="http://schemas.microsoft.com/office/drawing/2017/decorative" val="1"/>
+                <adec:decorative xmlns:adec="http://schemas.microsoft.com/office/drawing/2017/decorative" xmlns="" val="1"/>
               </a:ext>
             </a:extLst>
           </p:cNvPr>
@@ -22169,7 +22420,7 @@
                 <a16:creationId xmlns:a16="http://schemas.microsoft.com/office/drawing/2014/main" id="{4359857A-4221-7E0D-8276-0BB659955052}"/>
               </a:ext>
               <a:ext uri="{C183D7F6-B498-43B3-948B-1728B52AA6E4}">
-                <adec:decorative xmlns:adec="http://schemas.microsoft.com/office/drawing/2017/decorative" val="1"/>
+                <adec:decorative xmlns:adec="http://schemas.microsoft.com/office/drawing/2017/decorative" xmlns="" val="1"/>
               </a:ext>
             </a:extLst>
           </p:cNvPr>
@@ -22244,7 +22495,7 @@
                 <a16:creationId xmlns:a16="http://schemas.microsoft.com/office/drawing/2014/main" id="{B2DFBD1E-F957-FC4B-28D9-7E1EDEF78C1B}"/>
               </a:ext>
               <a:ext uri="{C183D7F6-B498-43B3-948B-1728B52AA6E4}">
-                <adec:decorative xmlns:adec="http://schemas.microsoft.com/office/drawing/2017/decorative" val="1"/>
+                <adec:decorative xmlns:adec="http://schemas.microsoft.com/office/drawing/2017/decorative" xmlns="" val="1"/>
               </a:ext>
             </a:extLst>
           </p:cNvPr>
@@ -22414,7 +22665,7 @@
                 <a16:creationId xmlns:a16="http://schemas.microsoft.com/office/drawing/2014/main" id="{E0D079CF-CADF-32D0-10A4-8066692E6618}"/>
               </a:ext>
               <a:ext uri="{C183D7F6-B498-43B3-948B-1728B52AA6E4}">
-                <adec:decorative xmlns:adec="http://schemas.microsoft.com/office/drawing/2017/decorative" val="1"/>
+                <adec:decorative xmlns:adec="http://schemas.microsoft.com/office/drawing/2017/decorative" xmlns="" val="1"/>
               </a:ext>
             </a:extLst>
           </p:cNvPr>
@@ -22542,7 +22793,7 @@
         </p:spPr>
         <p:txBody>
           <a:bodyPr anchor="ctr">
-            <a:normAutofit fontScale="77500" lnSpcReduction="20000"/>
+            <a:normAutofit fontScale="70000" lnSpcReduction="20000"/>
           </a:bodyPr>
           <a:lstStyle/>
           <a:p>
@@ -22681,6 +22932,13 @@
   <p:clrMapOvr>
     <a:masterClrMapping/>
   </p:clrMapOvr>
+  <p:timing>
+    <p:tnLst>
+      <p:par>
+        <p:cTn id="1" dur="indefinite" restart="never" nodeType="tmRoot"/>
+      </p:par>
+    </p:tnLst>
+  </p:timing>
 </p:sld>
 </file>
 
@@ -22717,7 +22975,7 @@
                 <a16:creationId xmlns:a16="http://schemas.microsoft.com/office/drawing/2014/main" id="{09588DA8-065E-4F6F-8EFD-43104AB2E0CF}"/>
               </a:ext>
               <a:ext uri="{C183D7F6-B498-43B3-948B-1728B52AA6E4}">
-                <adec:decorative xmlns:adec="http://schemas.microsoft.com/office/drawing/2017/decorative" val="1"/>
+                <adec:decorative xmlns:adec="http://schemas.microsoft.com/office/drawing/2017/decorative" xmlns="" val="1"/>
               </a:ext>
             </a:extLst>
           </p:cNvPr>
@@ -22793,7 +23051,7 @@
                 <a16:creationId xmlns:a16="http://schemas.microsoft.com/office/drawing/2014/main" id="{C4285719-470E-454C-AF62-8323075F1F5B}"/>
               </a:ext>
               <a:ext uri="{C183D7F6-B498-43B3-948B-1728B52AA6E4}">
-                <adec:decorative xmlns:adec="http://schemas.microsoft.com/office/drawing/2017/decorative" val="1"/>
+                <adec:decorative xmlns:adec="http://schemas.microsoft.com/office/drawing/2017/decorative" xmlns="" val="1"/>
               </a:ext>
             </a:extLst>
           </p:cNvPr>
@@ -22869,7 +23127,7 @@
                 <a16:creationId xmlns:a16="http://schemas.microsoft.com/office/drawing/2014/main" id="{CD9FE4EF-C4D8-49A0-B2FF-81D8DB7D8A24}"/>
               </a:ext>
               <a:ext uri="{C183D7F6-B498-43B3-948B-1728B52AA6E4}">
-                <adec:decorative xmlns:adec="http://schemas.microsoft.com/office/drawing/2017/decorative" val="1"/>
+                <adec:decorative xmlns:adec="http://schemas.microsoft.com/office/drawing/2017/decorative" xmlns="" val="1"/>
               </a:ext>
             </a:extLst>
           </p:cNvPr>
@@ -22942,7 +23200,7 @@
                 <a16:creationId xmlns:a16="http://schemas.microsoft.com/office/drawing/2014/main" id="{4300840D-0A0B-4512-BACA-B439D5B9C57C}"/>
               </a:ext>
               <a:ext uri="{C183D7F6-B498-43B3-948B-1728B52AA6E4}">
-                <adec:decorative xmlns:adec="http://schemas.microsoft.com/office/drawing/2017/decorative" val="1"/>
+                <adec:decorative xmlns:adec="http://schemas.microsoft.com/office/drawing/2017/decorative" xmlns="" val="1"/>
               </a:ext>
             </a:extLst>
           </p:cNvPr>
@@ -23017,7 +23275,7 @@
                 <a16:creationId xmlns:a16="http://schemas.microsoft.com/office/drawing/2014/main" id="{D2B78728-A580-49A7-84F9-6EF6F583ADE0}"/>
               </a:ext>
               <a:ext uri="{C183D7F6-B498-43B3-948B-1728B52AA6E4}">
-                <adec:decorative xmlns:adec="http://schemas.microsoft.com/office/drawing/2017/decorative" val="1"/>
+                <adec:decorative xmlns:adec="http://schemas.microsoft.com/office/drawing/2017/decorative" xmlns="" val="1"/>
               </a:ext>
             </a:extLst>
           </p:cNvPr>
@@ -23092,7 +23350,7 @@
                 <a16:creationId xmlns:a16="http://schemas.microsoft.com/office/drawing/2014/main" id="{38FAA1A1-D861-433F-88FA-1E9D6FD31D11}"/>
               </a:ext>
               <a:ext uri="{C183D7F6-B498-43B3-948B-1728B52AA6E4}">
-                <adec:decorative xmlns:adec="http://schemas.microsoft.com/office/drawing/2017/decorative" val="1"/>
+                <adec:decorative xmlns:adec="http://schemas.microsoft.com/office/drawing/2017/decorative" xmlns="" val="1"/>
               </a:ext>
             </a:extLst>
           </p:cNvPr>
@@ -23262,7 +23520,7 @@
                 <a16:creationId xmlns:a16="http://schemas.microsoft.com/office/drawing/2014/main" id="{8D71EDA1-87BF-4D5D-AB79-F346FD19278A}"/>
               </a:ext>
               <a:ext uri="{C183D7F6-B498-43B3-948B-1728B52AA6E4}">
-                <adec:decorative xmlns:adec="http://schemas.microsoft.com/office/drawing/2017/decorative" val="1"/>
+                <adec:decorative xmlns:adec="http://schemas.microsoft.com/office/drawing/2017/decorative" xmlns="" val="1"/>
               </a:ext>
             </a:extLst>
           </p:cNvPr>
@@ -23560,6 +23818,13 @@
   <p:clrMapOvr>
     <a:masterClrMapping/>
   </p:clrMapOvr>
+  <p:timing>
+    <p:tnLst>
+      <p:par>
+        <p:cTn id="1" dur="indefinite" restart="never" nodeType="tmRoot"/>
+      </p:par>
+    </p:tnLst>
+  </p:timing>
 </p:sld>
 </file>
 
@@ -23609,13 +23874,13 @@
         </p:nvSpPr>
         <p:spPr>
           <a:xfrm>
-            <a:off x="460237" y="229444"/>
-            <a:ext cx="8223525" cy="413809"/>
+            <a:off x="460237" y="0"/>
+            <a:ext cx="8223525" cy="643253"/>
           </a:xfrm>
         </p:spPr>
         <p:txBody>
           <a:bodyPr anchor="b">
-            <a:normAutofit fontScale="90000"/>
+            <a:normAutofit/>
           </a:bodyPr>
           <a:lstStyle/>
           <a:p>
@@ -23623,7 +23888,7 @@
               <a:buNone/>
             </a:pPr>
             <a:r>
-              <a:rPr lang="en-US" sz="3500" dirty="0">
+              <a:rPr lang="en-US" sz="2400" b="1" dirty="0">
                 <a:solidFill>
                   <a:srgbClr val="FFFFFF"/>
                 </a:solidFill>
@@ -23677,6 +23942,10 @@
             <a:pPr marL="0" indent="0" defTabSz="914400">
               <a:buNone/>
             </a:pPr>
+            <a:r>
+              <a:rPr lang="en-US" sz="1600" dirty="0"/>
+              <a:t/>
+            </a:r>
             <a:br>
               <a:rPr lang="en-US" sz="1600" dirty="0"/>
             </a:br>
@@ -23698,8 +23967,8 @@
         </p:nvSpPr>
         <p:spPr>
           <a:xfrm>
-            <a:off x="385011" y="747526"/>
-            <a:ext cx="8005010" cy="5709255"/>
+            <a:off x="272867" y="643253"/>
+            <a:ext cx="8298751" cy="5893921"/>
           </a:xfrm>
           <a:prstGeom prst="rect">
             <a:avLst/>
@@ -23723,14 +23992,14 @@
               <a:buChar char="q"/>
             </a:pPr>
             <a:r>
-              <a:rPr lang="en-US" sz="1600" dirty="0"/>
+              <a:rPr lang="en-US" sz="1400" dirty="0"/>
               <a:t>Three different platforms – Windows , Linux and Mac to support</a:t>
             </a:r>
             <a:br>
-              <a:rPr lang="en-US" sz="1600" dirty="0"/>
+              <a:rPr lang="en-US" sz="1400" dirty="0"/>
             </a:br>
             <a:r>
-              <a:rPr lang="en-US" sz="1600" dirty="0"/>
+              <a:rPr lang="en-US" sz="1400" dirty="0"/>
               <a:t>Different python versions , different development environments.</a:t>
             </a:r>
           </a:p>
@@ -23746,14 +24015,14 @@
               <a:buChar char="q"/>
             </a:pPr>
             <a:r>
-              <a:rPr lang="en-US" sz="1600" dirty="0"/>
+              <a:rPr lang="en-US" sz="1400" dirty="0"/>
               <a:t>First we kept a free-style phase – for everybody to learn and research and provide useful ideas. Requirement documents were created. Readme files in GitHub describing code structure , features and how to run</a:t>
             </a:r>
             <a:br>
-              <a:rPr lang="en-US" sz="1600" dirty="0"/>
+              <a:rPr lang="en-US" sz="1400" dirty="0"/>
             </a:br>
             <a:r>
-              <a:rPr lang="en-US" sz="1600" dirty="0"/>
+              <a:rPr lang="en-US" sz="1400" dirty="0"/>
               <a:t>https://github.com/lmanov1/DL_DiabeticRetinopathyStagePrediction/tree/main</a:t>
             </a:r>
           </a:p>
@@ -23769,7 +24038,7 @@
               <a:buChar char="q"/>
             </a:pPr>
             <a:r>
-              <a:rPr lang="en-US" sz="1600" dirty="0"/>
+              <a:rPr lang="en-US" sz="1400" dirty="0"/>
               <a:t>Starting from this point and on – subsequent results synchronization was done via shared drive location:  in shared document , including pre-agreed set of metrics for unified comparison criteria and notebooks</a:t>
             </a:r>
           </a:p>
@@ -23785,7 +24054,7 @@
               <a:buChar char="q"/>
             </a:pPr>
             <a:r>
-              <a:rPr lang="en-US" sz="1600" dirty="0"/>
+              <a:rPr lang="en-US" sz="1400" dirty="0"/>
               <a:t>Widely agreed code kept in GitHub, features development managed in branches and with follow up using GitHub issues and conversations.</a:t>
             </a:r>
           </a:p>
@@ -23801,7 +24070,7 @@
               <a:buChar char="q"/>
             </a:pPr>
             <a:r>
-              <a:rPr lang="en-US" sz="1600" dirty="0"/>
+              <a:rPr lang="en-US" sz="1400" dirty="0"/>
               <a:t>As training is very heavy  – subsequent models were run on AWS Jupiter machine as most of us have no GPU or not enough memory resources @ dev environment. </a:t>
             </a:r>
           </a:p>
@@ -23817,7 +24086,7 @@
               <a:buChar char="q"/>
             </a:pPr>
             <a:r>
-              <a:rPr lang="en-US" sz="1600" dirty="0"/>
+              <a:rPr lang="en-US" sz="1400" dirty="0"/>
               <a:t>The results and performance evaluation are kept in shared document in drive. Multiple meetings kept , multiple hands-on sessions to solve problems</a:t>
             </a:r>
           </a:p>
@@ -23833,6 +24102,13 @@
   <p:clrMapOvr>
     <a:overrideClrMapping bg1="dk1" tx1="lt1" bg2="dk2" tx2="lt2" accent1="accent1" accent2="accent2" accent3="accent3" accent4="accent4" accent5="accent5" accent6="accent6" hlink="hlink" folHlink="folHlink"/>
   </p:clrMapOvr>
+  <p:timing>
+    <p:tnLst>
+      <p:par>
+        <p:cTn id="1" dur="indefinite" restart="never" nodeType="tmRoot"/>
+      </p:par>
+    </p:tnLst>
+  </p:timing>
 </p:sld>
 </file>
 
@@ -24044,6 +24320,13 @@
   <p:clrMapOvr>
     <a:masterClrMapping/>
   </p:clrMapOvr>
+  <p:timing>
+    <p:tnLst>
+      <p:par>
+        <p:cTn id="1" dur="indefinite" restart="never" nodeType="tmRoot"/>
+      </p:par>
+    </p:tnLst>
+  </p:timing>
 </p:sld>
 </file>
 
@@ -24088,13 +24371,13 @@
         </p:nvSpPr>
         <p:spPr>
           <a:xfrm>
-            <a:off x="110349" y="85909"/>
-            <a:ext cx="8223525" cy="413809"/>
+            <a:off x="110349" y="241539"/>
+            <a:ext cx="8223525" cy="520461"/>
           </a:xfrm>
         </p:spPr>
         <p:txBody>
           <a:bodyPr anchor="b">
-            <a:normAutofit fontScale="90000"/>
+            <a:normAutofit/>
           </a:bodyPr>
           <a:lstStyle/>
           <a:p>
@@ -24102,7 +24385,7 @@
               <a:buNone/>
             </a:pPr>
             <a:r>
-              <a:rPr lang="en-US" sz="3500" dirty="0">
+              <a:rPr lang="en-US" sz="2800" b="1" dirty="0">
                 <a:solidFill>
                   <a:srgbClr val="FFFFFF"/>
                 </a:solidFill>
@@ -24156,6 +24439,10 @@
             <a:pPr marL="0" indent="0" defTabSz="914400">
               <a:buNone/>
             </a:pPr>
+            <a:r>
+              <a:rPr lang="en-US" sz="1600" dirty="0"/>
+              <a:t/>
+            </a:r>
             <a:br>
               <a:rPr lang="en-US" sz="1600" dirty="0"/>
             </a:br>
@@ -24178,7 +24465,7 @@
         <p:spPr>
           <a:xfrm>
             <a:off x="268706" y="762001"/>
-            <a:ext cx="8606588" cy="3970318"/>
+            <a:ext cx="8606588" cy="5632311"/>
           </a:xfrm>
           <a:prstGeom prst="rect">
             <a:avLst/>
@@ -24305,32 +24592,45 @@
             </a:pPr>
             <a:r>
               <a:rPr lang="en-US" dirty="0"/>
-              <a:t>Custom data preprocessing pipeline with sharpen/denoise/Laplacian sharpen/</a:t>
+              <a:t>Custom data preprocessing pipeline with sharpen/</a:t>
             </a:r>
             <a:r>
               <a:rPr lang="en-US" dirty="0" err="1"/>
+              <a:t>denoise</a:t>
+            </a:r>
+            <a:r>
+              <a:rPr lang="en-US" dirty="0"/>
+              <a:t>/Laplacian </a:t>
+            </a:r>
+            <a:r>
+              <a:rPr lang="en-US" dirty="0" smtClean="0"/>
+              <a:t>sharpen/</a:t>
+            </a:r>
+            <a:r>
+              <a:rPr lang="en-US" dirty="0" err="1" smtClean="0"/>
               <a:t>high_pass_filter</a:t>
             </a:r>
             <a:r>
-              <a:rPr lang="en-US" dirty="0"/>
+              <a:rPr lang="en-US" dirty="0" smtClean="0"/>
               <a:t>/</a:t>
             </a:r>
             <a:r>
-              <a:rPr lang="en-US" dirty="0" err="1"/>
+              <a:rPr lang="en-US" dirty="0" err="1" smtClean="0"/>
               <a:t>enhance_contrast</a:t>
             </a:r>
             <a:r>
-              <a:rPr lang="en-US" dirty="0"/>
+              <a:rPr lang="en-US" dirty="0" smtClean="0"/>
               <a:t>/</a:t>
             </a:r>
             <a:r>
-              <a:rPr lang="en-US" dirty="0" err="1"/>
+              <a:rPr lang="en-US" dirty="0" err="1" smtClean="0"/>
               <a:t>adjust_gamma</a:t>
             </a:r>
             <a:r>
-              <a:rPr lang="en-US" dirty="0"/>
-              <a:t>/clamp</a:t>
-            </a:r>
+              <a:rPr lang="en-US" dirty="0" smtClean="0"/>
+              <a:t>/clam</a:t>
+            </a:r>
+            <a:endParaRPr lang="en-US" dirty="0"/>
           </a:p>
         </p:txBody>
       </p:sp>
@@ -24344,6 +24644,2270 @@
   <p:clrMapOvr>
     <a:masterClrMapping/>
   </p:clrMapOvr>
+  <p:timing>
+    <p:tnLst>
+      <p:par>
+        <p:cTn id="1" dur="indefinite" restart="never" nodeType="tmRoot"/>
+      </p:par>
+    </p:tnLst>
+  </p:timing>
+</p:sld>
+</file>
+
+<file path=ppt/slides/slide25.xml><?xml version="1.0" encoding="utf-8"?>
+<p:sld xmlns:a="http://schemas.openxmlformats.org/drawingml/2006/main" xmlns:r="http://schemas.openxmlformats.org/officeDocument/2006/relationships" xmlns:p="http://schemas.openxmlformats.org/presentationml/2006/main">
+  <p:cSld>
+    <p:spTree>
+      <p:nvGrpSpPr>
+        <p:cNvPr id="1" name=""/>
+        <p:cNvGrpSpPr/>
+        <p:nvPr/>
+      </p:nvGrpSpPr>
+      <p:grpSpPr>
+        <a:xfrm>
+          <a:off x="0" y="0"/>
+          <a:ext cx="0" cy="0"/>
+          <a:chOff x="0" y="0"/>
+          <a:chExt cx="0" cy="0"/>
+        </a:xfrm>
+      </p:grpSpPr>
+      <p:sp>
+        <p:nvSpPr>
+          <p:cNvPr id="3" name="מציין מיקום תוכן 2"/>
+          <p:cNvSpPr>
+            <a:spLocks noGrp="1"/>
+          </p:cNvSpPr>
+          <p:nvPr>
+            <p:ph idx="1"/>
+          </p:nvPr>
+        </p:nvSpPr>
+        <p:spPr>
+          <a:xfrm>
+            <a:off x="628650" y="77639"/>
+            <a:ext cx="7886700" cy="6660042"/>
+          </a:xfrm>
+        </p:spPr>
+        <p:txBody>
+          <a:bodyPr>
+            <a:normAutofit/>
+          </a:bodyPr>
+          <a:lstStyle/>
+          <a:p>
+            <a:pPr marL="0" indent="0">
+              <a:buNone/>
+            </a:pPr>
+            <a:r>
+              <a:rPr lang="en-US" dirty="0"/>
+              <a:t># Define the </a:t>
+            </a:r>
+            <a:r>
+              <a:rPr lang="en-US" dirty="0" err="1"/>
+              <a:t>DataBlock</a:t>
+            </a:r>
+            <a:endParaRPr lang="en-US" dirty="0"/>
+          </a:p>
+          <a:p>
+            <a:pPr marL="0" indent="0">
+              <a:buNone/>
+            </a:pPr>
+            <a:r>
+              <a:rPr lang="en-US" dirty="0" err="1"/>
+              <a:t>dblock</a:t>
+            </a:r>
+            <a:r>
+              <a:rPr lang="en-US" dirty="0"/>
+              <a:t> = </a:t>
+            </a:r>
+            <a:r>
+              <a:rPr lang="en-US" dirty="0" err="1"/>
+              <a:t>DataBlock</a:t>
+            </a:r>
+            <a:r>
+              <a:rPr lang="en-US" dirty="0" smtClean="0"/>
+              <a:t>(</a:t>
+            </a:r>
+            <a:endParaRPr lang="en-US" dirty="0"/>
+          </a:p>
+          <a:p>
+            <a:pPr marL="0" indent="0">
+              <a:buNone/>
+            </a:pPr>
+            <a:r>
+              <a:rPr lang="en-US" dirty="0"/>
+              <a:t>    blocks=(</a:t>
+            </a:r>
+            <a:r>
+              <a:rPr lang="en-US" dirty="0" err="1" smtClean="0"/>
+              <a:t>ImageBlock,CategoryBlock</a:t>
+            </a:r>
+            <a:r>
+              <a:rPr lang="en-US" dirty="0"/>
+              <a:t>),     </a:t>
+            </a:r>
+            <a:endParaRPr lang="en-US" dirty="0" smtClean="0"/>
+          </a:p>
+          <a:p>
+            <a:pPr marL="0" indent="0">
+              <a:buNone/>
+            </a:pPr>
+            <a:r>
+              <a:rPr lang="en-US" dirty="0" smtClean="0"/>
+              <a:t>   	</a:t>
+            </a:r>
+            <a:r>
+              <a:rPr lang="en-US" dirty="0" err="1" smtClean="0"/>
+              <a:t>get_items</a:t>
+            </a:r>
+            <a:r>
+              <a:rPr lang="en-US" dirty="0" smtClean="0"/>
+              <a:t>=</a:t>
+            </a:r>
+            <a:r>
+              <a:rPr lang="en-US" dirty="0" err="1" smtClean="0"/>
+              <a:t>get_image_files</a:t>
+            </a:r>
+            <a:r>
+              <a:rPr lang="en-US" dirty="0"/>
+              <a:t>, </a:t>
+            </a:r>
+            <a:endParaRPr lang="en-US" dirty="0" smtClean="0"/>
+          </a:p>
+          <a:p>
+            <a:pPr marL="0" indent="0">
+              <a:buNone/>
+            </a:pPr>
+            <a:r>
+              <a:rPr lang="en-US" dirty="0"/>
+              <a:t>     splitter=</a:t>
+            </a:r>
+            <a:r>
+              <a:rPr lang="en-US" dirty="0" err="1"/>
+              <a:t>RandomSplitter</a:t>
+            </a:r>
+            <a:r>
+              <a:rPr lang="en-US" dirty="0"/>
+              <a:t>(</a:t>
+            </a:r>
+            <a:r>
+              <a:rPr lang="en-US" dirty="0" err="1"/>
+              <a:t>valid_pct</a:t>
+            </a:r>
+            <a:r>
+              <a:rPr lang="en-US" dirty="0"/>
+              <a:t>=0.2, </a:t>
+            </a:r>
+            <a:r>
+              <a:rPr lang="en-US" dirty="0" smtClean="0"/>
+              <a:t>									seed=42</a:t>
+            </a:r>
+            <a:r>
+              <a:rPr lang="en-US" dirty="0"/>
+              <a:t>),  </a:t>
+            </a:r>
+            <a:endParaRPr lang="en-US" dirty="0" smtClean="0"/>
+          </a:p>
+          <a:p>
+            <a:pPr marL="0" indent="0">
+              <a:buNone/>
+            </a:pPr>
+            <a:r>
+              <a:rPr lang="en-US" dirty="0"/>
+              <a:t>    </a:t>
+            </a:r>
+            <a:r>
+              <a:rPr lang="en-US" dirty="0" err="1"/>
+              <a:t>get_y</a:t>
+            </a:r>
+            <a:r>
+              <a:rPr lang="en-US" dirty="0"/>
+              <a:t>=</a:t>
+            </a:r>
+            <a:r>
+              <a:rPr lang="en-US" dirty="0" err="1"/>
+              <a:t>parent_label</a:t>
+            </a:r>
+            <a:r>
+              <a:rPr lang="en-US" dirty="0"/>
+              <a:t>, </a:t>
+            </a:r>
+            <a:endParaRPr lang="en-US" dirty="0" smtClean="0"/>
+          </a:p>
+          <a:p>
+            <a:pPr marL="0" indent="0">
+              <a:buNone/>
+            </a:pPr>
+            <a:r>
+              <a:rPr lang="en-US" dirty="0"/>
+              <a:t>    </a:t>
+            </a:r>
+            <a:r>
+              <a:rPr lang="en-US" dirty="0" err="1"/>
+              <a:t>item_tfms</a:t>
+            </a:r>
+            <a:r>
+              <a:rPr lang="en-US" dirty="0"/>
+              <a:t>=Resize(460),  </a:t>
+            </a:r>
+            <a:endParaRPr lang="en-US" dirty="0" smtClean="0"/>
+          </a:p>
+          <a:p>
+            <a:pPr marL="0" indent="0">
+              <a:buNone/>
+            </a:pPr>
+            <a:r>
+              <a:rPr lang="en-US" dirty="0"/>
+              <a:t>    </a:t>
+            </a:r>
+            <a:r>
+              <a:rPr lang="en-US" dirty="0" err="1"/>
+              <a:t>batch_tfms</a:t>
+            </a:r>
+            <a:r>
+              <a:rPr lang="en-US" dirty="0"/>
+              <a:t>=</a:t>
+            </a:r>
+            <a:r>
+              <a:rPr lang="en-US" dirty="0" err="1"/>
+              <a:t>aug_transforms</a:t>
+            </a:r>
+            <a:r>
+              <a:rPr lang="en-US" dirty="0"/>
+              <a:t>(size=224</a:t>
+            </a:r>
+            <a:r>
+              <a:rPr lang="en-US" dirty="0" smtClean="0"/>
+              <a:t>)</a:t>
+            </a:r>
+          </a:p>
+          <a:p>
+            <a:pPr marL="0" indent="0">
+              <a:buNone/>
+            </a:pPr>
+            <a:r>
+              <a:rPr lang="en-US" dirty="0" smtClean="0"/>
+              <a:t>)</a:t>
+            </a:r>
+            <a:endParaRPr lang="en-US" dirty="0"/>
+          </a:p>
+          <a:p>
+            <a:pPr marL="0" indent="0">
+              <a:buNone/>
+            </a:pPr>
+            <a:r>
+              <a:rPr lang="en-US" dirty="0"/>
+              <a:t/>
+            </a:r>
+            <a:br>
+              <a:rPr lang="en-US" dirty="0"/>
+            </a:br>
+            <a:r>
+              <a:rPr lang="en-US" dirty="0" smtClean="0"/>
+              <a:t>path </a:t>
+            </a:r>
+            <a:r>
+              <a:rPr lang="en-US" dirty="0"/>
+              <a:t>= Path('data/train19')</a:t>
+            </a:r>
+          </a:p>
+          <a:p>
+            <a:pPr marL="0" indent="0">
+              <a:buNone/>
+            </a:pPr>
+            <a:r>
+              <a:rPr lang="en-US" dirty="0" err="1"/>
+              <a:t>dls</a:t>
+            </a:r>
+            <a:r>
+              <a:rPr lang="en-US" dirty="0"/>
+              <a:t> = </a:t>
+            </a:r>
+            <a:r>
+              <a:rPr lang="en-US" dirty="0" err="1"/>
+              <a:t>dblock.dataloaders</a:t>
+            </a:r>
+            <a:r>
+              <a:rPr lang="en-US" dirty="0"/>
+              <a:t>(path, </a:t>
+            </a:r>
+            <a:r>
+              <a:rPr lang="en-US" dirty="0" err="1"/>
+              <a:t>bs</a:t>
+            </a:r>
+            <a:r>
+              <a:rPr lang="en-US" dirty="0"/>
+              <a:t>=8, </a:t>
+            </a:r>
+            <a:r>
+              <a:rPr lang="en-US" dirty="0" smtClean="0"/>
+              <a:t>									</a:t>
+            </a:r>
+            <a:r>
+              <a:rPr lang="en-US" dirty="0" err="1" smtClean="0"/>
+              <a:t>num_workers</a:t>
+            </a:r>
+            <a:r>
+              <a:rPr lang="en-US" dirty="0" smtClean="0"/>
+              <a:t>=0</a:t>
+            </a:r>
+            <a:r>
+              <a:rPr lang="en-US" dirty="0"/>
+              <a:t>)</a:t>
+            </a:r>
+          </a:p>
+          <a:p>
+            <a:pPr marL="0" indent="0">
+              <a:buNone/>
+            </a:pPr>
+            <a:r>
+              <a:rPr lang="en-US" dirty="0"/>
+              <a:t/>
+            </a:r>
+            <a:br>
+              <a:rPr lang="en-US" dirty="0"/>
+            </a:br>
+            <a:endParaRPr lang="en-US" dirty="0"/>
+          </a:p>
+          <a:p>
+            <a:endParaRPr lang="he-IL" sz="6400" dirty="0"/>
+          </a:p>
+        </p:txBody>
+      </p:sp>
+      <p:sp>
+        <p:nvSpPr>
+          <p:cNvPr id="4" name="לחצן פעולה: חזרה 3">
+            <a:hlinkClick r:id="rId2" action="ppaction://hlinksldjump" highlightClick="1"/>
+          </p:cNvPr>
+          <p:cNvSpPr/>
+          <p:nvPr/>
+        </p:nvSpPr>
+        <p:spPr>
+          <a:xfrm>
+            <a:off x="7280694" y="5503653"/>
+            <a:ext cx="474453" cy="509409"/>
+          </a:xfrm>
+          <a:prstGeom prst="actionButtonReturn">
+            <a:avLst/>
+          </a:prstGeom>
+        </p:spPr>
+        <p:style>
+          <a:lnRef idx="2">
+            <a:schemeClr val="accent1">
+              <a:shade val="50000"/>
+            </a:schemeClr>
+          </a:lnRef>
+          <a:fillRef idx="1">
+            <a:schemeClr val="accent1"/>
+          </a:fillRef>
+          <a:effectRef idx="0">
+            <a:schemeClr val="accent1"/>
+          </a:effectRef>
+          <a:fontRef idx="minor">
+            <a:schemeClr val="lt1"/>
+          </a:fontRef>
+        </p:style>
+        <p:txBody>
+          <a:bodyPr rtlCol="1" anchor="ctr"/>
+          <a:lstStyle/>
+          <a:p>
+            <a:pPr algn="ctr"/>
+            <a:endParaRPr lang="he-IL"/>
+          </a:p>
+        </p:txBody>
+      </p:sp>
+    </p:spTree>
+    <p:extLst>
+      <p:ext uri="{BB962C8B-B14F-4D97-AF65-F5344CB8AC3E}">
+        <p14:creationId xmlns:p14="http://schemas.microsoft.com/office/powerpoint/2010/main" val="1574439017"/>
+      </p:ext>
+    </p:extLst>
+  </p:cSld>
+  <p:clrMapOvr>
+    <a:masterClrMapping/>
+  </p:clrMapOvr>
+  <p:timing>
+    <p:tnLst>
+      <p:par>
+        <p:cTn id="1" dur="indefinite" restart="never" nodeType="tmRoot"/>
+      </p:par>
+    </p:tnLst>
+  </p:timing>
+</p:sld>
+</file>
+
+<file path=ppt/slides/slide26.xml><?xml version="1.0" encoding="utf-8"?>
+<p:sld xmlns:a="http://schemas.openxmlformats.org/drawingml/2006/main" xmlns:r="http://schemas.openxmlformats.org/officeDocument/2006/relationships" xmlns:p="http://schemas.openxmlformats.org/presentationml/2006/main">
+  <p:cSld>
+    <p:spTree>
+      <p:nvGrpSpPr>
+        <p:cNvPr id="1" name=""/>
+        <p:cNvGrpSpPr/>
+        <p:nvPr/>
+      </p:nvGrpSpPr>
+      <p:grpSpPr>
+        <a:xfrm>
+          <a:off x="0" y="0"/>
+          <a:ext cx="0" cy="0"/>
+          <a:chOff x="0" y="0"/>
+          <a:chExt cx="0" cy="0"/>
+        </a:xfrm>
+      </p:grpSpPr>
+      <p:sp>
+        <p:nvSpPr>
+          <p:cNvPr id="3" name="מציין מיקום תוכן 2"/>
+          <p:cNvSpPr>
+            <a:spLocks noGrp="1"/>
+          </p:cNvSpPr>
+          <p:nvPr>
+            <p:ph idx="1"/>
+          </p:nvPr>
+        </p:nvSpPr>
+        <p:spPr>
+          <a:xfrm>
+            <a:off x="628650" y="77639"/>
+            <a:ext cx="7886700" cy="6660042"/>
+          </a:xfrm>
+        </p:spPr>
+        <p:txBody>
+          <a:bodyPr>
+            <a:normAutofit fontScale="25000" lnSpcReduction="20000"/>
+          </a:bodyPr>
+          <a:lstStyle/>
+          <a:p>
+            <a:pPr marL="0" indent="0">
+              <a:buNone/>
+            </a:pPr>
+            <a:r>
+              <a:rPr lang="en-US" sz="6400" dirty="0"/>
+              <a:t>class </a:t>
+            </a:r>
+            <a:r>
+              <a:rPr lang="en-US" sz="6400" dirty="0" err="1"/>
+              <a:t>EarlyStopping</a:t>
+            </a:r>
+            <a:r>
+              <a:rPr lang="en-US" sz="6400" dirty="0"/>
+              <a:t>:</a:t>
+            </a:r>
+          </a:p>
+          <a:p>
+            <a:pPr marL="0" indent="0">
+              <a:buNone/>
+            </a:pPr>
+            <a:r>
+              <a:rPr lang="en-US" sz="6400" dirty="0"/>
+              <a:t/>
+            </a:r>
+            <a:br>
+              <a:rPr lang="en-US" sz="6400" dirty="0"/>
+            </a:br>
+            <a:r>
+              <a:rPr lang="en-US" sz="6400" dirty="0"/>
+              <a:t>    </a:t>
+            </a:r>
+            <a:r>
+              <a:rPr lang="en-US" sz="6400" dirty="0" err="1"/>
+              <a:t>def</a:t>
+            </a:r>
+            <a:r>
+              <a:rPr lang="en-US" sz="6400" dirty="0"/>
+              <a:t> __</a:t>
+            </a:r>
+            <a:r>
+              <a:rPr lang="en-US" sz="6400" dirty="0" err="1"/>
+              <a:t>init</a:t>
+            </a:r>
+            <a:r>
+              <a:rPr lang="en-US" sz="6400" dirty="0"/>
+              <a:t>__(self, patience=5, </a:t>
+            </a:r>
+            <a:r>
+              <a:rPr lang="en-US" sz="6400" dirty="0" err="1"/>
+              <a:t>min_delta</a:t>
+            </a:r>
+            <a:r>
+              <a:rPr lang="en-US" sz="6400" dirty="0"/>
+              <a:t>=0.0):</a:t>
+            </a:r>
+          </a:p>
+          <a:p>
+            <a:pPr marL="0" indent="0">
+              <a:buNone/>
+            </a:pPr>
+            <a:r>
+              <a:rPr lang="en-US" sz="6400" dirty="0"/>
+              <a:t>        </a:t>
+            </a:r>
+            <a:r>
+              <a:rPr lang="en-US" sz="6400" dirty="0" err="1"/>
+              <a:t>self.patience</a:t>
+            </a:r>
+            <a:r>
+              <a:rPr lang="en-US" sz="6400" dirty="0"/>
+              <a:t> = patience</a:t>
+            </a:r>
+          </a:p>
+          <a:p>
+            <a:pPr marL="0" indent="0">
+              <a:buNone/>
+            </a:pPr>
+            <a:r>
+              <a:rPr lang="en-US" sz="6400" dirty="0"/>
+              <a:t>        </a:t>
+            </a:r>
+            <a:r>
+              <a:rPr lang="en-US" sz="6400" dirty="0" err="1"/>
+              <a:t>self.min_delta</a:t>
+            </a:r>
+            <a:r>
+              <a:rPr lang="en-US" sz="6400" dirty="0"/>
+              <a:t> = </a:t>
+            </a:r>
+            <a:r>
+              <a:rPr lang="en-US" sz="6400" dirty="0" err="1"/>
+              <a:t>min_delta</a:t>
+            </a:r>
+            <a:endParaRPr lang="en-US" sz="6400" dirty="0"/>
+          </a:p>
+          <a:p>
+            <a:pPr marL="0" indent="0">
+              <a:buNone/>
+            </a:pPr>
+            <a:r>
+              <a:rPr lang="en-US" sz="6400" dirty="0"/>
+              <a:t>        </a:t>
+            </a:r>
+            <a:r>
+              <a:rPr lang="en-US" sz="6400" dirty="0" err="1"/>
+              <a:t>self.counter</a:t>
+            </a:r>
+            <a:r>
+              <a:rPr lang="en-US" sz="6400" dirty="0"/>
+              <a:t> = 0</a:t>
+            </a:r>
+          </a:p>
+          <a:p>
+            <a:pPr marL="0" indent="0">
+              <a:buNone/>
+            </a:pPr>
+            <a:r>
+              <a:rPr lang="en-US" sz="6400" dirty="0"/>
+              <a:t>        </a:t>
+            </a:r>
+            <a:r>
+              <a:rPr lang="en-US" sz="6400" dirty="0" err="1"/>
+              <a:t>self.best_loss</a:t>
+            </a:r>
+            <a:r>
+              <a:rPr lang="en-US" sz="6400" dirty="0"/>
+              <a:t> = float('</a:t>
+            </a:r>
+            <a:r>
+              <a:rPr lang="en-US" sz="6400" dirty="0" err="1"/>
+              <a:t>inf</a:t>
+            </a:r>
+            <a:r>
+              <a:rPr lang="en-US" sz="6400" dirty="0"/>
+              <a:t>')</a:t>
+            </a:r>
+          </a:p>
+          <a:p>
+            <a:pPr marL="0" indent="0">
+              <a:buNone/>
+            </a:pPr>
+            <a:r>
+              <a:rPr lang="en-US" sz="6400" dirty="0"/>
+              <a:t>        </a:t>
+            </a:r>
+            <a:r>
+              <a:rPr lang="en-US" sz="6400" dirty="0" err="1"/>
+              <a:t>self.stopped_epoch</a:t>
+            </a:r>
+            <a:r>
+              <a:rPr lang="en-US" sz="6400" dirty="0"/>
+              <a:t> = 0</a:t>
+            </a:r>
+          </a:p>
+          <a:p>
+            <a:pPr marL="0" indent="0">
+              <a:buNone/>
+            </a:pPr>
+            <a:r>
+              <a:rPr lang="en-US" sz="6400" dirty="0"/>
+              <a:t/>
+            </a:r>
+            <a:br>
+              <a:rPr lang="en-US" sz="6400" dirty="0"/>
+            </a:br>
+            <a:r>
+              <a:rPr lang="en-US" sz="6400" dirty="0"/>
+              <a:t>    </a:t>
+            </a:r>
+            <a:r>
+              <a:rPr lang="en-US" sz="6400" dirty="0" err="1"/>
+              <a:t>def</a:t>
+            </a:r>
+            <a:r>
+              <a:rPr lang="en-US" sz="6400" dirty="0"/>
+              <a:t> __call__(self, </a:t>
+            </a:r>
+            <a:r>
+              <a:rPr lang="en-US" sz="6400" dirty="0" err="1"/>
+              <a:t>val_loss</a:t>
+            </a:r>
+            <a:r>
+              <a:rPr lang="en-US" sz="6400" dirty="0"/>
+              <a:t>):</a:t>
+            </a:r>
+          </a:p>
+          <a:p>
+            <a:pPr marL="0" indent="0">
+              <a:buNone/>
+            </a:pPr>
+            <a:r>
+              <a:rPr lang="en-US" sz="6400" dirty="0"/>
+              <a:t>                if </a:t>
+            </a:r>
+            <a:r>
+              <a:rPr lang="en-US" sz="6400" dirty="0" err="1"/>
+              <a:t>self.best_loss</a:t>
+            </a:r>
+            <a:r>
+              <a:rPr lang="en-US" sz="6400" dirty="0"/>
+              <a:t> - </a:t>
+            </a:r>
+            <a:r>
+              <a:rPr lang="en-US" sz="6400" dirty="0" err="1"/>
+              <a:t>val_loss</a:t>
+            </a:r>
+            <a:r>
+              <a:rPr lang="en-US" sz="6400" dirty="0"/>
+              <a:t> &gt; </a:t>
+            </a:r>
+            <a:r>
+              <a:rPr lang="en-US" sz="6400" dirty="0" err="1"/>
+              <a:t>self.min_delta</a:t>
+            </a:r>
+            <a:r>
+              <a:rPr lang="en-US" sz="6400" dirty="0"/>
+              <a:t>:</a:t>
+            </a:r>
+          </a:p>
+          <a:p>
+            <a:pPr marL="0" indent="0">
+              <a:buNone/>
+            </a:pPr>
+            <a:r>
+              <a:rPr lang="en-US" sz="6400" dirty="0"/>
+              <a:t>            </a:t>
+            </a:r>
+            <a:r>
+              <a:rPr lang="en-US" sz="6400" dirty="0" err="1"/>
+              <a:t>self.best_loss</a:t>
+            </a:r>
+            <a:r>
+              <a:rPr lang="en-US" sz="6400" dirty="0"/>
+              <a:t> = </a:t>
+            </a:r>
+            <a:r>
+              <a:rPr lang="en-US" sz="6400" dirty="0" err="1"/>
+              <a:t>val_loss</a:t>
+            </a:r>
+            <a:endParaRPr lang="en-US" sz="6400" dirty="0"/>
+          </a:p>
+          <a:p>
+            <a:pPr marL="0" indent="0">
+              <a:buNone/>
+            </a:pPr>
+            <a:r>
+              <a:rPr lang="en-US" sz="6400" dirty="0"/>
+              <a:t>            </a:t>
+            </a:r>
+            <a:r>
+              <a:rPr lang="en-US" sz="6400" dirty="0" err="1"/>
+              <a:t>self.counter</a:t>
+            </a:r>
+            <a:r>
+              <a:rPr lang="en-US" sz="6400" dirty="0"/>
+              <a:t> = 0  # </a:t>
+            </a:r>
+            <a:r>
+              <a:rPr lang="en-US" sz="6400" dirty="0" smtClean="0"/>
+              <a:t>improvement</a:t>
+            </a:r>
+            <a:endParaRPr lang="en-US" sz="6400" dirty="0"/>
+          </a:p>
+          <a:p>
+            <a:pPr marL="0" indent="0">
+              <a:buNone/>
+            </a:pPr>
+            <a:r>
+              <a:rPr lang="en-US" sz="6400" dirty="0"/>
+              <a:t>        else:</a:t>
+            </a:r>
+          </a:p>
+          <a:p>
+            <a:pPr marL="0" indent="0">
+              <a:buNone/>
+            </a:pPr>
+            <a:r>
+              <a:rPr lang="en-US" sz="6400" dirty="0"/>
+              <a:t>            </a:t>
+            </a:r>
+            <a:r>
+              <a:rPr lang="en-US" sz="6400" dirty="0" err="1"/>
+              <a:t>self.counter</a:t>
+            </a:r>
+            <a:r>
+              <a:rPr lang="en-US" sz="6400" dirty="0"/>
+              <a:t> += 1  # </a:t>
+            </a:r>
+            <a:r>
+              <a:rPr lang="en-US" sz="6400" dirty="0" smtClean="0"/>
+              <a:t>no </a:t>
+            </a:r>
+            <a:r>
+              <a:rPr lang="en-US" sz="6400" dirty="0"/>
+              <a:t>improvement</a:t>
+            </a:r>
+          </a:p>
+          <a:p>
+            <a:pPr marL="0" indent="0">
+              <a:buNone/>
+            </a:pPr>
+            <a:r>
+              <a:rPr lang="en-US" sz="6400" dirty="0"/>
+              <a:t/>
+            </a:r>
+            <a:br>
+              <a:rPr lang="en-US" sz="6400" dirty="0"/>
+            </a:br>
+            <a:r>
+              <a:rPr lang="en-US" sz="6400" dirty="0"/>
+              <a:t>        if </a:t>
+            </a:r>
+            <a:r>
+              <a:rPr lang="en-US" sz="6400" dirty="0" err="1"/>
+              <a:t>self.counter</a:t>
+            </a:r>
+            <a:r>
+              <a:rPr lang="en-US" sz="6400" dirty="0"/>
+              <a:t> &gt;= </a:t>
+            </a:r>
+            <a:r>
+              <a:rPr lang="en-US" sz="6400" dirty="0" err="1"/>
+              <a:t>self.patience</a:t>
+            </a:r>
+            <a:r>
+              <a:rPr lang="en-US" sz="6400" dirty="0"/>
+              <a:t>:</a:t>
+            </a:r>
+          </a:p>
+          <a:p>
+            <a:pPr marL="0" indent="0">
+              <a:buNone/>
+            </a:pPr>
+            <a:r>
+              <a:rPr lang="en-US" sz="6400" dirty="0"/>
+              <a:t>            </a:t>
+            </a:r>
+            <a:r>
+              <a:rPr lang="en-US" sz="6400" dirty="0" err="1"/>
+              <a:t>self.stopped_epoch</a:t>
+            </a:r>
+            <a:r>
+              <a:rPr lang="en-US" sz="6400" dirty="0"/>
+              <a:t> = </a:t>
+            </a:r>
+            <a:r>
+              <a:rPr lang="en-US" sz="6400" dirty="0" err="1"/>
+              <a:t>self.counter</a:t>
+            </a:r>
+            <a:endParaRPr lang="en-US" sz="6400" dirty="0"/>
+          </a:p>
+          <a:p>
+            <a:pPr marL="0" indent="0">
+              <a:buNone/>
+            </a:pPr>
+            <a:r>
+              <a:rPr lang="en-US" sz="6400" dirty="0"/>
+              <a:t>            return True  # Stop training</a:t>
+            </a:r>
+          </a:p>
+          <a:p>
+            <a:pPr marL="0" indent="0">
+              <a:buNone/>
+            </a:pPr>
+            <a:r>
+              <a:rPr lang="en-US" sz="6400" dirty="0"/>
+              <a:t/>
+            </a:r>
+            <a:br>
+              <a:rPr lang="en-US" sz="6400" dirty="0"/>
+            </a:br>
+            <a:r>
+              <a:rPr lang="en-US" sz="6400" dirty="0"/>
+              <a:t>        return False  # </a:t>
+            </a:r>
+            <a:r>
+              <a:rPr lang="en-US" sz="6400" dirty="0" smtClean="0"/>
+              <a:t>Continue </a:t>
+            </a:r>
+            <a:r>
+              <a:rPr lang="en-US" sz="6400" dirty="0"/>
+              <a:t>training</a:t>
+            </a:r>
+          </a:p>
+          <a:p>
+            <a:endParaRPr lang="he-IL" sz="6400" dirty="0"/>
+          </a:p>
+        </p:txBody>
+      </p:sp>
+    </p:spTree>
+    <p:extLst>
+      <p:ext uri="{BB962C8B-B14F-4D97-AF65-F5344CB8AC3E}">
+        <p14:creationId xmlns:p14="http://schemas.microsoft.com/office/powerpoint/2010/main" val="4268908068"/>
+      </p:ext>
+    </p:extLst>
+  </p:cSld>
+  <p:clrMapOvr>
+    <a:masterClrMapping/>
+  </p:clrMapOvr>
+  <p:timing>
+    <p:tnLst>
+      <p:par>
+        <p:cTn id="1" dur="indefinite" restart="never" nodeType="tmRoot"/>
+      </p:par>
+    </p:tnLst>
+  </p:timing>
+</p:sld>
+</file>
+
+<file path=ppt/slides/slide27.xml><?xml version="1.0" encoding="utf-8"?>
+<p:sld xmlns:a="http://schemas.openxmlformats.org/drawingml/2006/main" xmlns:r="http://schemas.openxmlformats.org/officeDocument/2006/relationships" xmlns:p="http://schemas.openxmlformats.org/presentationml/2006/main">
+  <p:cSld>
+    <p:spTree>
+      <p:nvGrpSpPr>
+        <p:cNvPr id="1" name=""/>
+        <p:cNvGrpSpPr/>
+        <p:nvPr/>
+      </p:nvGrpSpPr>
+      <p:grpSpPr>
+        <a:xfrm>
+          <a:off x="0" y="0"/>
+          <a:ext cx="0" cy="0"/>
+          <a:chOff x="0" y="0"/>
+          <a:chExt cx="0" cy="0"/>
+        </a:xfrm>
+      </p:grpSpPr>
+      <p:sp>
+        <p:nvSpPr>
+          <p:cNvPr id="3" name="מציין מיקום תוכן 2"/>
+          <p:cNvSpPr>
+            <a:spLocks noGrp="1"/>
+          </p:cNvSpPr>
+          <p:nvPr>
+            <p:ph idx="1"/>
+          </p:nvPr>
+        </p:nvSpPr>
+        <p:spPr>
+          <a:xfrm>
+            <a:off x="628650" y="77639"/>
+            <a:ext cx="7886700" cy="6660042"/>
+          </a:xfrm>
+        </p:spPr>
+        <p:txBody>
+          <a:bodyPr>
+            <a:normAutofit fontScale="62500" lnSpcReduction="20000"/>
+          </a:bodyPr>
+          <a:lstStyle/>
+          <a:p>
+            <a:pPr marL="0" indent="0">
+              <a:buNone/>
+            </a:pPr>
+            <a:r>
+              <a:rPr lang="en-US" dirty="0" smtClean="0"/>
+              <a:t># </a:t>
+            </a:r>
+            <a:r>
+              <a:rPr lang="en-US" dirty="0"/>
+              <a:t>Replace with your actual </a:t>
+            </a:r>
+            <a:r>
+              <a:rPr lang="en-US" dirty="0" smtClean="0"/>
+              <a:t>cl</a:t>
+            </a:r>
+            <a:r>
+              <a:rPr lang="en-US" dirty="0"/>
+              <a:t>ass </a:t>
+            </a:r>
+            <a:r>
+              <a:rPr lang="en-US" dirty="0" smtClean="0"/>
+              <a:t>distribution</a:t>
+            </a:r>
+          </a:p>
+          <a:p>
+            <a:pPr marL="0" indent="0">
+              <a:buNone/>
+            </a:pPr>
+            <a:r>
+              <a:rPr lang="en-US" dirty="0" err="1" smtClean="0"/>
+              <a:t>class_counts</a:t>
+            </a:r>
+            <a:r>
+              <a:rPr lang="en-US" dirty="0" smtClean="0"/>
+              <a:t> </a:t>
+            </a:r>
+            <a:r>
+              <a:rPr lang="en-US" dirty="0"/>
+              <a:t>= [1805, 1311, 1000, 1000, 1000] </a:t>
+            </a:r>
+            <a:endParaRPr lang="en-US" dirty="0" smtClean="0"/>
+          </a:p>
+          <a:p>
+            <a:pPr marL="0" indent="0">
+              <a:buNone/>
+            </a:pPr>
+            <a:endParaRPr lang="en-US" dirty="0" smtClean="0"/>
+          </a:p>
+          <a:p>
+            <a:pPr marL="0" indent="0">
+              <a:buNone/>
+            </a:pPr>
+            <a:r>
+              <a:rPr lang="en-US" dirty="0" err="1" smtClean="0"/>
+              <a:t>class_weights</a:t>
+            </a:r>
+            <a:r>
+              <a:rPr lang="en-US" dirty="0" smtClean="0"/>
+              <a:t> </a:t>
+            </a:r>
+            <a:r>
+              <a:rPr lang="en-US" dirty="0"/>
+              <a:t>= [1.0 / count for count in </a:t>
+            </a:r>
+            <a:r>
+              <a:rPr lang="en-US" dirty="0" err="1"/>
+              <a:t>class_counts</a:t>
+            </a:r>
+            <a:r>
+              <a:rPr lang="en-US" dirty="0"/>
+              <a:t>]</a:t>
+            </a:r>
+          </a:p>
+          <a:p>
+            <a:pPr marL="0" indent="0">
+              <a:buNone/>
+            </a:pPr>
+            <a:r>
+              <a:rPr lang="en-US" dirty="0" err="1"/>
+              <a:t>class_weights</a:t>
+            </a:r>
+            <a:r>
+              <a:rPr lang="en-US" dirty="0"/>
+              <a:t> = </a:t>
+            </a:r>
+            <a:r>
+              <a:rPr lang="en-US" dirty="0" err="1"/>
+              <a:t>torch.tensor</a:t>
+            </a:r>
+            <a:r>
+              <a:rPr lang="en-US" dirty="0"/>
+              <a:t>(</a:t>
+            </a:r>
+            <a:r>
+              <a:rPr lang="en-US" dirty="0" err="1"/>
+              <a:t>class_weights</a:t>
+            </a:r>
+            <a:r>
+              <a:rPr lang="en-US" dirty="0"/>
+              <a:t>, </a:t>
+            </a:r>
+            <a:r>
+              <a:rPr lang="en-US" dirty="0" err="1"/>
+              <a:t>dtype</a:t>
+            </a:r>
+            <a:r>
+              <a:rPr lang="en-US" dirty="0"/>
+              <a:t>=torch.float32)</a:t>
+            </a:r>
+          </a:p>
+          <a:p>
+            <a:pPr marL="0" indent="0">
+              <a:buNone/>
+            </a:pPr>
+            <a:r>
+              <a:rPr lang="en-US" dirty="0"/>
+              <a:t/>
+            </a:r>
+            <a:br>
+              <a:rPr lang="en-US" dirty="0"/>
+            </a:br>
+            <a:r>
+              <a:rPr lang="en-US" dirty="0" err="1"/>
+              <a:t>def</a:t>
+            </a:r>
+            <a:r>
+              <a:rPr lang="en-US" dirty="0"/>
+              <a:t> </a:t>
+            </a:r>
+            <a:r>
+              <a:rPr lang="en-US" dirty="0" err="1"/>
+              <a:t>get_sample_weights</a:t>
+            </a:r>
+            <a:r>
+              <a:rPr lang="en-US" dirty="0"/>
+              <a:t>(</a:t>
+            </a:r>
+            <a:r>
+              <a:rPr lang="en-US" dirty="0" err="1"/>
+              <a:t>dls</a:t>
+            </a:r>
+            <a:r>
+              <a:rPr lang="en-US" dirty="0"/>
+              <a:t>, </a:t>
+            </a:r>
+            <a:r>
+              <a:rPr lang="en-US" dirty="0" err="1"/>
+              <a:t>class_weights</a:t>
+            </a:r>
+            <a:r>
+              <a:rPr lang="en-US" dirty="0"/>
+              <a:t>):</a:t>
+            </a:r>
+          </a:p>
+          <a:p>
+            <a:pPr marL="0" indent="0">
+              <a:buNone/>
+            </a:pPr>
+            <a:r>
+              <a:rPr lang="en-US" dirty="0"/>
+              <a:t>    </a:t>
+            </a:r>
+            <a:r>
+              <a:rPr lang="en-US" dirty="0" err="1"/>
+              <a:t>sample_weights</a:t>
+            </a:r>
+            <a:r>
+              <a:rPr lang="en-US" dirty="0"/>
+              <a:t> = []</a:t>
+            </a:r>
+          </a:p>
+          <a:p>
+            <a:pPr marL="0" indent="0">
+              <a:buNone/>
+            </a:pPr>
+            <a:r>
+              <a:rPr lang="en-US" dirty="0"/>
+              <a:t>    for </a:t>
+            </a:r>
+            <a:r>
+              <a:rPr lang="en-US" dirty="0" err="1"/>
+              <a:t>idx</a:t>
+            </a:r>
+            <a:r>
+              <a:rPr lang="en-US" dirty="0"/>
+              <a:t> in range(</a:t>
+            </a:r>
+            <a:r>
+              <a:rPr lang="en-US" dirty="0" err="1"/>
+              <a:t>len</a:t>
+            </a:r>
+            <a:r>
+              <a:rPr lang="en-US" dirty="0"/>
+              <a:t>(</a:t>
+            </a:r>
+            <a:r>
+              <a:rPr lang="en-US" dirty="0" err="1"/>
+              <a:t>dls.train_ds</a:t>
+            </a:r>
+            <a:r>
+              <a:rPr lang="en-US" dirty="0"/>
+              <a:t>)):</a:t>
+            </a:r>
+          </a:p>
+          <a:p>
+            <a:pPr marL="0" indent="0">
+              <a:buNone/>
+            </a:pPr>
+            <a:r>
+              <a:rPr lang="en-US" dirty="0"/>
+              <a:t>        label = </a:t>
+            </a:r>
+            <a:r>
+              <a:rPr lang="en-US" dirty="0" err="1"/>
+              <a:t>dls.train_ds</a:t>
+            </a:r>
+            <a:r>
+              <a:rPr lang="en-US" dirty="0"/>
+              <a:t>[</a:t>
+            </a:r>
+            <a:r>
+              <a:rPr lang="en-US" dirty="0" err="1"/>
+              <a:t>idx</a:t>
+            </a:r>
+            <a:r>
+              <a:rPr lang="en-US" dirty="0"/>
+              <a:t>][1]  # Get the label of each sample</a:t>
+            </a:r>
+          </a:p>
+          <a:p>
+            <a:pPr marL="0" indent="0">
+              <a:buNone/>
+            </a:pPr>
+            <a:r>
+              <a:rPr lang="en-US" dirty="0"/>
+              <a:t>        </a:t>
+            </a:r>
+            <a:r>
+              <a:rPr lang="en-US" dirty="0" err="1"/>
+              <a:t>sample_weights.append</a:t>
+            </a:r>
+            <a:r>
+              <a:rPr lang="en-US" dirty="0"/>
+              <a:t>(</a:t>
+            </a:r>
+            <a:r>
+              <a:rPr lang="en-US" dirty="0" err="1"/>
+              <a:t>class_weights</a:t>
+            </a:r>
+            <a:r>
+              <a:rPr lang="en-US" dirty="0"/>
+              <a:t>[label])</a:t>
+            </a:r>
+          </a:p>
+          <a:p>
+            <a:pPr marL="0" indent="0">
+              <a:buNone/>
+            </a:pPr>
+            <a:r>
+              <a:rPr lang="en-US" dirty="0"/>
+              <a:t>    return </a:t>
+            </a:r>
+            <a:r>
+              <a:rPr lang="en-US" dirty="0" err="1"/>
+              <a:t>torch.tensor</a:t>
+            </a:r>
+            <a:r>
+              <a:rPr lang="en-US" dirty="0"/>
+              <a:t>(</a:t>
+            </a:r>
+            <a:r>
+              <a:rPr lang="en-US" dirty="0" err="1"/>
+              <a:t>sample_weights</a:t>
+            </a:r>
+            <a:r>
+              <a:rPr lang="en-US" dirty="0"/>
+              <a:t>, </a:t>
+            </a:r>
+            <a:r>
+              <a:rPr lang="en-US" dirty="0" err="1"/>
+              <a:t>dtype</a:t>
+            </a:r>
+            <a:r>
+              <a:rPr lang="en-US" dirty="0"/>
+              <a:t>=torch.float32)</a:t>
+            </a:r>
+          </a:p>
+          <a:p>
+            <a:pPr marL="0" indent="0">
+              <a:buNone/>
+            </a:pPr>
+            <a:r>
+              <a:rPr lang="en-US" dirty="0"/>
+              <a:t/>
+            </a:r>
+            <a:br>
+              <a:rPr lang="en-US" dirty="0"/>
+            </a:br>
+            <a:r>
+              <a:rPr lang="en-US" dirty="0"/>
+              <a:t># Compute sample weights</a:t>
+            </a:r>
+          </a:p>
+          <a:p>
+            <a:pPr marL="0" indent="0">
+              <a:buNone/>
+            </a:pPr>
+            <a:r>
+              <a:rPr lang="en-US" dirty="0" err="1"/>
+              <a:t>sample_weights</a:t>
+            </a:r>
+            <a:r>
+              <a:rPr lang="en-US" dirty="0"/>
+              <a:t> = </a:t>
+            </a:r>
+            <a:r>
+              <a:rPr lang="en-US" dirty="0" err="1"/>
+              <a:t>get_sample_weights</a:t>
+            </a:r>
+            <a:r>
+              <a:rPr lang="en-US" dirty="0"/>
+              <a:t>(</a:t>
+            </a:r>
+            <a:r>
+              <a:rPr lang="en-US" dirty="0" err="1"/>
+              <a:t>dls</a:t>
+            </a:r>
+            <a:r>
+              <a:rPr lang="en-US" dirty="0"/>
+              <a:t>, </a:t>
+            </a:r>
+            <a:r>
+              <a:rPr lang="en-US" dirty="0" err="1"/>
+              <a:t>class_weights</a:t>
+            </a:r>
+            <a:r>
+              <a:rPr lang="en-US" dirty="0"/>
+              <a:t>)</a:t>
+            </a:r>
+          </a:p>
+          <a:p>
+            <a:pPr marL="0" indent="0">
+              <a:buNone/>
+            </a:pPr>
+            <a:r>
+              <a:rPr lang="en-US" dirty="0"/>
+              <a:t/>
+            </a:r>
+            <a:br>
+              <a:rPr lang="en-US" dirty="0"/>
+            </a:br>
+            <a:r>
+              <a:rPr lang="en-US" dirty="0" err="1"/>
+              <a:t>weighted_sampler</a:t>
+            </a:r>
+            <a:r>
+              <a:rPr lang="en-US" dirty="0"/>
+              <a:t> = </a:t>
+            </a:r>
+            <a:r>
+              <a:rPr lang="en-US" dirty="0" err="1"/>
+              <a:t>torch.utils.data.WeightedRandomSampler</a:t>
+            </a:r>
+            <a:r>
+              <a:rPr lang="en-US" dirty="0"/>
+              <a:t>(</a:t>
+            </a:r>
+          </a:p>
+          <a:p>
+            <a:pPr marL="0" indent="0">
+              <a:buNone/>
+            </a:pPr>
+            <a:r>
+              <a:rPr lang="en-US" dirty="0"/>
+              <a:t>    weights=</a:t>
+            </a:r>
+            <a:r>
+              <a:rPr lang="en-US" dirty="0" err="1"/>
+              <a:t>sample_weights</a:t>
+            </a:r>
+            <a:r>
+              <a:rPr lang="en-US" dirty="0"/>
+              <a:t>,</a:t>
+            </a:r>
+          </a:p>
+          <a:p>
+            <a:pPr marL="0" indent="0">
+              <a:buNone/>
+            </a:pPr>
+            <a:r>
+              <a:rPr lang="en-US" dirty="0"/>
+              <a:t>    </a:t>
+            </a:r>
+            <a:r>
+              <a:rPr lang="en-US" dirty="0" err="1"/>
+              <a:t>num_samples</a:t>
+            </a:r>
+            <a:r>
+              <a:rPr lang="en-US" dirty="0"/>
+              <a:t>=</a:t>
+            </a:r>
+            <a:r>
+              <a:rPr lang="en-US" dirty="0" err="1"/>
+              <a:t>len</a:t>
+            </a:r>
+            <a:r>
+              <a:rPr lang="en-US" dirty="0"/>
+              <a:t>(</a:t>
+            </a:r>
+            <a:r>
+              <a:rPr lang="en-US" dirty="0" err="1"/>
+              <a:t>sample_weights</a:t>
+            </a:r>
+            <a:r>
+              <a:rPr lang="en-US" dirty="0"/>
+              <a:t>),  # Number of samples in an epoch</a:t>
+            </a:r>
+          </a:p>
+          <a:p>
+            <a:pPr marL="0" indent="0">
+              <a:buNone/>
+            </a:pPr>
+            <a:r>
+              <a:rPr lang="en-US" dirty="0"/>
+              <a:t>    replacement=True  # Sampling with replacement</a:t>
+            </a:r>
+          </a:p>
+          <a:p>
+            <a:pPr marL="0" indent="0">
+              <a:buNone/>
+            </a:pPr>
+            <a:r>
+              <a:rPr lang="en-US" dirty="0"/>
+              <a:t>)</a:t>
+            </a:r>
+          </a:p>
+          <a:p>
+            <a:pPr marL="0" indent="0">
+              <a:buNone/>
+            </a:pPr>
+            <a:r>
+              <a:rPr lang="en-US" dirty="0"/>
+              <a:t/>
+            </a:r>
+            <a:br>
+              <a:rPr lang="en-US" dirty="0"/>
+            </a:br>
+            <a:r>
+              <a:rPr lang="en-US" dirty="0"/>
+              <a:t># Replace the default train </a:t>
+            </a:r>
+            <a:r>
+              <a:rPr lang="en-US" dirty="0" err="1"/>
+              <a:t>DataLoader's</a:t>
+            </a:r>
+            <a:r>
+              <a:rPr lang="en-US" dirty="0"/>
+              <a:t> sampler</a:t>
+            </a:r>
+          </a:p>
+          <a:p>
+            <a:pPr marL="0" indent="0">
+              <a:buNone/>
+            </a:pPr>
+            <a:r>
+              <a:rPr lang="en-US" dirty="0" err="1"/>
+              <a:t>dls.train.loader</a:t>
+            </a:r>
+            <a:r>
+              <a:rPr lang="en-US" dirty="0"/>
+              <a:t> = </a:t>
+            </a:r>
+            <a:r>
+              <a:rPr lang="en-US" dirty="0" err="1"/>
+              <a:t>torch.utils.data.DataLoader</a:t>
+            </a:r>
+            <a:r>
+              <a:rPr lang="en-US" dirty="0"/>
+              <a:t>(</a:t>
+            </a:r>
+          </a:p>
+          <a:p>
+            <a:pPr marL="0" indent="0">
+              <a:buNone/>
+            </a:pPr>
+            <a:r>
+              <a:rPr lang="en-US" dirty="0"/>
+              <a:t>    </a:t>
+            </a:r>
+            <a:r>
+              <a:rPr lang="en-US" dirty="0" err="1"/>
+              <a:t>dls.train_ds</a:t>
+            </a:r>
+            <a:r>
+              <a:rPr lang="en-US" dirty="0"/>
+              <a:t>,</a:t>
+            </a:r>
+          </a:p>
+          <a:p>
+            <a:pPr marL="0" indent="0">
+              <a:buNone/>
+            </a:pPr>
+            <a:r>
+              <a:rPr lang="en-US" dirty="0"/>
+              <a:t>    </a:t>
+            </a:r>
+            <a:r>
+              <a:rPr lang="en-US" dirty="0" err="1"/>
+              <a:t>batch_size</a:t>
+            </a:r>
+            <a:r>
+              <a:rPr lang="en-US" dirty="0"/>
+              <a:t>=8,</a:t>
+            </a:r>
+          </a:p>
+          <a:p>
+            <a:pPr marL="0" indent="0">
+              <a:buNone/>
+            </a:pPr>
+            <a:r>
+              <a:rPr lang="en-US" dirty="0"/>
+              <a:t>    sampler=</a:t>
+            </a:r>
+            <a:r>
+              <a:rPr lang="en-US" dirty="0" err="1"/>
+              <a:t>weighted_sampler</a:t>
+            </a:r>
+            <a:r>
+              <a:rPr lang="en-US" dirty="0"/>
+              <a:t>,</a:t>
+            </a:r>
+          </a:p>
+          <a:p>
+            <a:pPr marL="0" indent="0">
+              <a:buNone/>
+            </a:pPr>
+            <a:r>
+              <a:rPr lang="en-US" dirty="0"/>
+              <a:t>    </a:t>
+            </a:r>
+            <a:r>
+              <a:rPr lang="en-US" dirty="0" err="1"/>
+              <a:t>num_workers</a:t>
+            </a:r>
+            <a:r>
+              <a:rPr lang="en-US" dirty="0"/>
+              <a:t>=0</a:t>
+            </a:r>
+          </a:p>
+          <a:p>
+            <a:pPr marL="0" indent="0">
+              <a:buNone/>
+            </a:pPr>
+            <a:r>
+              <a:rPr lang="en-US" dirty="0"/>
+              <a:t>)</a:t>
+            </a:r>
+          </a:p>
+          <a:p>
+            <a:endParaRPr lang="he-IL" sz="6400" dirty="0"/>
+          </a:p>
+        </p:txBody>
+      </p:sp>
+      <p:sp>
+        <p:nvSpPr>
+          <p:cNvPr id="4" name="לחצן פעולה: חזרה 3">
+            <a:hlinkClick r:id="rId2" action="ppaction://hlinksldjump" highlightClick="1"/>
+          </p:cNvPr>
+          <p:cNvSpPr/>
+          <p:nvPr/>
+        </p:nvSpPr>
+        <p:spPr>
+          <a:xfrm>
+            <a:off x="7427343" y="6064145"/>
+            <a:ext cx="785004" cy="449024"/>
+          </a:xfrm>
+          <a:prstGeom prst="actionButtonReturn">
+            <a:avLst/>
+          </a:prstGeom>
+        </p:spPr>
+        <p:style>
+          <a:lnRef idx="2">
+            <a:schemeClr val="accent1">
+              <a:shade val="50000"/>
+            </a:schemeClr>
+          </a:lnRef>
+          <a:fillRef idx="1">
+            <a:schemeClr val="accent1"/>
+          </a:fillRef>
+          <a:effectRef idx="0">
+            <a:schemeClr val="accent1"/>
+          </a:effectRef>
+          <a:fontRef idx="minor">
+            <a:schemeClr val="lt1"/>
+          </a:fontRef>
+        </p:style>
+        <p:txBody>
+          <a:bodyPr rtlCol="1" anchor="ctr"/>
+          <a:lstStyle/>
+          <a:p>
+            <a:pPr algn="ctr"/>
+            <a:endParaRPr lang="he-IL"/>
+          </a:p>
+        </p:txBody>
+      </p:sp>
+    </p:spTree>
+    <p:extLst>
+      <p:ext uri="{BB962C8B-B14F-4D97-AF65-F5344CB8AC3E}">
+        <p14:creationId xmlns:p14="http://schemas.microsoft.com/office/powerpoint/2010/main" val="3193903496"/>
+      </p:ext>
+    </p:extLst>
+  </p:cSld>
+  <p:clrMapOvr>
+    <a:masterClrMapping/>
+  </p:clrMapOvr>
+  <p:timing>
+    <p:tnLst>
+      <p:par>
+        <p:cTn id="1" dur="indefinite" restart="never" nodeType="tmRoot"/>
+      </p:par>
+    </p:tnLst>
+  </p:timing>
+</p:sld>
+</file>
+
+<file path=ppt/slides/slide28.xml><?xml version="1.0" encoding="utf-8"?>
+<p:sld xmlns:a="http://schemas.openxmlformats.org/drawingml/2006/main" xmlns:r="http://schemas.openxmlformats.org/officeDocument/2006/relationships" xmlns:p="http://schemas.openxmlformats.org/presentationml/2006/main">
+  <p:cSld>
+    <p:spTree>
+      <p:nvGrpSpPr>
+        <p:cNvPr id="1" name=""/>
+        <p:cNvGrpSpPr/>
+        <p:nvPr/>
+      </p:nvGrpSpPr>
+      <p:grpSpPr>
+        <a:xfrm>
+          <a:off x="0" y="0"/>
+          <a:ext cx="0" cy="0"/>
+          <a:chOff x="0" y="0"/>
+          <a:chExt cx="0" cy="0"/>
+        </a:xfrm>
+      </p:grpSpPr>
+      <p:sp>
+        <p:nvSpPr>
+          <p:cNvPr id="3" name="מציין מיקום תוכן 2"/>
+          <p:cNvSpPr>
+            <a:spLocks noGrp="1"/>
+          </p:cNvSpPr>
+          <p:nvPr>
+            <p:ph idx="1"/>
+          </p:nvPr>
+        </p:nvSpPr>
+        <p:spPr>
+          <a:xfrm>
+            <a:off x="628650" y="77639"/>
+            <a:ext cx="7886700" cy="6660042"/>
+          </a:xfrm>
+        </p:spPr>
+        <p:txBody>
+          <a:bodyPr>
+            <a:normAutofit fontScale="32500" lnSpcReduction="20000"/>
+          </a:bodyPr>
+          <a:lstStyle/>
+          <a:p>
+            <a:pPr marL="0" indent="0">
+              <a:buNone/>
+            </a:pPr>
+            <a:r>
+              <a:rPr lang="en-US" sz="4900" dirty="0"/>
+              <a:t>class </a:t>
+            </a:r>
+            <a:r>
+              <a:rPr lang="en-US" sz="4900" dirty="0" err="1"/>
+              <a:t>PretrainedEyeDiseaseClassifier</a:t>
+            </a:r>
+            <a:r>
+              <a:rPr lang="en-US" sz="4900" dirty="0"/>
+              <a:t>(</a:t>
+            </a:r>
+            <a:r>
+              <a:rPr lang="en-US" sz="4900" dirty="0" err="1"/>
+              <a:t>nn.Module</a:t>
+            </a:r>
+            <a:r>
+              <a:rPr lang="en-US" sz="4900" dirty="0"/>
+              <a:t>, </a:t>
+            </a:r>
+            <a:r>
+              <a:rPr lang="en-US" sz="4900" dirty="0" err="1"/>
+              <a:t>CustomModelMethods</a:t>
+            </a:r>
+            <a:r>
+              <a:rPr lang="en-US" sz="4900" dirty="0"/>
+              <a:t>):</a:t>
+            </a:r>
+          </a:p>
+          <a:p>
+            <a:pPr marL="0" indent="0">
+              <a:buNone/>
+            </a:pPr>
+            <a:r>
+              <a:rPr lang="en-US" sz="4900" dirty="0"/>
+              <a:t>   </a:t>
+            </a:r>
+            <a:br>
+              <a:rPr lang="en-US" sz="4900" dirty="0"/>
+            </a:br>
+            <a:r>
+              <a:rPr lang="en-US" sz="4900" dirty="0"/>
+              <a:t>    </a:t>
+            </a:r>
+            <a:r>
+              <a:rPr lang="en-US" sz="4900" dirty="0" err="1"/>
+              <a:t>def</a:t>
+            </a:r>
+            <a:r>
+              <a:rPr lang="en-US" sz="4900" dirty="0"/>
+              <a:t> __</a:t>
+            </a:r>
+            <a:r>
+              <a:rPr lang="en-US" sz="4900" dirty="0" err="1"/>
+              <a:t>init</a:t>
+            </a:r>
+            <a:r>
+              <a:rPr lang="en-US" sz="4900" dirty="0"/>
+              <a:t>__(self, </a:t>
+            </a:r>
+            <a:r>
+              <a:rPr lang="en-US" sz="4900" dirty="0" err="1"/>
+              <a:t>num_classes</a:t>
+            </a:r>
+            <a:r>
+              <a:rPr lang="en-US" sz="4900" dirty="0"/>
+              <a:t>=5, </a:t>
+            </a:r>
+            <a:r>
+              <a:rPr lang="en-US" sz="4900" dirty="0" err="1" smtClean="0"/>
+              <a:t>retrained_model</a:t>
+            </a:r>
+            <a:r>
+              <a:rPr lang="en-US" sz="4900" dirty="0"/>
+              <a:t>='vgg16'):</a:t>
+            </a:r>
+          </a:p>
+          <a:p>
+            <a:pPr marL="0" indent="0">
+              <a:buNone/>
+            </a:pPr>
+            <a:r>
+              <a:rPr lang="en-US" sz="4900" dirty="0"/>
+              <a:t>        nn.Module.__</a:t>
+            </a:r>
+            <a:r>
+              <a:rPr lang="en-US" sz="4900" dirty="0" err="1"/>
+              <a:t>init</a:t>
+            </a:r>
+            <a:r>
+              <a:rPr lang="en-US" sz="4900" dirty="0"/>
+              <a:t>__(self)  </a:t>
+            </a:r>
+            <a:endParaRPr lang="en-US" sz="4900" dirty="0" smtClean="0"/>
+          </a:p>
+          <a:p>
+            <a:pPr marL="0" indent="0">
+              <a:buNone/>
+            </a:pPr>
+            <a:r>
+              <a:rPr lang="en-US" sz="4900" dirty="0"/>
+              <a:t>        </a:t>
+            </a:r>
+            <a:r>
+              <a:rPr lang="en-US" sz="4900" dirty="0" err="1"/>
+              <a:t>CustomModelMethods</a:t>
+            </a:r>
+            <a:r>
+              <a:rPr lang="en-US" sz="4900" dirty="0"/>
+              <a:t>.__</a:t>
+            </a:r>
+            <a:r>
+              <a:rPr lang="en-US" sz="4900" dirty="0" err="1"/>
+              <a:t>init</a:t>
+            </a:r>
+            <a:r>
+              <a:rPr lang="en-US" sz="4900" dirty="0"/>
+              <a:t>__(self)  </a:t>
+            </a:r>
+          </a:p>
+          <a:p>
+            <a:pPr marL="0" indent="0">
+              <a:buNone/>
+            </a:pPr>
+            <a:r>
+              <a:rPr lang="en-US" sz="4900" dirty="0"/>
+              <a:t>        </a:t>
+            </a:r>
+            <a:r>
+              <a:rPr lang="en-US" sz="4900" dirty="0" err="1"/>
+              <a:t>self.num_ftrs</a:t>
+            </a:r>
+            <a:r>
+              <a:rPr lang="en-US" sz="4900" dirty="0"/>
+              <a:t> = None</a:t>
+            </a:r>
+          </a:p>
+          <a:p>
+            <a:pPr marL="0" indent="0">
+              <a:buNone/>
+            </a:pPr>
+            <a:r>
+              <a:rPr lang="en-US" sz="4900" dirty="0"/>
+              <a:t/>
+            </a:r>
+            <a:br>
+              <a:rPr lang="en-US" sz="4900" dirty="0"/>
+            </a:br>
+            <a:r>
+              <a:rPr lang="en-US" sz="4900" dirty="0"/>
+              <a:t>       </a:t>
+            </a:r>
+            <a:r>
+              <a:rPr lang="en-US" sz="4900" dirty="0" smtClean="0"/>
+              <a:t>if </a:t>
+            </a:r>
+            <a:r>
+              <a:rPr lang="en-US" sz="4900" dirty="0" err="1"/>
+              <a:t>pretrained_model</a:t>
+            </a:r>
+            <a:r>
+              <a:rPr lang="en-US" sz="4900" dirty="0"/>
+              <a:t> == 'efficientnet-b7':</a:t>
+            </a:r>
+          </a:p>
+          <a:p>
+            <a:pPr marL="1371600" lvl="4" indent="0">
+              <a:buNone/>
+            </a:pPr>
+            <a:r>
+              <a:rPr lang="en-US" sz="4900" dirty="0"/>
+              <a:t>            </a:t>
+            </a:r>
+            <a:r>
+              <a:rPr lang="en-US" sz="4900" dirty="0" err="1"/>
+              <a:t>self.model</a:t>
+            </a:r>
+            <a:r>
+              <a:rPr lang="en-US" sz="4900" dirty="0"/>
+              <a:t> = </a:t>
+            </a:r>
+            <a:r>
+              <a:rPr lang="en-US" sz="4900" dirty="0" smtClean="0"/>
+              <a:t>   </a:t>
+            </a:r>
+          </a:p>
+          <a:p>
+            <a:pPr marL="1371600" lvl="4" indent="0">
+              <a:buNone/>
+            </a:pPr>
+            <a:r>
+              <a:rPr lang="en-US" sz="4900" dirty="0"/>
+              <a:t> </a:t>
+            </a:r>
+            <a:r>
+              <a:rPr lang="en-US" sz="4900" dirty="0" err="1" smtClean="0"/>
+              <a:t>EfficientNet.from_pretrained</a:t>
+            </a:r>
+            <a:r>
+              <a:rPr lang="en-US" sz="4900" dirty="0"/>
+              <a:t>(</a:t>
+            </a:r>
+            <a:r>
+              <a:rPr lang="en-US" sz="4900" dirty="0" smtClean="0"/>
+              <a:t>'efficientnet-b7</a:t>
+            </a:r>
+            <a:r>
+              <a:rPr lang="en-US" sz="4900" dirty="0"/>
+              <a:t>') </a:t>
+            </a:r>
+            <a:endParaRPr lang="en-US" sz="4900" dirty="0" smtClean="0"/>
+          </a:p>
+          <a:p>
+            <a:pPr marL="1371600" lvl="4" indent="0">
+              <a:buNone/>
+            </a:pPr>
+            <a:r>
+              <a:rPr lang="en-US" sz="4900" dirty="0" smtClean="0"/>
+              <a:t>            </a:t>
+            </a:r>
+            <a:r>
+              <a:rPr lang="en-US" sz="4900" dirty="0" err="1" smtClean="0"/>
+              <a:t>self.num_ftrs</a:t>
+            </a:r>
+            <a:r>
+              <a:rPr lang="en-US" sz="4900" dirty="0" smtClean="0"/>
+              <a:t> = self.model._</a:t>
+            </a:r>
+            <a:r>
+              <a:rPr lang="en-US" sz="4900" dirty="0" err="1" smtClean="0"/>
+              <a:t>fc.in_features</a:t>
+            </a:r>
+            <a:r>
+              <a:rPr lang="en-US" sz="4900" dirty="0" smtClean="0"/>
+              <a:t>  </a:t>
+            </a:r>
+          </a:p>
+          <a:p>
+            <a:pPr marL="1371600" lvl="4" indent="0">
+              <a:buNone/>
+            </a:pPr>
+            <a:r>
+              <a:rPr lang="en-US" sz="4900" dirty="0"/>
+              <a:t>            </a:t>
+            </a:r>
+            <a:r>
+              <a:rPr lang="en-US" sz="4900" dirty="0" err="1"/>
+              <a:t>self.model._fc</a:t>
+            </a:r>
+            <a:r>
+              <a:rPr lang="en-US" sz="4900" dirty="0"/>
+              <a:t> = </a:t>
+            </a:r>
+            <a:r>
+              <a:rPr lang="en-US" sz="4900" dirty="0" err="1"/>
+              <a:t>nn.Linear</a:t>
+            </a:r>
+            <a:r>
+              <a:rPr lang="en-US" sz="4900" dirty="0"/>
+              <a:t>(</a:t>
+            </a:r>
+            <a:r>
+              <a:rPr lang="en-US" sz="4900" dirty="0" err="1"/>
+              <a:t>self.num_ftrs</a:t>
+            </a:r>
+            <a:r>
+              <a:rPr lang="en-US" sz="4900" dirty="0"/>
+              <a:t>, </a:t>
+            </a:r>
+            <a:r>
+              <a:rPr lang="en-US" sz="4900" dirty="0" smtClean="0"/>
+              <a:t> </a:t>
+            </a:r>
+          </a:p>
+          <a:p>
+            <a:pPr marL="1371600" lvl="4" indent="0">
+              <a:buNone/>
+            </a:pPr>
+            <a:r>
+              <a:rPr lang="en-US" sz="4900" dirty="0"/>
+              <a:t> </a:t>
+            </a:r>
+            <a:r>
+              <a:rPr lang="en-US" sz="4900" dirty="0" err="1" smtClean="0"/>
+              <a:t>num_classes</a:t>
+            </a:r>
+            <a:r>
+              <a:rPr lang="en-US" sz="4900" dirty="0"/>
+              <a:t>)  </a:t>
+            </a:r>
+            <a:endParaRPr lang="en-US" sz="4900" dirty="0" smtClean="0"/>
+          </a:p>
+          <a:p>
+            <a:pPr marL="0" indent="0">
+              <a:buNone/>
+            </a:pPr>
+            <a:r>
+              <a:rPr lang="en-US" sz="4900" dirty="0"/>
+              <a:t>        else:</a:t>
+            </a:r>
+          </a:p>
+          <a:p>
+            <a:pPr marL="0" indent="0">
+              <a:buNone/>
+            </a:pPr>
+            <a:r>
+              <a:rPr lang="en-US" sz="4900" dirty="0"/>
+              <a:t>            raise </a:t>
+            </a:r>
+            <a:r>
+              <a:rPr lang="en-US" sz="4900" dirty="0" err="1"/>
+              <a:t>ValueError</a:t>
+            </a:r>
+            <a:r>
+              <a:rPr lang="en-US" sz="4900" dirty="0"/>
+              <a:t>("Unsupported </a:t>
+            </a:r>
+            <a:r>
+              <a:rPr lang="en-US" sz="4900" dirty="0" err="1"/>
+              <a:t>pretrained</a:t>
+            </a:r>
+            <a:r>
+              <a:rPr lang="en-US" sz="4900" dirty="0"/>
+              <a:t> </a:t>
+            </a:r>
+            <a:r>
+              <a:rPr lang="en-US" sz="4900" dirty="0" smtClean="0"/>
+              <a:t>model”). </a:t>
+            </a:r>
+          </a:p>
+          <a:p>
+            <a:pPr marL="0" indent="0">
+              <a:buNone/>
+            </a:pPr>
+            <a:r>
+              <a:rPr lang="en-US" sz="4900" dirty="0"/>
+              <a:t/>
+            </a:r>
+            <a:br>
+              <a:rPr lang="en-US" sz="4900" dirty="0"/>
+            </a:br>
+            <a:r>
+              <a:rPr lang="en-US" sz="4900" dirty="0"/>
+              <a:t>   </a:t>
+            </a:r>
+            <a:r>
+              <a:rPr lang="en-US" sz="4900" dirty="0" smtClean="0"/>
+              <a:t> </a:t>
+            </a:r>
+            <a:r>
+              <a:rPr lang="en-US" sz="4900" dirty="0"/>
+              <a:t/>
+            </a:r>
+            <a:br>
+              <a:rPr lang="en-US" sz="4900" dirty="0"/>
+            </a:br>
+            <a:r>
+              <a:rPr lang="en-US" sz="4900" dirty="0"/>
+              <a:t>    </a:t>
+            </a:r>
+            <a:r>
+              <a:rPr lang="en-US" sz="4900" dirty="0" err="1" smtClean="0"/>
+              <a:t>def</a:t>
+            </a:r>
+            <a:r>
+              <a:rPr lang="en-US" sz="4900" dirty="0" smtClean="0"/>
+              <a:t> </a:t>
+            </a:r>
+            <a:r>
+              <a:rPr lang="en-US" sz="4900" dirty="0"/>
+              <a:t>forward(self, x):</a:t>
+            </a:r>
+          </a:p>
+          <a:p>
+            <a:pPr marL="0" indent="0">
+              <a:buNone/>
+            </a:pPr>
+            <a:r>
+              <a:rPr lang="en-US" sz="4900" dirty="0"/>
+              <a:t>        </a:t>
+            </a:r>
+            <a:r>
+              <a:rPr lang="en-US" sz="4900" dirty="0" smtClean="0"/>
+              <a:t> </a:t>
+            </a:r>
+            <a:r>
+              <a:rPr lang="en-US" sz="4900" dirty="0"/>
+              <a:t>x = </a:t>
+            </a:r>
+            <a:r>
+              <a:rPr lang="en-US" sz="4900" dirty="0" err="1"/>
+              <a:t>self.model</a:t>
+            </a:r>
+            <a:r>
+              <a:rPr lang="en-US" sz="4900" dirty="0"/>
+              <a:t>(x)  # Pass input through the model</a:t>
+            </a:r>
+          </a:p>
+          <a:p>
+            <a:pPr marL="0" indent="0">
+              <a:buNone/>
+            </a:pPr>
+            <a:r>
+              <a:rPr lang="en-US" sz="4900" dirty="0"/>
+              <a:t>        return x  # Return the output from the model</a:t>
+            </a:r>
+          </a:p>
+          <a:p>
+            <a:pPr marL="0" indent="0">
+              <a:buNone/>
+            </a:pPr>
+            <a:r>
+              <a:rPr lang="en-US" sz="4900" dirty="0" smtClean="0"/>
+              <a:t> </a:t>
+            </a:r>
+            <a:r>
+              <a:rPr lang="en-US" sz="4900" dirty="0"/>
+              <a:t/>
+            </a:r>
+            <a:br>
+              <a:rPr lang="en-US" sz="4900" dirty="0"/>
+            </a:br>
+            <a:r>
+              <a:rPr lang="en-US" sz="4900" dirty="0"/>
+              <a:t>  </a:t>
+            </a:r>
+            <a:r>
+              <a:rPr lang="en-US" sz="4900" dirty="0" smtClean="0"/>
+              <a:t>  </a:t>
+            </a:r>
+            <a:r>
+              <a:rPr lang="en-US" sz="4900" dirty="0" err="1" smtClean="0"/>
+              <a:t>def</a:t>
+            </a:r>
+            <a:r>
+              <a:rPr lang="en-US" sz="4900" dirty="0" smtClean="0"/>
+              <a:t> </a:t>
+            </a:r>
+            <a:r>
+              <a:rPr lang="en-US" sz="4900" dirty="0" err="1"/>
+              <a:t>set_num_classes</a:t>
+            </a:r>
+            <a:r>
+              <a:rPr lang="en-US" sz="4900" dirty="0"/>
+              <a:t>(self, </a:t>
+            </a:r>
+            <a:r>
+              <a:rPr lang="en-US" sz="4900" dirty="0" err="1"/>
+              <a:t>num_classes</a:t>
+            </a:r>
+            <a:r>
+              <a:rPr lang="en-US" sz="4900" dirty="0"/>
+              <a:t>):</a:t>
+            </a:r>
+          </a:p>
+          <a:p>
+            <a:pPr marL="0" indent="0">
+              <a:buNone/>
+            </a:pPr>
+            <a:r>
+              <a:rPr lang="en-US" sz="4900" dirty="0"/>
+              <a:t>                </a:t>
+            </a:r>
+            <a:r>
+              <a:rPr lang="en-US" sz="4900" dirty="0" smtClean="0"/>
+              <a:t>if </a:t>
+            </a:r>
+            <a:r>
+              <a:rPr lang="en-US" sz="4900" dirty="0" err="1"/>
+              <a:t>isinstance</a:t>
+            </a:r>
+            <a:r>
+              <a:rPr lang="en-US" sz="4900" dirty="0"/>
+              <a:t>(</a:t>
+            </a:r>
+            <a:r>
+              <a:rPr lang="en-US" sz="4900" dirty="0" err="1"/>
+              <a:t>self.model</a:t>
+            </a:r>
+            <a:r>
+              <a:rPr lang="en-US" sz="4900" dirty="0"/>
+              <a:t>, </a:t>
+            </a:r>
+            <a:r>
+              <a:rPr lang="en-US" sz="4900" dirty="0" err="1"/>
+              <a:t>EfficientNet</a:t>
+            </a:r>
+            <a:r>
+              <a:rPr lang="en-US" sz="4900" dirty="0"/>
+              <a:t>):</a:t>
+            </a:r>
+          </a:p>
+          <a:p>
+            <a:pPr marL="0" indent="0">
+              <a:buNone/>
+            </a:pPr>
+            <a:r>
+              <a:rPr lang="en-US" sz="4900" dirty="0"/>
+              <a:t>            </a:t>
+            </a:r>
+            <a:r>
+              <a:rPr lang="en-US" sz="4900" dirty="0" err="1"/>
+              <a:t>self.model._fc</a:t>
+            </a:r>
+            <a:r>
+              <a:rPr lang="en-US" sz="4900" dirty="0"/>
+              <a:t> = </a:t>
+            </a:r>
+            <a:r>
+              <a:rPr lang="en-US" sz="4900" dirty="0" err="1"/>
+              <a:t>nn.Linear</a:t>
+            </a:r>
+            <a:r>
+              <a:rPr lang="en-US" sz="4900" dirty="0"/>
+              <a:t>(</a:t>
+            </a:r>
+            <a:r>
+              <a:rPr lang="en-US" sz="4900" dirty="0" err="1"/>
+              <a:t>self.num_ftrs</a:t>
+            </a:r>
+            <a:r>
+              <a:rPr lang="en-US" sz="4900" dirty="0"/>
+              <a:t>, </a:t>
+            </a:r>
+            <a:r>
+              <a:rPr lang="en-US" sz="4900" dirty="0" smtClean="0"/>
+              <a:t> 									</a:t>
+            </a:r>
+            <a:r>
+              <a:rPr lang="en-US" sz="4900" dirty="0" err="1" smtClean="0"/>
+              <a:t>num_classes</a:t>
+            </a:r>
+            <a:r>
+              <a:rPr lang="en-US" sz="4900" dirty="0"/>
+              <a:t>) </a:t>
+            </a:r>
+            <a:r>
+              <a:rPr lang="en-US" sz="4800" dirty="0"/>
+              <a:t> </a:t>
+            </a:r>
+            <a:br>
+              <a:rPr lang="en-US" sz="4800" dirty="0"/>
+            </a:br>
+            <a:r>
+              <a:rPr lang="en-US" sz="4800" dirty="0"/>
+              <a:t>       </a:t>
+            </a:r>
+          </a:p>
+        </p:txBody>
+      </p:sp>
+      <p:sp>
+        <p:nvSpPr>
+          <p:cNvPr id="2" name="לחצן פעולה: חזרה 1">
+            <a:hlinkClick r:id="rId2" action="ppaction://hlinksldjump" highlightClick="1"/>
+          </p:cNvPr>
+          <p:cNvSpPr/>
+          <p:nvPr/>
+        </p:nvSpPr>
+        <p:spPr>
+          <a:xfrm>
+            <a:off x="7928754" y="6185141"/>
+            <a:ext cx="586596" cy="449024"/>
+          </a:xfrm>
+          <a:prstGeom prst="actionButtonReturn">
+            <a:avLst/>
+          </a:prstGeom>
+        </p:spPr>
+        <p:style>
+          <a:lnRef idx="2">
+            <a:schemeClr val="accent1">
+              <a:shade val="50000"/>
+            </a:schemeClr>
+          </a:lnRef>
+          <a:fillRef idx="1">
+            <a:schemeClr val="accent1"/>
+          </a:fillRef>
+          <a:effectRef idx="0">
+            <a:schemeClr val="accent1"/>
+          </a:effectRef>
+          <a:fontRef idx="minor">
+            <a:schemeClr val="lt1"/>
+          </a:fontRef>
+        </p:style>
+        <p:txBody>
+          <a:bodyPr rtlCol="1" anchor="ctr"/>
+          <a:lstStyle/>
+          <a:p>
+            <a:pPr algn="ctr"/>
+            <a:endParaRPr lang="he-IL"/>
+          </a:p>
+        </p:txBody>
+      </p:sp>
+    </p:spTree>
+    <p:extLst>
+      <p:ext uri="{BB962C8B-B14F-4D97-AF65-F5344CB8AC3E}">
+        <p14:creationId xmlns:p14="http://schemas.microsoft.com/office/powerpoint/2010/main" val="1599460225"/>
+      </p:ext>
+    </p:extLst>
+  </p:cSld>
+  <p:clrMapOvr>
+    <a:masterClrMapping/>
+  </p:clrMapOvr>
+  <p:timing>
+    <p:tnLst>
+      <p:par>
+        <p:cTn id="1" dur="indefinite" restart="never" nodeType="tmRoot"/>
+      </p:par>
+    </p:tnLst>
+  </p:timing>
+</p:sld>
+</file>
+
+<file path=ppt/slides/slide29.xml><?xml version="1.0" encoding="utf-8"?>
+<p:sld xmlns:a="http://schemas.openxmlformats.org/drawingml/2006/main" xmlns:r="http://schemas.openxmlformats.org/officeDocument/2006/relationships" xmlns:p="http://schemas.openxmlformats.org/presentationml/2006/main">
+  <p:cSld>
+    <p:spTree>
+      <p:nvGrpSpPr>
+        <p:cNvPr id="1" name=""/>
+        <p:cNvGrpSpPr/>
+        <p:nvPr/>
+      </p:nvGrpSpPr>
+      <p:grpSpPr>
+        <a:xfrm>
+          <a:off x="0" y="0"/>
+          <a:ext cx="0" cy="0"/>
+          <a:chOff x="0" y="0"/>
+          <a:chExt cx="0" cy="0"/>
+        </a:xfrm>
+      </p:grpSpPr>
+      <p:sp>
+        <p:nvSpPr>
+          <p:cNvPr id="3" name="מציין מיקום תוכן 2"/>
+          <p:cNvSpPr>
+            <a:spLocks noGrp="1"/>
+          </p:cNvSpPr>
+          <p:nvPr>
+            <p:ph idx="1"/>
+          </p:nvPr>
+        </p:nvSpPr>
+        <p:spPr>
+          <a:xfrm>
+            <a:off x="628650" y="77639"/>
+            <a:ext cx="7886700" cy="6660042"/>
+          </a:xfrm>
+        </p:spPr>
+        <p:txBody>
+          <a:bodyPr>
+            <a:normAutofit/>
+          </a:bodyPr>
+          <a:lstStyle/>
+          <a:p>
+            <a:pPr marL="0" indent="0">
+              <a:buNone/>
+            </a:pPr>
+            <a:r>
+              <a:rPr lang="en-US" sz="4800" dirty="0"/>
+              <a:t>       </a:t>
+            </a:r>
+          </a:p>
+        </p:txBody>
+      </p:sp>
+      <p:sp>
+        <p:nvSpPr>
+          <p:cNvPr id="4" name="לחצן פעולה: מידע 3">
+            <a:hlinkClick r:id="rId2" highlightClick="1"/>
+          </p:cNvPr>
+          <p:cNvSpPr/>
+          <p:nvPr/>
+        </p:nvSpPr>
+        <p:spPr>
+          <a:xfrm>
+            <a:off x="3027872" y="1112808"/>
+            <a:ext cx="2829464" cy="3614467"/>
+          </a:xfrm>
+          <a:prstGeom prst="actionButtonInformation">
+            <a:avLst/>
+          </a:prstGeom>
+        </p:spPr>
+        <p:style>
+          <a:lnRef idx="2">
+            <a:schemeClr val="accent1">
+              <a:shade val="50000"/>
+            </a:schemeClr>
+          </a:lnRef>
+          <a:fillRef idx="1">
+            <a:schemeClr val="accent1"/>
+          </a:fillRef>
+          <a:effectRef idx="0">
+            <a:schemeClr val="accent1"/>
+          </a:effectRef>
+          <a:fontRef idx="minor">
+            <a:schemeClr val="lt1"/>
+          </a:fontRef>
+        </p:style>
+        <p:txBody>
+          <a:bodyPr rtlCol="1" anchor="ctr"/>
+          <a:lstStyle/>
+          <a:p>
+            <a:pPr algn="ctr"/>
+            <a:endParaRPr lang="he-IL"/>
+          </a:p>
+        </p:txBody>
+      </p:sp>
+    </p:spTree>
+    <p:extLst>
+      <p:ext uri="{BB962C8B-B14F-4D97-AF65-F5344CB8AC3E}">
+        <p14:creationId xmlns:p14="http://schemas.microsoft.com/office/powerpoint/2010/main" val="3751402700"/>
+      </p:ext>
+    </p:extLst>
+  </p:cSld>
+  <p:clrMapOvr>
+    <a:masterClrMapping/>
+  </p:clrMapOvr>
+  <p:timing>
+    <p:tnLst>
+      <p:par>
+        <p:cTn id="1" dur="indefinite" restart="never" nodeType="tmRoot"/>
+      </p:par>
+    </p:tnLst>
+  </p:timing>
 </p:sld>
 </file>
 
@@ -24386,7 +26950,7 @@
                 <a16:creationId xmlns:a16="http://schemas.microsoft.com/office/drawing/2014/main" id="{09588DA8-065E-4F6F-8EFD-43104AB2E0CF}"/>
               </a:ext>
               <a:ext uri="{C183D7F6-B498-43B3-948B-1728B52AA6E4}">
-                <adec:decorative xmlns:adec="http://schemas.microsoft.com/office/drawing/2017/decorative" val="1"/>
+                <adec:decorative xmlns:adec="http://schemas.microsoft.com/office/drawing/2017/decorative" xmlns="" val="1"/>
               </a:ext>
             </a:extLst>
           </p:cNvPr>
@@ -24462,7 +27026,7 @@
                 <a16:creationId xmlns:a16="http://schemas.microsoft.com/office/drawing/2014/main" id="{C4285719-470E-454C-AF62-8323075F1F5B}"/>
               </a:ext>
               <a:ext uri="{C183D7F6-B498-43B3-948B-1728B52AA6E4}">
-                <adec:decorative xmlns:adec="http://schemas.microsoft.com/office/drawing/2017/decorative" val="1"/>
+                <adec:decorative xmlns:adec="http://schemas.microsoft.com/office/drawing/2017/decorative" xmlns="" val="1"/>
               </a:ext>
             </a:extLst>
           </p:cNvPr>
@@ -24538,7 +27102,7 @@
                 <a16:creationId xmlns:a16="http://schemas.microsoft.com/office/drawing/2014/main" id="{CD9FE4EF-C4D8-49A0-B2FF-81D8DB7D8A24}"/>
               </a:ext>
               <a:ext uri="{C183D7F6-B498-43B3-948B-1728B52AA6E4}">
-                <adec:decorative xmlns:adec="http://schemas.microsoft.com/office/drawing/2017/decorative" val="1"/>
+                <adec:decorative xmlns:adec="http://schemas.microsoft.com/office/drawing/2017/decorative" xmlns="" val="1"/>
               </a:ext>
             </a:extLst>
           </p:cNvPr>
@@ -24611,7 +27175,7 @@
                 <a16:creationId xmlns:a16="http://schemas.microsoft.com/office/drawing/2014/main" id="{4300840D-0A0B-4512-BACA-B439D5B9C57C}"/>
               </a:ext>
               <a:ext uri="{C183D7F6-B498-43B3-948B-1728B52AA6E4}">
-                <adec:decorative xmlns:adec="http://schemas.microsoft.com/office/drawing/2017/decorative" val="1"/>
+                <adec:decorative xmlns:adec="http://schemas.microsoft.com/office/drawing/2017/decorative" xmlns="" val="1"/>
               </a:ext>
             </a:extLst>
           </p:cNvPr>
@@ -24686,7 +27250,7 @@
                 <a16:creationId xmlns:a16="http://schemas.microsoft.com/office/drawing/2014/main" id="{D2B78728-A580-49A7-84F9-6EF6F583ADE0}"/>
               </a:ext>
               <a:ext uri="{C183D7F6-B498-43B3-948B-1728B52AA6E4}">
-                <adec:decorative xmlns:adec="http://schemas.microsoft.com/office/drawing/2017/decorative" val="1"/>
+                <adec:decorative xmlns:adec="http://schemas.microsoft.com/office/drawing/2017/decorative" xmlns="" val="1"/>
               </a:ext>
             </a:extLst>
           </p:cNvPr>
@@ -24761,7 +27325,7 @@
                 <a16:creationId xmlns:a16="http://schemas.microsoft.com/office/drawing/2014/main" id="{38FAA1A1-D861-433F-88FA-1E9D6FD31D11}"/>
               </a:ext>
               <a:ext uri="{C183D7F6-B498-43B3-948B-1728B52AA6E4}">
-                <adec:decorative xmlns:adec="http://schemas.microsoft.com/office/drawing/2017/decorative" val="1"/>
+                <adec:decorative xmlns:adec="http://schemas.microsoft.com/office/drawing/2017/decorative" xmlns="" val="1"/>
               </a:ext>
             </a:extLst>
           </p:cNvPr>
@@ -24931,7 +27495,7 @@
                 <a16:creationId xmlns:a16="http://schemas.microsoft.com/office/drawing/2014/main" id="{8D71EDA1-87BF-4D5D-AB79-F346FD19278A}"/>
               </a:ext>
               <a:ext uri="{C183D7F6-B498-43B3-948B-1728B52AA6E4}">
-                <adec:decorative xmlns:adec="http://schemas.microsoft.com/office/drawing/2017/decorative" val="1"/>
+                <adec:decorative xmlns:adec="http://schemas.microsoft.com/office/drawing/2017/decorative" xmlns="" val="1"/>
               </a:ext>
             </a:extLst>
           </p:cNvPr>
@@ -25066,7 +27630,7 @@
         </p:spPr>
         <p:txBody>
           <a:bodyPr anchor="ctr">
-            <a:normAutofit/>
+            <a:normAutofit lnSpcReduction="10000"/>
           </a:bodyPr>
           <a:lstStyle/>
           <a:p>
@@ -25117,21 +27681,45 @@
             </a:pPr>
             <a:r>
               <a:rPr lang="en-US" dirty="0"/>
-              <a:t>       2 - Moderate </a:t>
+              <a:t>      </a:t>
+            </a:r>
+            <a:r>
+              <a:rPr lang="en-US" dirty="0" smtClean="0"/>
+              <a:t>2 </a:t>
+            </a:r>
+            <a:r>
+              <a:rPr lang="en-US" dirty="0"/>
+              <a:t>- Moderate </a:t>
             </a:r>
             <a:br>
               <a:rPr lang="en-US" dirty="0"/>
             </a:br>
             <a:r>
               <a:rPr lang="en-US" dirty="0"/>
-              <a:t>       3 - Severe</a:t>
+              <a:t>      </a:t>
+            </a:r>
+            <a:r>
+              <a:rPr lang="en-US" dirty="0" smtClean="0"/>
+              <a:t>3 </a:t>
+            </a:r>
+            <a:r>
+              <a:rPr lang="en-US" dirty="0"/>
+              <a:t>- Severe</a:t>
             </a:r>
             <a:br>
               <a:rPr lang="en-US" dirty="0"/>
             </a:br>
             <a:r>
               <a:rPr lang="en-US" dirty="0"/>
-              <a:t>       4  - Proliferative DR</a:t>
+              <a:t>      </a:t>
+            </a:r>
+            <a:r>
+              <a:rPr lang="en-US" dirty="0" smtClean="0"/>
+              <a:t>4 - </a:t>
+            </a:r>
+            <a:r>
+              <a:rPr lang="en-US" dirty="0"/>
+              <a:t>Proliferative DR</a:t>
             </a:r>
           </a:p>
           <a:p>
@@ -25259,6 +27847,13 @@
   <p:clrMapOvr>
     <a:masterClrMapping/>
   </p:clrMapOvr>
+  <p:timing>
+    <p:tnLst>
+      <p:par>
+        <p:cTn id="1" dur="indefinite" restart="never" nodeType="tmRoot"/>
+      </p:par>
+    </p:tnLst>
+  </p:timing>
 </p:sld>
 </file>
 
@@ -25324,7 +27919,7 @@
                 <a16:creationId xmlns:a16="http://schemas.microsoft.com/office/drawing/2014/main" id="{8870DEF6-46A2-D4F8-8BE6-91165D93ECC4}"/>
               </a:ext>
               <a:ext uri="{C183D7F6-B498-43B3-948B-1728B52AA6E4}">
-                <adec:decorative xmlns:adec="http://schemas.microsoft.com/office/drawing/2017/decorative" val="1"/>
+                <adec:decorative xmlns:adec="http://schemas.microsoft.com/office/drawing/2017/decorative" xmlns="" val="1"/>
               </a:ext>
             </a:extLst>
           </p:cNvPr>
@@ -25438,7 +28033,7 @@
                 <a16:creationId xmlns:a16="http://schemas.microsoft.com/office/drawing/2014/main" id="{522632D6-DED9-FDEC-FD9F-09FF0A4544CC}"/>
               </a:ext>
               <a:ext uri="{C183D7F6-B498-43B3-948B-1728B52AA6E4}">
-                <adec:decorative xmlns:adec="http://schemas.microsoft.com/office/drawing/2017/decorative" val="1"/>
+                <adec:decorative xmlns:adec="http://schemas.microsoft.com/office/drawing/2017/decorative" xmlns="" val="1"/>
               </a:ext>
             </a:extLst>
           </p:cNvPr>
@@ -26024,7 +28619,7 @@
                 <a16:creationId xmlns:a16="http://schemas.microsoft.com/office/drawing/2014/main" id="{2958D629-A154-774A-A48F-D48440EA2A09}"/>
               </a:ext>
               <a:ext uri="{C183D7F6-B498-43B3-948B-1728B52AA6E4}">
-                <adec:decorative xmlns:adec="http://schemas.microsoft.com/office/drawing/2017/decorative" val="1"/>
+                <adec:decorative xmlns:adec="http://schemas.microsoft.com/office/drawing/2017/decorative" xmlns="" val="1"/>
               </a:ext>
             </a:extLst>
           </p:cNvPr>
@@ -26100,7 +28695,7 @@
                 <a16:creationId xmlns:a16="http://schemas.microsoft.com/office/drawing/2014/main" id="{0FF9FECA-D772-4FDC-9BA8-54E58E735A48}"/>
               </a:ext>
               <a:ext uri="{C183D7F6-B498-43B3-948B-1728B52AA6E4}">
-                <adec:decorative xmlns:adec="http://schemas.microsoft.com/office/drawing/2017/decorative" val="1"/>
+                <adec:decorative xmlns:adec="http://schemas.microsoft.com/office/drawing/2017/decorative" xmlns="" val="1"/>
               </a:ext>
             </a:extLst>
           </p:cNvPr>
@@ -26176,7 +28771,7 @@
                 <a16:creationId xmlns:a16="http://schemas.microsoft.com/office/drawing/2014/main" id="{6D58D124-BBA6-3344-240A-1E15EF660694}"/>
               </a:ext>
               <a:ext uri="{C183D7F6-B498-43B3-948B-1728B52AA6E4}">
-                <adec:decorative xmlns:adec="http://schemas.microsoft.com/office/drawing/2017/decorative" val="1"/>
+                <adec:decorative xmlns:adec="http://schemas.microsoft.com/office/drawing/2017/decorative" xmlns="" val="1"/>
               </a:ext>
             </a:extLst>
           </p:cNvPr>
@@ -26249,7 +28844,7 @@
                 <a16:creationId xmlns:a16="http://schemas.microsoft.com/office/drawing/2014/main" id="{2DB7F327-93CA-A727-790A-EEC4E41479FF}"/>
               </a:ext>
               <a:ext uri="{C183D7F6-B498-43B3-948B-1728B52AA6E4}">
-                <adec:decorative xmlns:adec="http://schemas.microsoft.com/office/drawing/2017/decorative" val="1"/>
+                <adec:decorative xmlns:adec="http://schemas.microsoft.com/office/drawing/2017/decorative" xmlns="" val="1"/>
               </a:ext>
             </a:extLst>
           </p:cNvPr>
@@ -26324,7 +28919,7 @@
                 <a16:creationId xmlns:a16="http://schemas.microsoft.com/office/drawing/2014/main" id="{A2A4EDDA-D85F-7366-44BB-7E45C3B783B5}"/>
               </a:ext>
               <a:ext uri="{C183D7F6-B498-43B3-948B-1728B52AA6E4}">
-                <adec:decorative xmlns:adec="http://schemas.microsoft.com/office/drawing/2017/decorative" val="1"/>
+                <adec:decorative xmlns:adec="http://schemas.microsoft.com/office/drawing/2017/decorative" xmlns="" val="1"/>
               </a:ext>
             </a:extLst>
           </p:cNvPr>
@@ -26399,7 +28994,7 @@
                 <a16:creationId xmlns:a16="http://schemas.microsoft.com/office/drawing/2014/main" id="{627F039D-F332-3544-1362-1B9D059B3CE0}"/>
               </a:ext>
               <a:ext uri="{C183D7F6-B498-43B3-948B-1728B52AA6E4}">
-                <adec:decorative xmlns:adec="http://schemas.microsoft.com/office/drawing/2017/decorative" val="1"/>
+                <adec:decorative xmlns:adec="http://schemas.microsoft.com/office/drawing/2017/decorative" xmlns="" val="1"/>
               </a:ext>
             </a:extLst>
           </p:cNvPr>
@@ -26569,7 +29164,7 @@
                 <a16:creationId xmlns:a16="http://schemas.microsoft.com/office/drawing/2014/main" id="{696EE86D-098A-C009-C285-CB6F1941C759}"/>
               </a:ext>
               <a:ext uri="{C183D7F6-B498-43B3-948B-1728B52AA6E4}">
-                <adec:decorative xmlns:adec="http://schemas.microsoft.com/office/drawing/2017/decorative" val="1"/>
+                <adec:decorative xmlns:adec="http://schemas.microsoft.com/office/drawing/2017/decorative" xmlns="" val="1"/>
               </a:ext>
             </a:extLst>
           </p:cNvPr>
@@ -27131,6 +29726,13 @@
   <p:clrMapOvr>
     <a:masterClrMapping/>
   </p:clrMapOvr>
+  <p:timing>
+    <p:tnLst>
+      <p:par>
+        <p:cTn id="1" dur="indefinite" restart="never" nodeType="tmRoot"/>
+      </p:par>
+    </p:tnLst>
+  </p:timing>
 </p:sld>
 </file>
 
@@ -27480,6 +30082,13 @@
   <p:clrMapOvr>
     <a:overrideClrMapping bg1="dk1" tx1="lt1" bg2="dk2" tx2="lt2" accent1="accent1" accent2="accent2" accent3="accent3" accent4="accent4" accent5="accent5" accent6="accent6" hlink="hlink" folHlink="folHlink"/>
   </p:clrMapOvr>
+  <p:timing>
+    <p:tnLst>
+      <p:par>
+        <p:cTn id="1" dur="indefinite" restart="never" nodeType="tmRoot"/>
+      </p:par>
+    </p:tnLst>
+  </p:timing>
 </p:sld>
 </file>
 
@@ -27516,7 +30125,7 @@
                 <a16:creationId xmlns:a16="http://schemas.microsoft.com/office/drawing/2014/main" id="{8870DEF6-46A2-D4F8-8BE6-91165D93ECC4}"/>
               </a:ext>
               <a:ext uri="{C183D7F6-B498-43B3-948B-1728B52AA6E4}">
-                <adec:decorative xmlns:adec="http://schemas.microsoft.com/office/drawing/2017/decorative" val="1"/>
+                <adec:decorative xmlns:adec="http://schemas.microsoft.com/office/drawing/2017/decorative" xmlns="" val="1"/>
               </a:ext>
             </a:extLst>
           </p:cNvPr>
@@ -27626,7 +30235,7 @@
                 <a16:creationId xmlns:a16="http://schemas.microsoft.com/office/drawing/2014/main" id="{522632D6-DED9-FDEC-FD9F-09FF0A4544CC}"/>
               </a:ext>
               <a:ext uri="{C183D7F6-B498-43B3-948B-1728B52AA6E4}">
-                <adec:decorative xmlns:adec="http://schemas.microsoft.com/office/drawing/2017/decorative" val="1"/>
+                <adec:decorative xmlns:adec="http://schemas.microsoft.com/office/drawing/2017/decorative" xmlns="" val="1"/>
               </a:ext>
             </a:extLst>
           </p:cNvPr>
@@ -28580,7 +31189,7 @@
                 <a16:creationId xmlns:a16="http://schemas.microsoft.com/office/drawing/2014/main" id="{10BFA373-33BA-E3A9-28FB-1ED30BE2FD3F}"/>
               </a:ext>
               <a:ext uri="{C183D7F6-B498-43B3-948B-1728B52AA6E4}">
-                <adec:decorative xmlns:adec="http://schemas.microsoft.com/office/drawing/2017/decorative" val="1"/>
+                <adec:decorative xmlns:adec="http://schemas.microsoft.com/office/drawing/2017/decorative" xmlns="" val="1"/>
               </a:ext>
             </a:extLst>
           </p:cNvPr>
@@ -28656,7 +31265,7 @@
                 <a16:creationId xmlns:a16="http://schemas.microsoft.com/office/drawing/2014/main" id="{3DFA427B-8793-96C6-CE10-F866108C0079}"/>
               </a:ext>
               <a:ext uri="{C183D7F6-B498-43B3-948B-1728B52AA6E4}">
-                <adec:decorative xmlns:adec="http://schemas.microsoft.com/office/drawing/2017/decorative" val="1"/>
+                <adec:decorative xmlns:adec="http://schemas.microsoft.com/office/drawing/2017/decorative" xmlns="" val="1"/>
               </a:ext>
             </a:extLst>
           </p:cNvPr>
@@ -28732,7 +31341,7 @@
                 <a16:creationId xmlns:a16="http://schemas.microsoft.com/office/drawing/2014/main" id="{8207A34E-031F-C7A6-4930-5B4B793D519A}"/>
               </a:ext>
               <a:ext uri="{C183D7F6-B498-43B3-948B-1728B52AA6E4}">
-                <adec:decorative xmlns:adec="http://schemas.microsoft.com/office/drawing/2017/decorative" val="1"/>
+                <adec:decorative xmlns:adec="http://schemas.microsoft.com/office/drawing/2017/decorative" xmlns="" val="1"/>
               </a:ext>
             </a:extLst>
           </p:cNvPr>
@@ -28805,7 +31414,7 @@
                 <a16:creationId xmlns:a16="http://schemas.microsoft.com/office/drawing/2014/main" id="{C95F681C-F3F2-4D10-492F-58211C0AC974}"/>
               </a:ext>
               <a:ext uri="{C183D7F6-B498-43B3-948B-1728B52AA6E4}">
-                <adec:decorative xmlns:adec="http://schemas.microsoft.com/office/drawing/2017/decorative" val="1"/>
+                <adec:decorative xmlns:adec="http://schemas.microsoft.com/office/drawing/2017/decorative" xmlns="" val="1"/>
               </a:ext>
             </a:extLst>
           </p:cNvPr>
@@ -28880,7 +31489,7 @@
                 <a16:creationId xmlns:a16="http://schemas.microsoft.com/office/drawing/2014/main" id="{48807498-2CE8-E336-2B28-731952C712E2}"/>
               </a:ext>
               <a:ext uri="{C183D7F6-B498-43B3-948B-1728B52AA6E4}">
-                <adec:decorative xmlns:adec="http://schemas.microsoft.com/office/drawing/2017/decorative" val="1"/>
+                <adec:decorative xmlns:adec="http://schemas.microsoft.com/office/drawing/2017/decorative" xmlns="" val="1"/>
               </a:ext>
             </a:extLst>
           </p:cNvPr>
@@ -28955,7 +31564,7 @@
                 <a16:creationId xmlns:a16="http://schemas.microsoft.com/office/drawing/2014/main" id="{3C9B7448-E070-CCBE-451B-C93F38EEF4E6}"/>
               </a:ext>
               <a:ext uri="{C183D7F6-B498-43B3-948B-1728B52AA6E4}">
-                <adec:decorative xmlns:adec="http://schemas.microsoft.com/office/drawing/2017/decorative" val="1"/>
+                <adec:decorative xmlns:adec="http://schemas.microsoft.com/office/drawing/2017/decorative" xmlns="" val="1"/>
               </a:ext>
             </a:extLst>
           </p:cNvPr>
@@ -29125,7 +31734,7 @@
                 <a16:creationId xmlns:a16="http://schemas.microsoft.com/office/drawing/2014/main" id="{A4F85421-2DAD-D03B-9AF0-7FB077175688}"/>
               </a:ext>
               <a:ext uri="{C183D7F6-B498-43B3-948B-1728B52AA6E4}">
-                <adec:decorative xmlns:adec="http://schemas.microsoft.com/office/drawing/2017/decorative" val="1"/>
+                <adec:decorative xmlns:adec="http://schemas.microsoft.com/office/drawing/2017/decorative" xmlns="" val="1"/>
               </a:ext>
             </a:extLst>
           </p:cNvPr>
@@ -29325,6 +31934,13 @@
   <p:clrMapOvr>
     <a:masterClrMapping/>
   </p:clrMapOvr>
+  <p:timing>
+    <p:tnLst>
+      <p:par>
+        <p:cTn id="1" dur="indefinite" restart="never" nodeType="tmRoot"/>
+      </p:par>
+    </p:tnLst>
+  </p:timing>
 </p:sld>
 </file>
 
@@ -29359,7 +31975,7 @@
                 <a16:creationId xmlns:a16="http://schemas.microsoft.com/office/drawing/2014/main" id="{10BFA373-33BA-E3A9-28FB-1ED30BE2FD3F}"/>
               </a:ext>
               <a:ext uri="{C183D7F6-B498-43B3-948B-1728B52AA6E4}">
-                <adec:decorative xmlns:adec="http://schemas.microsoft.com/office/drawing/2017/decorative" val="1"/>
+                <adec:decorative xmlns:adec="http://schemas.microsoft.com/office/drawing/2017/decorative" xmlns="" val="1"/>
               </a:ext>
             </a:extLst>
           </p:cNvPr>
@@ -29435,7 +32051,7 @@
                 <a16:creationId xmlns:a16="http://schemas.microsoft.com/office/drawing/2014/main" id="{3DFA427B-8793-96C6-CE10-F866108C0079}"/>
               </a:ext>
               <a:ext uri="{C183D7F6-B498-43B3-948B-1728B52AA6E4}">
-                <adec:decorative xmlns:adec="http://schemas.microsoft.com/office/drawing/2017/decorative" val="1"/>
+                <adec:decorative xmlns:adec="http://schemas.microsoft.com/office/drawing/2017/decorative" xmlns="" val="1"/>
               </a:ext>
             </a:extLst>
           </p:cNvPr>
@@ -29511,7 +32127,7 @@
                 <a16:creationId xmlns:a16="http://schemas.microsoft.com/office/drawing/2014/main" id="{8207A34E-031F-C7A6-4930-5B4B793D519A}"/>
               </a:ext>
               <a:ext uri="{C183D7F6-B498-43B3-948B-1728B52AA6E4}">
-                <adec:decorative xmlns:adec="http://schemas.microsoft.com/office/drawing/2017/decorative" val="1"/>
+                <adec:decorative xmlns:adec="http://schemas.microsoft.com/office/drawing/2017/decorative" xmlns="" val="1"/>
               </a:ext>
             </a:extLst>
           </p:cNvPr>
@@ -29584,7 +32200,7 @@
                 <a16:creationId xmlns:a16="http://schemas.microsoft.com/office/drawing/2014/main" id="{C95F681C-F3F2-4D10-492F-58211C0AC974}"/>
               </a:ext>
               <a:ext uri="{C183D7F6-B498-43B3-948B-1728B52AA6E4}">
-                <adec:decorative xmlns:adec="http://schemas.microsoft.com/office/drawing/2017/decorative" val="1"/>
+                <adec:decorative xmlns:adec="http://schemas.microsoft.com/office/drawing/2017/decorative" xmlns="" val="1"/>
               </a:ext>
             </a:extLst>
           </p:cNvPr>
@@ -29659,7 +32275,7 @@
                 <a16:creationId xmlns:a16="http://schemas.microsoft.com/office/drawing/2014/main" id="{48807498-2CE8-E336-2B28-731952C712E2}"/>
               </a:ext>
               <a:ext uri="{C183D7F6-B498-43B3-948B-1728B52AA6E4}">
-                <adec:decorative xmlns:adec="http://schemas.microsoft.com/office/drawing/2017/decorative" val="1"/>
+                <adec:decorative xmlns:adec="http://schemas.microsoft.com/office/drawing/2017/decorative" xmlns="" val="1"/>
               </a:ext>
             </a:extLst>
           </p:cNvPr>
@@ -29734,7 +32350,7 @@
                 <a16:creationId xmlns:a16="http://schemas.microsoft.com/office/drawing/2014/main" id="{3C9B7448-E070-CCBE-451B-C93F38EEF4E6}"/>
               </a:ext>
               <a:ext uri="{C183D7F6-B498-43B3-948B-1728B52AA6E4}">
-                <adec:decorative xmlns:adec="http://schemas.microsoft.com/office/drawing/2017/decorative" val="1"/>
+                <adec:decorative xmlns:adec="http://schemas.microsoft.com/office/drawing/2017/decorative" xmlns="" val="1"/>
               </a:ext>
             </a:extLst>
           </p:cNvPr>
@@ -29904,7 +32520,7 @@
                 <a16:creationId xmlns:a16="http://schemas.microsoft.com/office/drawing/2014/main" id="{A4F85421-2DAD-D03B-9AF0-7FB077175688}"/>
               </a:ext>
               <a:ext uri="{C183D7F6-B498-43B3-948B-1728B52AA6E4}">
-                <adec:decorative xmlns:adec="http://schemas.microsoft.com/office/drawing/2017/decorative" val="1"/>
+                <adec:decorative xmlns:adec="http://schemas.microsoft.com/office/drawing/2017/decorative" xmlns="" val="1"/>
               </a:ext>
             </a:extLst>
           </p:cNvPr>
@@ -30097,6 +32713,48 @@
           </a:graphicData>
         </a:graphic>
       </p:graphicFrame>
+      <p:sp>
+        <p:nvSpPr>
+          <p:cNvPr id="4" name="לחצן פעולה: מידע 3">
+            <a:hlinkClick r:id="rId3" action="ppaction://hlinksldjump" highlightClick="1"/>
+          </p:cNvPr>
+          <p:cNvSpPr/>
+          <p:nvPr/>
+        </p:nvSpPr>
+        <p:spPr>
+          <a:xfrm>
+            <a:off x="8376250" y="112403"/>
+            <a:ext cx="543464" cy="533996"/>
+          </a:xfrm>
+          <a:prstGeom prst="actionButtonInformation">
+            <a:avLst/>
+          </a:prstGeom>
+        </p:spPr>
+        <p:style>
+          <a:lnRef idx="2">
+            <a:schemeClr val="accent1">
+              <a:shade val="50000"/>
+            </a:schemeClr>
+          </a:lnRef>
+          <a:fillRef idx="1">
+            <a:schemeClr val="accent1"/>
+          </a:fillRef>
+          <a:effectRef idx="0">
+            <a:schemeClr val="accent1"/>
+          </a:effectRef>
+          <a:fontRef idx="minor">
+            <a:schemeClr val="lt1"/>
+          </a:fontRef>
+        </p:style>
+        <p:txBody>
+          <a:bodyPr rtlCol="1" anchor="ctr"/>
+          <a:lstStyle/>
+          <a:p>
+            <a:pPr algn="ctr"/>
+            <a:endParaRPr lang="he-IL"/>
+          </a:p>
+        </p:txBody>
+      </p:sp>
     </p:spTree>
     <p:extLst>
       <p:ext uri="{BB962C8B-B14F-4D97-AF65-F5344CB8AC3E}">
@@ -30107,6 +32765,13 @@
   <p:clrMapOvr>
     <a:masterClrMapping/>
   </p:clrMapOvr>
+  <p:timing>
+    <p:tnLst>
+      <p:par>
+        <p:cTn id="1" dur="indefinite" restart="never" nodeType="tmRoot"/>
+      </p:par>
+    </p:tnLst>
+  </p:timing>
 </p:sld>
 </file>
 

</xml_diff>